<commit_message>
Perform entropy simulation on all components and update PPT with results
</commit_message>
<xml_diff>
--- a/Test Set Optimization.pptx
+++ b/Test Set Optimization.pptx
@@ -531,7 +531,7 @@
           <a:p>
             <a:fld id="{83284890-85D2-4D7B-8EF5-15A9C1DB8F42}" type="datetimeFigureOut">
               <a:rPr lang="en-US" dirty="0"/>
-              <a:t>7/14/2018</a:t>
+              <a:t>7/16/2018</a:t>
             </a:fld>
             <a:endParaRPr lang="en-US" dirty="0"/>
           </a:p>
@@ -706,7 +706,7 @@
           <a:p>
             <a:fld id="{87157CC2-0FC8-4686-B024-99790E0F5162}" type="datetimeFigureOut">
               <a:rPr lang="en-US" dirty="0"/>
-              <a:t>7/14/2018</a:t>
+              <a:t>7/16/2018</a:t>
             </a:fld>
             <a:endParaRPr lang="en-US" dirty="0"/>
           </a:p>
@@ -881,7 +881,7 @@
           <a:p>
             <a:fld id="{F6764DA5-CD3D-4590-A511-FCD3BC7A793E}" type="datetimeFigureOut">
               <a:rPr lang="en-US" dirty="0"/>
-              <a:t>7/14/2018</a:t>
+              <a:t>7/16/2018</a:t>
             </a:fld>
             <a:endParaRPr lang="en-US" dirty="0"/>
           </a:p>
@@ -1046,7 +1046,7 @@
           <a:p>
             <a:fld id="{82F5661D-6934-4B32-B92C-470368BF1EC6}" type="datetimeFigureOut">
               <a:rPr lang="en-US" dirty="0"/>
-              <a:t>7/14/2018</a:t>
+              <a:t>7/16/2018</a:t>
             </a:fld>
             <a:endParaRPr lang="en-US" dirty="0"/>
           </a:p>
@@ -1354,7 +1354,7 @@
           <a:p>
             <a:fld id="{C6F822A4-8DA6-4447-9B1F-C5DB58435268}" type="datetimeFigureOut">
               <a:rPr lang="en-US" dirty="0"/>
-              <a:t>7/14/2018</a:t>
+              <a:t>7/16/2018</a:t>
             </a:fld>
             <a:endParaRPr lang="en-US" dirty="0"/>
           </a:p>
@@ -1736,7 +1736,7 @@
           <a:p>
             <a:fld id="{E548D31E-DCDA-41A7-9C67-C4B11B94D21D}" type="datetimeFigureOut">
               <a:rPr lang="en-US" dirty="0"/>
-              <a:t>7/14/2018</a:t>
+              <a:t>7/16/2018</a:t>
             </a:fld>
             <a:endParaRPr lang="en-US" dirty="0"/>
           </a:p>
@@ -2165,7 +2165,7 @@
           <a:p>
             <a:fld id="{9B3762C0-B258-48F1-ADE6-176B4174CCDD}" type="datetimeFigureOut">
               <a:rPr lang="en-US" dirty="0"/>
-              <a:t>7/14/2018</a:t>
+              <a:t>7/16/2018</a:t>
             </a:fld>
             <a:endParaRPr lang="en-US" dirty="0"/>
           </a:p>
@@ -2278,7 +2278,7 @@
           <a:p>
             <a:fld id="{677919A6-33EB-49BD-A62F-1FA56B9F9712}" type="datetimeFigureOut">
               <a:rPr lang="en-US" dirty="0"/>
-              <a:t>7/14/2018</a:t>
+              <a:t>7/16/2018</a:t>
             </a:fld>
             <a:endParaRPr lang="en-US" dirty="0"/>
           </a:p>
@@ -2368,7 +2368,7 @@
           <a:p>
             <a:fld id="{CA4E7D1B-D673-4CF6-8672-009D42ABD2A0}" type="datetimeFigureOut">
               <a:rPr lang="en-US" dirty="0"/>
-              <a:t>7/14/2018</a:t>
+              <a:t>7/16/2018</a:t>
             </a:fld>
             <a:endParaRPr lang="en-US" dirty="0"/>
           </a:p>
@@ -2713,7 +2713,7 @@
           <a:p>
             <a:fld id="{DA16AA21-1863-4931-97CB-99D0A168701B}" type="datetimeFigureOut">
               <a:rPr lang="en-US" dirty="0"/>
-              <a:t>7/14/2018</a:t>
+              <a:t>7/16/2018</a:t>
             </a:fld>
             <a:endParaRPr lang="en-US" dirty="0"/>
           </a:p>
@@ -3133,7 +3133,7 @@
           <a:p>
             <a:fld id="{3772C379-9A7C-4C87-A116-CBE9F58B04C5}" type="datetimeFigureOut">
               <a:rPr lang="en-US" dirty="0"/>
-              <a:t>7/14/2018</a:t>
+              <a:t>7/16/2018</a:t>
             </a:fld>
             <a:endParaRPr lang="en-US" dirty="0"/>
           </a:p>
@@ -3409,7 +3409,7 @@
           <a:p>
             <a:fld id="{8664C608-40B1-4030-A28D-5B74BC98ADCE}" type="datetimeFigureOut">
               <a:rPr lang="en-US" dirty="0"/>
-              <a:t>7/14/2018</a:t>
+              <a:t>7/16/2018</a:t>
             </a:fld>
             <a:endParaRPr lang="en-US" dirty="0"/>
           </a:p>
@@ -4655,7 +4655,7 @@
         </p:nvSpPr>
         <p:spPr>
           <a:xfrm>
-            <a:off x="1069848" y="3665717"/>
+            <a:off x="998827" y="3772249"/>
             <a:ext cx="10058400" cy="2882691"/>
           </a:xfrm>
           <a:prstGeom prst="rect">
@@ -4664,7 +4664,7 @@
         </p:spPr>
         <p:txBody>
           <a:bodyPr vert="horz" lIns="91440" tIns="45720" rIns="91440" bIns="45720" rtlCol="0">
-            <a:normAutofit fontScale="92500" lnSpcReduction="10000"/>
+            <a:normAutofit fontScale="92500" lnSpcReduction="20000"/>
           </a:bodyPr>
           <a:lstStyle>
             <a:lvl1pPr marL="182880" indent="-182880" algn="l" defTabSz="914400" rtl="0" eaLnBrk="1" latinLnBrk="0" hangingPunct="1">
@@ -5007,7 +5007,7 @@
             </a:r>
             <a:r>
               <a:rPr lang="en-US" dirty="0"/>
-              <a:t>. </a:t>
+              <a:t> and combine it with the rest of the components. </a:t>
             </a:r>
           </a:p>
           <a:p>
@@ -5058,10 +5058,10 @@
       </p:sp>
       <p:graphicFrame>
         <p:nvGraphicFramePr>
-          <p:cNvPr id="5" name="Table 4">
+          <p:cNvPr id="6" name="Table 5">
             <a:extLst>
               <a:ext uri="{FF2B5EF4-FFF2-40B4-BE49-F238E27FC236}">
-                <a16:creationId xmlns:a16="http://schemas.microsoft.com/office/drawing/2014/main" id="{0D7795D5-FBBE-4D68-907B-4157CC0079B4}"/>
+                <a16:creationId xmlns:a16="http://schemas.microsoft.com/office/drawing/2014/main" id="{25354683-3426-4960-9101-F5C26BAA8010}"/>
               </a:ext>
             </a:extLst>
           </p:cNvPr>
@@ -5071,14 +5071,14 @@
           <p:nvPr>
             <p:extLst>
               <p:ext uri="{D42A27DB-BD31-4B8C-83A1-F6EECF244321}">
-                <p14:modId xmlns:p14="http://schemas.microsoft.com/office/powerpoint/2010/main" val="3234183025"/>
+                <p14:modId xmlns:p14="http://schemas.microsoft.com/office/powerpoint/2010/main" val="3655067390"/>
               </p:ext>
             </p:extLst>
           </p:nvPr>
         </p:nvGraphicFramePr>
         <p:xfrm>
-          <a:off x="5228085" y="2876593"/>
-          <a:ext cx="4581740" cy="548640"/>
+          <a:off x="5104660" y="2854797"/>
+          <a:ext cx="4829326" cy="548640"/>
         </p:xfrm>
         <a:graphic>
           <a:graphicData uri="http://schemas.openxmlformats.org/drawingml/2006/table">
@@ -5087,17 +5087,17 @@
                 <a:tableStyleId>{5C22544A-7EE6-4342-B048-85BDC9FD1C3A}</a:tableStyleId>
               </a:tblPr>
               <a:tblGrid>
-                <a:gridCol w="2433364">
+                <a:gridCol w="2564857">
                   <a:extLst>
                     <a:ext uri="{9D8B030D-6E8A-4147-A177-3AD203B41FA5}">
-                      <a16:colId xmlns:a16="http://schemas.microsoft.com/office/drawing/2014/main" val="721525919"/>
+                      <a16:colId xmlns:a16="http://schemas.microsoft.com/office/drawing/2014/main" val="4135053980"/>
                     </a:ext>
                   </a:extLst>
                 </a:gridCol>
-                <a:gridCol w="2148376">
+                <a:gridCol w="2264469">
                   <a:extLst>
                     <a:ext uri="{9D8B030D-6E8A-4147-A177-3AD203B41FA5}">
-                      <a16:colId xmlns:a16="http://schemas.microsoft.com/office/drawing/2014/main" val="466377387"/>
+                      <a16:colId xmlns:a16="http://schemas.microsoft.com/office/drawing/2014/main" val="3755596868"/>
                     </a:ext>
                   </a:extLst>
                 </a:gridCol>
@@ -5110,12 +5110,12 @@
                     <a:p>
                       <a:pPr algn="ctr" fontAlgn="ctr"/>
                       <a:r>
-                        <a:rPr lang="en-US" sz="1100" b="1" u="none" strike="noStrike">
+                        <a:rPr lang="en-US" sz="1100" b="1" u="none" strike="noStrike" dirty="0">
                           <a:effectLst/>
                         </a:rPr>
                         <a:t>Simulation Test1 (Comp1,Comp3,Comp4)</a:t>
                       </a:r>
-                      <a:endParaRPr lang="en-US" sz="1100" b="1" i="0" u="none" strike="noStrike">
+                      <a:endParaRPr lang="en-US" sz="1100" b="1" i="0" u="none" strike="noStrike" dirty="0">
                         <a:solidFill>
                           <a:srgbClr val="000000"/>
                         </a:solidFill>
@@ -5138,7 +5138,7 @@
                 </a:tc>
                 <a:extLst>
                   <a:ext uri="{0D108BD9-81ED-4DB2-BD59-A6C34878D82A}">
-                    <a16:rowId xmlns:a16="http://schemas.microsoft.com/office/drawing/2014/main" val="905183784"/>
+                    <a16:rowId xmlns:a16="http://schemas.microsoft.com/office/drawing/2014/main" val="1375678735"/>
                   </a:ext>
                 </a:extLst>
               </a:tr>
@@ -5150,12 +5150,12 @@
                     <a:p>
                       <a:pPr algn="ctr" fontAlgn="ctr"/>
                       <a:r>
-                        <a:rPr lang="en-US" sz="1100" b="1" u="none" strike="noStrike">
+                        <a:rPr lang="en-US" sz="1100" b="1" u="none" strike="noStrike" dirty="0">
                           <a:effectLst/>
                         </a:rPr>
                         <a:t>Test pass - 1</a:t>
                       </a:r>
-                      <a:endParaRPr lang="en-US" sz="1100" b="1" i="0" u="none" strike="noStrike">
+                      <a:endParaRPr lang="en-US" sz="1100" b="1" i="0" u="none" strike="noStrike" dirty="0">
                         <a:solidFill>
                           <a:srgbClr val="000000"/>
                         </a:solidFill>
@@ -5191,7 +5191,7 @@
                 </a:tc>
                 <a:extLst>
                   <a:ext uri="{0D108BD9-81ED-4DB2-BD59-A6C34878D82A}">
-                    <a16:rowId xmlns:a16="http://schemas.microsoft.com/office/drawing/2014/main" val="2612316429"/>
+                    <a16:rowId xmlns:a16="http://schemas.microsoft.com/office/drawing/2014/main" val="2977290682"/>
                   </a:ext>
                 </a:extLst>
               </a:tr>
@@ -5203,12 +5203,12 @@
                     <a:p>
                       <a:pPr algn="ctr" fontAlgn="ctr"/>
                       <a:r>
-                        <a:rPr lang="en-US" sz="1100" b="1" u="none" strike="noStrike">
-                          <a:effectLst/>
-                        </a:rPr>
-                        <a:t>Entropy(0.74,0.79,0.52)</a:t>
-                      </a:r>
-                      <a:endParaRPr lang="en-US" sz="1100" b="1" i="0" u="none" strike="noStrike">
+                        <a:rPr lang="en-US" sz="1100" b="1" u="none" strike="noStrike" dirty="0">
+                          <a:effectLst/>
+                        </a:rPr>
+                        <a:t>Entropy(0.74,0.12,0.79,0.52,0.03)</a:t>
+                      </a:r>
+                      <a:endParaRPr lang="en-US" sz="1100" b="1" i="0" u="none" strike="noStrike" dirty="0">
                         <a:solidFill>
                           <a:srgbClr val="000000"/>
                         </a:solidFill>
@@ -5229,7 +5229,7 @@
                         <a:rPr lang="en-US" sz="1100" b="1" u="none" strike="noStrike" dirty="0">
                           <a:effectLst/>
                         </a:rPr>
-                        <a:t>Entropy(0.18,0.23,0.08)</a:t>
+                        <a:t>Entropy(0.18,0.12,0.23,0.08,0.03)</a:t>
                       </a:r>
                       <a:endParaRPr lang="en-US" sz="1100" b="1" i="0" u="none" strike="noStrike" dirty="0">
                         <a:solidFill>
@@ -5244,7 +5244,7 @@
                 </a:tc>
                 <a:extLst>
                   <a:ext uri="{0D108BD9-81ED-4DB2-BD59-A6C34878D82A}">
-                    <a16:rowId xmlns:a16="http://schemas.microsoft.com/office/drawing/2014/main" val="81224658"/>
+                    <a16:rowId xmlns:a16="http://schemas.microsoft.com/office/drawing/2014/main" val="200768871"/>
                   </a:ext>
                 </a:extLst>
               </a:tr>
@@ -6659,7 +6659,7 @@
           <a:p>
             <a:r>
               <a:rPr lang="en-US" dirty="0"/>
-              <a:t>Experiment </a:t>
+              <a:t>Experiment Results</a:t>
             </a:r>
           </a:p>
         </p:txBody>
@@ -7223,6 +7223,99 @@
             </a:r>
           </a:p>
           <a:p>
+            <a:pPr marL="0" indent="0">
+              <a:buNone/>
+            </a:pPr>
+            <a:r>
+              <a:rPr lang="en-US" dirty="0"/>
+              <a:t>   n – number of tests</a:t>
+            </a:r>
+          </a:p>
+          <a:p>
+            <a:pPr marL="0" indent="0">
+              <a:buNone/>
+            </a:pPr>
+            <a:r>
+              <a:rPr lang="en-US" dirty="0"/>
+              <a:t>   IG - Information gain selection </a:t>
+            </a:r>
+          </a:p>
+          <a:p>
+            <a:pPr marL="0" indent="0">
+              <a:buNone/>
+            </a:pPr>
+            <a:r>
+              <a:rPr lang="en-US" dirty="0"/>
+              <a:t>   TFB - Top high failure probability tests</a:t>
+            </a:r>
+          </a:p>
+          <a:p>
+            <a:pPr marL="0" indent="0">
+              <a:buNone/>
+            </a:pPr>
+            <a:r>
+              <a:rPr lang="en-US" dirty="0"/>
+              <a:t>   </a:t>
+            </a:r>
+          </a:p>
+          <a:p>
+            <a:pPr marL="0" indent="0">
+              <a:buNone/>
+            </a:pPr>
+            <a:endParaRPr lang="en-US" dirty="0"/>
+          </a:p>
+          <a:p>
+            <a:pPr marL="0" indent="0">
+              <a:buNone/>
+            </a:pPr>
+            <a:endParaRPr lang="en-US" dirty="0"/>
+          </a:p>
+          <a:p>
+            <a:pPr marL="0" indent="0">
+              <a:buNone/>
+            </a:pPr>
+            <a:r>
+              <a:rPr lang="en-US" sz="1400" dirty="0"/>
+              <a:t>  	F – Failed		P - Passed</a:t>
+            </a:r>
+          </a:p>
+          <a:p>
+            <a:pPr marL="0" indent="0">
+              <a:buNone/>
+            </a:pPr>
+            <a:endParaRPr lang="en-US" dirty="0"/>
+          </a:p>
+          <a:p>
+            <a:pPr marL="0" indent="0">
+              <a:buNone/>
+            </a:pPr>
+            <a:endParaRPr lang="en-US" dirty="0"/>
+          </a:p>
+          <a:p>
+            <a:pPr marL="0" indent="0">
+              <a:buNone/>
+            </a:pPr>
+            <a:endParaRPr lang="en-US" dirty="0"/>
+          </a:p>
+          <a:p>
+            <a:pPr marL="0" indent="0">
+              <a:buNone/>
+            </a:pPr>
+            <a:endParaRPr lang="en-US" dirty="0"/>
+          </a:p>
+          <a:p>
+            <a:pPr marL="0" indent="0">
+              <a:buNone/>
+            </a:pPr>
+            <a:endParaRPr lang="en-US" dirty="0"/>
+          </a:p>
+          <a:p>
+            <a:pPr marL="0" indent="0">
+              <a:buNone/>
+            </a:pPr>
+            <a:endParaRPr lang="en-US" dirty="0"/>
+          </a:p>
+          <a:p>
             <a:pPr marL="274320" lvl="1" indent="0">
               <a:buNone/>
             </a:pPr>
@@ -7236,6 +7329,1997 @@
           </a:p>
         </p:txBody>
       </p:sp>
+      <p:graphicFrame>
+        <p:nvGraphicFramePr>
+          <p:cNvPr id="3" name="Table 2">
+            <a:extLst>
+              <a:ext uri="{FF2B5EF4-FFF2-40B4-BE49-F238E27FC236}">
+                <a16:creationId xmlns:a16="http://schemas.microsoft.com/office/drawing/2014/main" id="{93E1C502-65E4-42D3-B7C7-5A7060622D95}"/>
+              </a:ext>
+            </a:extLst>
+          </p:cNvPr>
+          <p:cNvGraphicFramePr>
+            <a:graphicFrameLocks noGrp="1"/>
+          </p:cNvGraphicFramePr>
+          <p:nvPr>
+            <p:extLst>
+              <p:ext uri="{D42A27DB-BD31-4B8C-83A1-F6EECF244321}">
+                <p14:modId xmlns:p14="http://schemas.microsoft.com/office/powerpoint/2010/main" val="4040775649"/>
+              </p:ext>
+            </p:extLst>
+          </p:nvPr>
+        </p:nvGraphicFramePr>
+        <p:xfrm>
+          <a:off x="1571346" y="3848750"/>
+          <a:ext cx="5637322" cy="1158254"/>
+        </p:xfrm>
+        <a:graphic>
+          <a:graphicData uri="http://schemas.openxmlformats.org/drawingml/2006/table">
+            <a:tbl>
+              <a:tblPr>
+                <a:tableStyleId>{5C22544A-7EE6-4342-B048-85BDC9FD1C3A}</a:tableStyleId>
+              </a:tblPr>
+              <a:tblGrid>
+                <a:gridCol w="739739">
+                  <a:extLst>
+                    <a:ext uri="{9D8B030D-6E8A-4147-A177-3AD203B41FA5}">
+                      <a16:colId xmlns:a16="http://schemas.microsoft.com/office/drawing/2014/main" val="2753448739"/>
+                    </a:ext>
+                  </a:extLst>
+                </a:gridCol>
+                <a:gridCol w="948908">
+                  <a:extLst>
+                    <a:ext uri="{9D8B030D-6E8A-4147-A177-3AD203B41FA5}">
+                      <a16:colId xmlns:a16="http://schemas.microsoft.com/office/drawing/2014/main" val="521429234"/>
+                    </a:ext>
+                  </a:extLst>
+                </a:gridCol>
+                <a:gridCol w="1270310">
+                  <a:extLst>
+                    <a:ext uri="{9D8B030D-6E8A-4147-A177-3AD203B41FA5}">
+                      <a16:colId xmlns:a16="http://schemas.microsoft.com/office/drawing/2014/main" val="870603807"/>
+                    </a:ext>
+                  </a:extLst>
+                </a:gridCol>
+                <a:gridCol w="1698848">
+                  <a:extLst>
+                    <a:ext uri="{9D8B030D-6E8A-4147-A177-3AD203B41FA5}">
+                      <a16:colId xmlns:a16="http://schemas.microsoft.com/office/drawing/2014/main" val="1007441220"/>
+                    </a:ext>
+                  </a:extLst>
+                </a:gridCol>
+                <a:gridCol w="979517">
+                  <a:extLst>
+                    <a:ext uri="{9D8B030D-6E8A-4147-A177-3AD203B41FA5}">
+                      <a16:colId xmlns:a16="http://schemas.microsoft.com/office/drawing/2014/main" val="3187038757"/>
+                    </a:ext>
+                  </a:extLst>
+                </a:gridCol>
+              </a:tblGrid>
+              <a:tr h="242860">
+                <a:tc>
+                  <a:txBody>
+                    <a:bodyPr/>
+                    <a:lstStyle/>
+                    <a:p>
+                      <a:pPr algn="l" fontAlgn="b"/>
+                      <a:r>
+                        <a:rPr lang="en-US" sz="1100" b="1" u="none" strike="noStrike">
+                          <a:effectLst/>
+                        </a:rPr>
+                        <a:t> </a:t>
+                      </a:r>
+                      <a:endParaRPr lang="en-US" sz="1100" b="1" i="0" u="none" strike="noStrike">
+                        <a:solidFill>
+                          <a:srgbClr val="000000"/>
+                        </a:solidFill>
+                        <a:effectLst/>
+                        <a:latin typeface="Calibri" panose="020F0502020204030204" pitchFamily="34" charset="0"/>
+                      </a:endParaRPr>
+                    </a:p>
+                  </a:txBody>
+                  <a:tcPr marL="7620" marR="7620" marT="7620" marB="0" anchor="b"/>
+                </a:tc>
+                <a:tc gridSpan="2">
+                  <a:txBody>
+                    <a:bodyPr/>
+                    <a:lstStyle/>
+                    <a:p>
+                      <a:pPr algn="ctr" fontAlgn="b"/>
+                      <a:r>
+                        <a:rPr lang="en-US" sz="1200" b="1" u="none" strike="noStrike">
+                          <a:effectLst/>
+                        </a:rPr>
+                        <a:t>IG </a:t>
+                      </a:r>
+                      <a:endParaRPr lang="en-US" sz="1200" b="1" i="0" u="none" strike="noStrike">
+                        <a:solidFill>
+                          <a:srgbClr val="000000"/>
+                        </a:solidFill>
+                        <a:effectLst/>
+                        <a:latin typeface="Rockwell" panose="02060603020205020403" pitchFamily="18" charset="0"/>
+                      </a:endParaRPr>
+                    </a:p>
+                  </a:txBody>
+                  <a:tcPr marL="7620" marR="7620" marT="7620" marB="0" anchor="b"/>
+                </a:tc>
+                <a:tc hMerge="1">
+                  <a:txBody>
+                    <a:bodyPr/>
+                    <a:lstStyle/>
+                    <a:p>
+                      <a:endParaRPr lang="en-US"/>
+                    </a:p>
+                  </a:txBody>
+                  <a:tcPr/>
+                </a:tc>
+                <a:tc gridSpan="2">
+                  <a:txBody>
+                    <a:bodyPr/>
+                    <a:lstStyle/>
+                    <a:p>
+                      <a:pPr algn="ctr" fontAlgn="b"/>
+                      <a:r>
+                        <a:rPr lang="en-US" sz="1200" b="1" u="none" strike="noStrike">
+                          <a:effectLst/>
+                        </a:rPr>
+                        <a:t>TFB</a:t>
+                      </a:r>
+                      <a:endParaRPr lang="en-US" sz="1200" b="1" i="0" u="none" strike="noStrike">
+                        <a:solidFill>
+                          <a:srgbClr val="000000"/>
+                        </a:solidFill>
+                        <a:effectLst/>
+                        <a:latin typeface="Rockwell" panose="02060603020205020403" pitchFamily="18" charset="0"/>
+                      </a:endParaRPr>
+                    </a:p>
+                  </a:txBody>
+                  <a:tcPr marL="7620" marR="7620" marT="7620" marB="0" anchor="b"/>
+                </a:tc>
+                <a:tc hMerge="1">
+                  <a:txBody>
+                    <a:bodyPr/>
+                    <a:lstStyle/>
+                    <a:p>
+                      <a:endParaRPr lang="en-US"/>
+                    </a:p>
+                  </a:txBody>
+                  <a:tcPr/>
+                </a:tc>
+                <a:extLst>
+                  <a:ext uri="{0D108BD9-81ED-4DB2-BD59-A6C34878D82A}">
+                    <a16:rowId xmlns:a16="http://schemas.microsoft.com/office/drawing/2014/main" val="108900720"/>
+                  </a:ext>
+                </a:extLst>
+              </a:tr>
+              <a:tr h="242860">
+                <a:tc>
+                  <a:txBody>
+                    <a:bodyPr/>
+                    <a:lstStyle/>
+                    <a:p>
+                      <a:pPr algn="ctr" fontAlgn="b"/>
+                      <a:r>
+                        <a:rPr lang="en-US" sz="1200" b="1" u="none" strike="noStrike">
+                          <a:effectLst/>
+                        </a:rPr>
+                        <a:t>n</a:t>
+                      </a:r>
+                      <a:endParaRPr lang="en-US" sz="1200" b="1" i="0" u="none" strike="noStrike">
+                        <a:solidFill>
+                          <a:srgbClr val="000000"/>
+                        </a:solidFill>
+                        <a:effectLst/>
+                        <a:latin typeface="Rockwell" panose="02060603020205020403" pitchFamily="18" charset="0"/>
+                      </a:endParaRPr>
+                    </a:p>
+                  </a:txBody>
+                  <a:tcPr marL="7620" marR="7620" marT="7620" marB="0" anchor="b"/>
+                </a:tc>
+                <a:tc>
+                  <a:txBody>
+                    <a:bodyPr/>
+                    <a:lstStyle/>
+                    <a:p>
+                      <a:pPr algn="ctr" fontAlgn="b"/>
+                      <a:r>
+                        <a:rPr lang="en-US" sz="1200" b="1" u="none" strike="noStrike">
+                          <a:effectLst/>
+                        </a:rPr>
+                        <a:t>failed</a:t>
+                      </a:r>
+                      <a:endParaRPr lang="en-US" sz="1200" b="1" i="0" u="none" strike="noStrike">
+                        <a:solidFill>
+                          <a:srgbClr val="000000"/>
+                        </a:solidFill>
+                        <a:effectLst/>
+                        <a:latin typeface="Rockwell" panose="02060603020205020403" pitchFamily="18" charset="0"/>
+                      </a:endParaRPr>
+                    </a:p>
+                  </a:txBody>
+                  <a:tcPr marL="7620" marR="7620" marT="7620" marB="0" anchor="b"/>
+                </a:tc>
+                <a:tc>
+                  <a:txBody>
+                    <a:bodyPr/>
+                    <a:lstStyle/>
+                    <a:p>
+                      <a:pPr algn="ctr" fontAlgn="b"/>
+                      <a:r>
+                        <a:rPr lang="en-US" sz="1200" b="1" u="none" strike="noStrike">
+                          <a:effectLst/>
+                        </a:rPr>
+                        <a:t>passed</a:t>
+                      </a:r>
+                      <a:endParaRPr lang="en-US" sz="1200" b="1" i="0" u="none" strike="noStrike">
+                        <a:solidFill>
+                          <a:srgbClr val="000000"/>
+                        </a:solidFill>
+                        <a:effectLst/>
+                        <a:latin typeface="Rockwell" panose="02060603020205020403" pitchFamily="18" charset="0"/>
+                      </a:endParaRPr>
+                    </a:p>
+                  </a:txBody>
+                  <a:tcPr marL="7620" marR="7620" marT="7620" marB="0" anchor="b"/>
+                </a:tc>
+                <a:tc>
+                  <a:txBody>
+                    <a:bodyPr/>
+                    <a:lstStyle/>
+                    <a:p>
+                      <a:pPr algn="ctr" fontAlgn="b"/>
+                      <a:r>
+                        <a:rPr lang="en-US" sz="1200" b="1" u="none" strike="noStrike">
+                          <a:effectLst/>
+                        </a:rPr>
+                        <a:t>failed</a:t>
+                      </a:r>
+                      <a:endParaRPr lang="en-US" sz="1200" b="1" i="0" u="none" strike="noStrike">
+                        <a:solidFill>
+                          <a:srgbClr val="000000"/>
+                        </a:solidFill>
+                        <a:effectLst/>
+                        <a:latin typeface="Rockwell" panose="02060603020205020403" pitchFamily="18" charset="0"/>
+                      </a:endParaRPr>
+                    </a:p>
+                  </a:txBody>
+                  <a:tcPr marL="7620" marR="7620" marT="7620" marB="0" anchor="b"/>
+                </a:tc>
+                <a:tc>
+                  <a:txBody>
+                    <a:bodyPr/>
+                    <a:lstStyle/>
+                    <a:p>
+                      <a:pPr algn="ctr" fontAlgn="b"/>
+                      <a:r>
+                        <a:rPr lang="en-US" sz="1200" b="1" u="none" strike="noStrike">
+                          <a:effectLst/>
+                        </a:rPr>
+                        <a:t>passed</a:t>
+                      </a:r>
+                      <a:endParaRPr lang="en-US" sz="1200" b="1" i="0" u="none" strike="noStrike">
+                        <a:solidFill>
+                          <a:srgbClr val="000000"/>
+                        </a:solidFill>
+                        <a:effectLst/>
+                        <a:latin typeface="Rockwell" panose="02060603020205020403" pitchFamily="18" charset="0"/>
+                      </a:endParaRPr>
+                    </a:p>
+                  </a:txBody>
+                  <a:tcPr marL="7620" marR="7620" marT="7620" marB="0" anchor="b"/>
+                </a:tc>
+                <a:extLst>
+                  <a:ext uri="{0D108BD9-81ED-4DB2-BD59-A6C34878D82A}">
+                    <a16:rowId xmlns:a16="http://schemas.microsoft.com/office/drawing/2014/main" val="175391373"/>
+                  </a:ext>
+                </a:extLst>
+              </a:tr>
+              <a:tr h="224178">
+                <a:tc>
+                  <a:txBody>
+                    <a:bodyPr/>
+                    <a:lstStyle/>
+                    <a:p>
+                      <a:pPr algn="ctr" fontAlgn="b"/>
+                      <a:r>
+                        <a:rPr lang="en-US" sz="1100" b="1" u="none" strike="noStrike">
+                          <a:effectLst/>
+                        </a:rPr>
+                        <a:t>5</a:t>
+                      </a:r>
+                      <a:endParaRPr lang="en-US" sz="1100" b="1" i="0" u="none" strike="noStrike">
+                        <a:solidFill>
+                          <a:srgbClr val="000000"/>
+                        </a:solidFill>
+                        <a:effectLst/>
+                        <a:latin typeface="Calibri" panose="020F0502020204030204" pitchFamily="34" charset="0"/>
+                      </a:endParaRPr>
+                    </a:p>
+                  </a:txBody>
+                  <a:tcPr marL="7620" marR="7620" marT="7620" marB="0" anchor="b"/>
+                </a:tc>
+                <a:tc>
+                  <a:txBody>
+                    <a:bodyPr/>
+                    <a:lstStyle/>
+                    <a:p>
+                      <a:pPr algn="ctr" fontAlgn="b"/>
+                      <a:r>
+                        <a:rPr lang="en-US" sz="1100" b="1" u="none" strike="noStrike">
+                          <a:effectLst/>
+                        </a:rPr>
+                        <a:t>4</a:t>
+                      </a:r>
+                      <a:endParaRPr lang="en-US" sz="1100" b="1" i="0" u="none" strike="noStrike">
+                        <a:solidFill>
+                          <a:srgbClr val="000000"/>
+                        </a:solidFill>
+                        <a:effectLst/>
+                        <a:latin typeface="Calibri" panose="020F0502020204030204" pitchFamily="34" charset="0"/>
+                      </a:endParaRPr>
+                    </a:p>
+                  </a:txBody>
+                  <a:tcPr marL="7620" marR="7620" marT="7620" marB="0" anchor="b"/>
+                </a:tc>
+                <a:tc>
+                  <a:txBody>
+                    <a:bodyPr/>
+                    <a:lstStyle/>
+                    <a:p>
+                      <a:pPr algn="ctr" fontAlgn="b"/>
+                      <a:r>
+                        <a:rPr lang="en-US" sz="1100" b="1" u="none" strike="noStrike">
+                          <a:effectLst/>
+                        </a:rPr>
+                        <a:t>1</a:t>
+                      </a:r>
+                      <a:endParaRPr lang="en-US" sz="1100" b="1" i="0" u="none" strike="noStrike">
+                        <a:solidFill>
+                          <a:srgbClr val="000000"/>
+                        </a:solidFill>
+                        <a:effectLst/>
+                        <a:latin typeface="Calibri" panose="020F0502020204030204" pitchFamily="34" charset="0"/>
+                      </a:endParaRPr>
+                    </a:p>
+                  </a:txBody>
+                  <a:tcPr marL="7620" marR="7620" marT="7620" marB="0" anchor="b"/>
+                </a:tc>
+                <a:tc>
+                  <a:txBody>
+                    <a:bodyPr/>
+                    <a:lstStyle/>
+                    <a:p>
+                      <a:pPr algn="ctr" fontAlgn="ctr"/>
+                      <a:r>
+                        <a:rPr lang="en-US" sz="1100" b="1" u="none" strike="noStrike">
+                          <a:effectLst/>
+                        </a:rPr>
+                        <a:t>2</a:t>
+                      </a:r>
+                      <a:endParaRPr lang="en-US" sz="1100" b="1" i="0" u="none" strike="noStrike">
+                        <a:solidFill>
+                          <a:srgbClr val="000000"/>
+                        </a:solidFill>
+                        <a:effectLst/>
+                        <a:latin typeface="Calibri" panose="020F0502020204030204" pitchFamily="34" charset="0"/>
+                      </a:endParaRPr>
+                    </a:p>
+                  </a:txBody>
+                  <a:tcPr marL="7620" marR="7620" marT="7620" marB="0" anchor="ctr"/>
+                </a:tc>
+                <a:tc>
+                  <a:txBody>
+                    <a:bodyPr/>
+                    <a:lstStyle/>
+                    <a:p>
+                      <a:pPr algn="ctr" fontAlgn="b"/>
+                      <a:r>
+                        <a:rPr lang="en-US" sz="1100" b="1" u="none" strike="noStrike">
+                          <a:effectLst/>
+                        </a:rPr>
+                        <a:t>3</a:t>
+                      </a:r>
+                      <a:endParaRPr lang="en-US" sz="1100" b="1" i="0" u="none" strike="noStrike">
+                        <a:solidFill>
+                          <a:srgbClr val="000000"/>
+                        </a:solidFill>
+                        <a:effectLst/>
+                        <a:latin typeface="Calibri" panose="020F0502020204030204" pitchFamily="34" charset="0"/>
+                      </a:endParaRPr>
+                    </a:p>
+                  </a:txBody>
+                  <a:tcPr marL="7620" marR="7620" marT="7620" marB="0" anchor="b"/>
+                </a:tc>
+                <a:extLst>
+                  <a:ext uri="{0D108BD9-81ED-4DB2-BD59-A6C34878D82A}">
+                    <a16:rowId xmlns:a16="http://schemas.microsoft.com/office/drawing/2014/main" val="3209618930"/>
+                  </a:ext>
+                </a:extLst>
+              </a:tr>
+              <a:tr h="224178">
+                <a:tc>
+                  <a:txBody>
+                    <a:bodyPr/>
+                    <a:lstStyle/>
+                    <a:p>
+                      <a:pPr algn="ctr" fontAlgn="b"/>
+                      <a:r>
+                        <a:rPr lang="en-US" sz="1100" b="1" u="none" strike="noStrike">
+                          <a:effectLst/>
+                        </a:rPr>
+                        <a:t>10</a:t>
+                      </a:r>
+                      <a:endParaRPr lang="en-US" sz="1100" b="1" i="0" u="none" strike="noStrike">
+                        <a:solidFill>
+                          <a:srgbClr val="000000"/>
+                        </a:solidFill>
+                        <a:effectLst/>
+                        <a:latin typeface="Calibri" panose="020F0502020204030204" pitchFamily="34" charset="0"/>
+                      </a:endParaRPr>
+                    </a:p>
+                  </a:txBody>
+                  <a:tcPr marL="7620" marR="7620" marT="7620" marB="0" anchor="b"/>
+                </a:tc>
+                <a:tc>
+                  <a:txBody>
+                    <a:bodyPr/>
+                    <a:lstStyle/>
+                    <a:p>
+                      <a:pPr algn="ctr" fontAlgn="b"/>
+                      <a:r>
+                        <a:rPr lang="en-US" sz="1100" b="1" u="none" strike="noStrike">
+                          <a:effectLst/>
+                        </a:rPr>
+                        <a:t>4</a:t>
+                      </a:r>
+                      <a:endParaRPr lang="en-US" sz="1100" b="1" i="0" u="none" strike="noStrike">
+                        <a:solidFill>
+                          <a:srgbClr val="000000"/>
+                        </a:solidFill>
+                        <a:effectLst/>
+                        <a:latin typeface="Calibri" panose="020F0502020204030204" pitchFamily="34" charset="0"/>
+                      </a:endParaRPr>
+                    </a:p>
+                  </a:txBody>
+                  <a:tcPr marL="7620" marR="7620" marT="7620" marB="0" anchor="b"/>
+                </a:tc>
+                <a:tc>
+                  <a:txBody>
+                    <a:bodyPr/>
+                    <a:lstStyle/>
+                    <a:p>
+                      <a:pPr algn="ctr" fontAlgn="b"/>
+                      <a:r>
+                        <a:rPr lang="en-US" sz="1100" b="1" u="none" strike="noStrike">
+                          <a:effectLst/>
+                        </a:rPr>
+                        <a:t>6</a:t>
+                      </a:r>
+                      <a:endParaRPr lang="en-US" sz="1100" b="1" i="0" u="none" strike="noStrike">
+                        <a:solidFill>
+                          <a:srgbClr val="000000"/>
+                        </a:solidFill>
+                        <a:effectLst/>
+                        <a:latin typeface="Calibri" panose="020F0502020204030204" pitchFamily="34" charset="0"/>
+                      </a:endParaRPr>
+                    </a:p>
+                  </a:txBody>
+                  <a:tcPr marL="7620" marR="7620" marT="7620" marB="0" anchor="b"/>
+                </a:tc>
+                <a:tc>
+                  <a:txBody>
+                    <a:bodyPr/>
+                    <a:lstStyle/>
+                    <a:p>
+                      <a:pPr algn="ctr" fontAlgn="ctr"/>
+                      <a:r>
+                        <a:rPr lang="en-US" sz="1100" b="1" u="none" strike="noStrike">
+                          <a:effectLst/>
+                        </a:rPr>
+                        <a:t>3</a:t>
+                      </a:r>
+                      <a:endParaRPr lang="en-US" sz="1100" b="1" i="0" u="none" strike="noStrike">
+                        <a:solidFill>
+                          <a:srgbClr val="000000"/>
+                        </a:solidFill>
+                        <a:effectLst/>
+                        <a:latin typeface="Calibri" panose="020F0502020204030204" pitchFamily="34" charset="0"/>
+                      </a:endParaRPr>
+                    </a:p>
+                  </a:txBody>
+                  <a:tcPr marL="7620" marR="7620" marT="7620" marB="0" anchor="ctr"/>
+                </a:tc>
+                <a:tc>
+                  <a:txBody>
+                    <a:bodyPr/>
+                    <a:lstStyle/>
+                    <a:p>
+                      <a:pPr algn="ctr" fontAlgn="b"/>
+                      <a:r>
+                        <a:rPr lang="en-US" sz="1100" b="1" u="none" strike="noStrike" dirty="0">
+                          <a:effectLst/>
+                        </a:rPr>
+                        <a:t>7</a:t>
+                      </a:r>
+                      <a:endParaRPr lang="en-US" sz="1100" b="1" i="0" u="none" strike="noStrike" dirty="0">
+                        <a:solidFill>
+                          <a:srgbClr val="000000"/>
+                        </a:solidFill>
+                        <a:effectLst/>
+                        <a:latin typeface="Calibri" panose="020F0502020204030204" pitchFamily="34" charset="0"/>
+                      </a:endParaRPr>
+                    </a:p>
+                  </a:txBody>
+                  <a:tcPr marL="7620" marR="7620" marT="7620" marB="0" anchor="b"/>
+                </a:tc>
+                <a:extLst>
+                  <a:ext uri="{0D108BD9-81ED-4DB2-BD59-A6C34878D82A}">
+                    <a16:rowId xmlns:a16="http://schemas.microsoft.com/office/drawing/2014/main" val="454893697"/>
+                  </a:ext>
+                </a:extLst>
+              </a:tr>
+              <a:tr h="224178">
+                <a:tc>
+                  <a:txBody>
+                    <a:bodyPr/>
+                    <a:lstStyle/>
+                    <a:p>
+                      <a:pPr algn="ctr" fontAlgn="b"/>
+                      <a:r>
+                        <a:rPr lang="en-US" sz="1100" b="1" u="none" strike="noStrike">
+                          <a:effectLst/>
+                        </a:rPr>
+                        <a:t>15</a:t>
+                      </a:r>
+                      <a:endParaRPr lang="en-US" sz="1100" b="1" i="0" u="none" strike="noStrike">
+                        <a:solidFill>
+                          <a:srgbClr val="000000"/>
+                        </a:solidFill>
+                        <a:effectLst/>
+                        <a:latin typeface="Calibri" panose="020F0502020204030204" pitchFamily="34" charset="0"/>
+                      </a:endParaRPr>
+                    </a:p>
+                  </a:txBody>
+                  <a:tcPr marL="7620" marR="7620" marT="7620" marB="0" anchor="b"/>
+                </a:tc>
+                <a:tc>
+                  <a:txBody>
+                    <a:bodyPr/>
+                    <a:lstStyle/>
+                    <a:p>
+                      <a:pPr algn="ctr" fontAlgn="b"/>
+                      <a:r>
+                        <a:rPr lang="en-US" sz="1100" b="1" u="none" strike="noStrike" dirty="0">
+                          <a:effectLst/>
+                        </a:rPr>
+                        <a:t>4</a:t>
+                      </a:r>
+                      <a:endParaRPr lang="en-US" sz="1100" b="1" i="0" u="none" strike="noStrike" dirty="0">
+                        <a:solidFill>
+                          <a:srgbClr val="000000"/>
+                        </a:solidFill>
+                        <a:effectLst/>
+                        <a:latin typeface="Calibri" panose="020F0502020204030204" pitchFamily="34" charset="0"/>
+                      </a:endParaRPr>
+                    </a:p>
+                  </a:txBody>
+                  <a:tcPr marL="7620" marR="7620" marT="7620" marB="0" anchor="b"/>
+                </a:tc>
+                <a:tc>
+                  <a:txBody>
+                    <a:bodyPr/>
+                    <a:lstStyle/>
+                    <a:p>
+                      <a:pPr algn="ctr" fontAlgn="b"/>
+                      <a:r>
+                        <a:rPr lang="en-US" sz="1100" b="1" u="none" strike="noStrike">
+                          <a:effectLst/>
+                        </a:rPr>
+                        <a:t>11</a:t>
+                      </a:r>
+                      <a:endParaRPr lang="en-US" sz="1100" b="1" i="0" u="none" strike="noStrike">
+                        <a:solidFill>
+                          <a:srgbClr val="000000"/>
+                        </a:solidFill>
+                        <a:effectLst/>
+                        <a:latin typeface="Calibri" panose="020F0502020204030204" pitchFamily="34" charset="0"/>
+                      </a:endParaRPr>
+                    </a:p>
+                  </a:txBody>
+                  <a:tcPr marL="7620" marR="7620" marT="7620" marB="0" anchor="b"/>
+                </a:tc>
+                <a:tc>
+                  <a:txBody>
+                    <a:bodyPr/>
+                    <a:lstStyle/>
+                    <a:p>
+                      <a:pPr algn="ctr" fontAlgn="ctr"/>
+                      <a:r>
+                        <a:rPr lang="en-US" sz="1100" b="1" u="none" strike="noStrike">
+                          <a:effectLst/>
+                        </a:rPr>
+                        <a:t>4</a:t>
+                      </a:r>
+                      <a:endParaRPr lang="en-US" sz="1100" b="1" i="0" u="none" strike="noStrike">
+                        <a:solidFill>
+                          <a:srgbClr val="000000"/>
+                        </a:solidFill>
+                        <a:effectLst/>
+                        <a:latin typeface="Calibri" panose="020F0502020204030204" pitchFamily="34" charset="0"/>
+                      </a:endParaRPr>
+                    </a:p>
+                  </a:txBody>
+                  <a:tcPr marL="7620" marR="7620" marT="7620" marB="0" anchor="ctr"/>
+                </a:tc>
+                <a:tc>
+                  <a:txBody>
+                    <a:bodyPr/>
+                    <a:lstStyle/>
+                    <a:p>
+                      <a:pPr algn="ctr" fontAlgn="b"/>
+                      <a:r>
+                        <a:rPr lang="en-US" sz="1100" b="1" u="none" strike="noStrike" dirty="0">
+                          <a:effectLst/>
+                        </a:rPr>
+                        <a:t>11</a:t>
+                      </a:r>
+                      <a:endParaRPr lang="en-US" sz="1100" b="1" i="0" u="none" strike="noStrike" dirty="0">
+                        <a:solidFill>
+                          <a:srgbClr val="000000"/>
+                        </a:solidFill>
+                        <a:effectLst/>
+                        <a:latin typeface="Calibri" panose="020F0502020204030204" pitchFamily="34" charset="0"/>
+                      </a:endParaRPr>
+                    </a:p>
+                  </a:txBody>
+                  <a:tcPr marL="7620" marR="7620" marT="7620" marB="0" anchor="b"/>
+                </a:tc>
+                <a:extLst>
+                  <a:ext uri="{0D108BD9-81ED-4DB2-BD59-A6C34878D82A}">
+                    <a16:rowId xmlns:a16="http://schemas.microsoft.com/office/drawing/2014/main" val="3347475787"/>
+                  </a:ext>
+                </a:extLst>
+              </a:tr>
+            </a:tbl>
+          </a:graphicData>
+        </a:graphic>
+      </p:graphicFrame>
+      <p:graphicFrame>
+        <p:nvGraphicFramePr>
+          <p:cNvPr id="4" name="Table 3">
+            <a:extLst>
+              <a:ext uri="{FF2B5EF4-FFF2-40B4-BE49-F238E27FC236}">
+                <a16:creationId xmlns:a16="http://schemas.microsoft.com/office/drawing/2014/main" id="{65544039-450B-4396-9F76-C969FBC8F267}"/>
+              </a:ext>
+            </a:extLst>
+          </p:cNvPr>
+          <p:cNvGraphicFramePr>
+            <a:graphicFrameLocks noGrp="1"/>
+          </p:cNvGraphicFramePr>
+          <p:nvPr>
+            <p:extLst>
+              <p:ext uri="{D42A27DB-BD31-4B8C-83A1-F6EECF244321}">
+                <p14:modId xmlns:p14="http://schemas.microsoft.com/office/powerpoint/2010/main" val="974233334"/>
+              </p:ext>
+            </p:extLst>
+          </p:nvPr>
+        </p:nvGraphicFramePr>
+        <p:xfrm>
+          <a:off x="1269504" y="5459767"/>
+          <a:ext cx="8025412" cy="984681"/>
+        </p:xfrm>
+        <a:graphic>
+          <a:graphicData uri="http://schemas.openxmlformats.org/drawingml/2006/table">
+            <a:tbl>
+              <a:tblPr>
+                <a:tableStyleId>{5C22544A-7EE6-4342-B048-85BDC9FD1C3A}</a:tableStyleId>
+              </a:tblPr>
+              <a:tblGrid>
+                <a:gridCol w="1585264">
+                  <a:extLst>
+                    <a:ext uri="{9D8B030D-6E8A-4147-A177-3AD203B41FA5}">
+                      <a16:colId xmlns:a16="http://schemas.microsoft.com/office/drawing/2014/main" val="3782272989"/>
+                    </a:ext>
+                  </a:extLst>
+                </a:gridCol>
+                <a:gridCol w="363290">
+                  <a:extLst>
+                    <a:ext uri="{9D8B030D-6E8A-4147-A177-3AD203B41FA5}">
+                      <a16:colId xmlns:a16="http://schemas.microsoft.com/office/drawing/2014/main" val="1690900973"/>
+                    </a:ext>
+                  </a:extLst>
+                </a:gridCol>
+                <a:gridCol w="363290">
+                  <a:extLst>
+                    <a:ext uri="{9D8B030D-6E8A-4147-A177-3AD203B41FA5}">
+                      <a16:colId xmlns:a16="http://schemas.microsoft.com/office/drawing/2014/main" val="753862312"/>
+                    </a:ext>
+                  </a:extLst>
+                </a:gridCol>
+                <a:gridCol w="363290">
+                  <a:extLst>
+                    <a:ext uri="{9D8B030D-6E8A-4147-A177-3AD203B41FA5}">
+                      <a16:colId xmlns:a16="http://schemas.microsoft.com/office/drawing/2014/main" val="2680481878"/>
+                    </a:ext>
+                  </a:extLst>
+                </a:gridCol>
+                <a:gridCol w="363290">
+                  <a:extLst>
+                    <a:ext uri="{9D8B030D-6E8A-4147-A177-3AD203B41FA5}">
+                      <a16:colId xmlns:a16="http://schemas.microsoft.com/office/drawing/2014/main" val="1673871201"/>
+                    </a:ext>
+                  </a:extLst>
+                </a:gridCol>
+                <a:gridCol w="363290">
+                  <a:extLst>
+                    <a:ext uri="{9D8B030D-6E8A-4147-A177-3AD203B41FA5}">
+                      <a16:colId xmlns:a16="http://schemas.microsoft.com/office/drawing/2014/main" val="2577789882"/>
+                    </a:ext>
+                  </a:extLst>
+                </a:gridCol>
+                <a:gridCol w="363290">
+                  <a:extLst>
+                    <a:ext uri="{9D8B030D-6E8A-4147-A177-3AD203B41FA5}">
+                      <a16:colId xmlns:a16="http://schemas.microsoft.com/office/drawing/2014/main" val="4076877026"/>
+                    </a:ext>
+                  </a:extLst>
+                </a:gridCol>
+                <a:gridCol w="363290">
+                  <a:extLst>
+                    <a:ext uri="{9D8B030D-6E8A-4147-A177-3AD203B41FA5}">
+                      <a16:colId xmlns:a16="http://schemas.microsoft.com/office/drawing/2014/main" val="2598410897"/>
+                    </a:ext>
+                  </a:extLst>
+                </a:gridCol>
+                <a:gridCol w="363290">
+                  <a:extLst>
+                    <a:ext uri="{9D8B030D-6E8A-4147-A177-3AD203B41FA5}">
+                      <a16:colId xmlns:a16="http://schemas.microsoft.com/office/drawing/2014/main" val="2774049590"/>
+                    </a:ext>
+                  </a:extLst>
+                </a:gridCol>
+                <a:gridCol w="363290">
+                  <a:extLst>
+                    <a:ext uri="{9D8B030D-6E8A-4147-A177-3AD203B41FA5}">
+                      <a16:colId xmlns:a16="http://schemas.microsoft.com/office/drawing/2014/main" val="3981941535"/>
+                    </a:ext>
+                  </a:extLst>
+                </a:gridCol>
+                <a:gridCol w="528423">
+                  <a:extLst>
+                    <a:ext uri="{9D8B030D-6E8A-4147-A177-3AD203B41FA5}">
+                      <a16:colId xmlns:a16="http://schemas.microsoft.com/office/drawing/2014/main" val="3026428641"/>
+                    </a:ext>
+                  </a:extLst>
+                </a:gridCol>
+                <a:gridCol w="528423">
+                  <a:extLst>
+                    <a:ext uri="{9D8B030D-6E8A-4147-A177-3AD203B41FA5}">
+                      <a16:colId xmlns:a16="http://schemas.microsoft.com/office/drawing/2014/main" val="4056216738"/>
+                    </a:ext>
+                  </a:extLst>
+                </a:gridCol>
+                <a:gridCol w="528423">
+                  <a:extLst>
+                    <a:ext uri="{9D8B030D-6E8A-4147-A177-3AD203B41FA5}">
+                      <a16:colId xmlns:a16="http://schemas.microsoft.com/office/drawing/2014/main" val="4152103717"/>
+                    </a:ext>
+                  </a:extLst>
+                </a:gridCol>
+                <a:gridCol w="528423">
+                  <a:extLst>
+                    <a:ext uri="{9D8B030D-6E8A-4147-A177-3AD203B41FA5}">
+                      <a16:colId xmlns:a16="http://schemas.microsoft.com/office/drawing/2014/main" val="2254858381"/>
+                    </a:ext>
+                  </a:extLst>
+                </a:gridCol>
+                <a:gridCol w="528423">
+                  <a:extLst>
+                    <a:ext uri="{9D8B030D-6E8A-4147-A177-3AD203B41FA5}">
+                      <a16:colId xmlns:a16="http://schemas.microsoft.com/office/drawing/2014/main" val="3348986621"/>
+                    </a:ext>
+                  </a:extLst>
+                </a:gridCol>
+                <a:gridCol w="528423">
+                  <a:extLst>
+                    <a:ext uri="{9D8B030D-6E8A-4147-A177-3AD203B41FA5}">
+                      <a16:colId xmlns:a16="http://schemas.microsoft.com/office/drawing/2014/main" val="588748758"/>
+                    </a:ext>
+                  </a:extLst>
+                </a:gridCol>
+              </a:tblGrid>
+              <a:tr h="298881">
+                <a:tc>
+                  <a:txBody>
+                    <a:bodyPr/>
+                    <a:lstStyle/>
+                    <a:p>
+                      <a:pPr algn="ctr" fontAlgn="b"/>
+                      <a:r>
+                        <a:rPr lang="en-US" sz="1100" b="1" u="none" strike="noStrike">
+                          <a:effectLst/>
+                        </a:rPr>
+                        <a:t>Test#</a:t>
+                      </a:r>
+                      <a:endParaRPr lang="en-US" sz="1100" b="1" i="0" u="none" strike="noStrike">
+                        <a:solidFill>
+                          <a:srgbClr val="000000"/>
+                        </a:solidFill>
+                        <a:effectLst/>
+                        <a:latin typeface="Calibri" panose="020F0502020204030204" pitchFamily="34" charset="0"/>
+                      </a:endParaRPr>
+                    </a:p>
+                  </a:txBody>
+                  <a:tcPr marL="7620" marR="7620" marT="7620" marB="0" anchor="b"/>
+                </a:tc>
+                <a:tc>
+                  <a:txBody>
+                    <a:bodyPr/>
+                    <a:lstStyle/>
+                    <a:p>
+                      <a:pPr algn="ctr" fontAlgn="b"/>
+                      <a:r>
+                        <a:rPr lang="en-US" sz="1100" b="1" u="none" strike="noStrike">
+                          <a:effectLst/>
+                        </a:rPr>
+                        <a:t>1</a:t>
+                      </a:r>
+                      <a:endParaRPr lang="en-US" sz="1100" b="1" i="0" u="none" strike="noStrike">
+                        <a:solidFill>
+                          <a:srgbClr val="000000"/>
+                        </a:solidFill>
+                        <a:effectLst/>
+                        <a:latin typeface="Calibri" panose="020F0502020204030204" pitchFamily="34" charset="0"/>
+                      </a:endParaRPr>
+                    </a:p>
+                  </a:txBody>
+                  <a:tcPr marL="7620" marR="7620" marT="7620" marB="0" anchor="b"/>
+                </a:tc>
+                <a:tc>
+                  <a:txBody>
+                    <a:bodyPr/>
+                    <a:lstStyle/>
+                    <a:p>
+                      <a:pPr algn="ctr" fontAlgn="b"/>
+                      <a:r>
+                        <a:rPr lang="en-US" sz="1100" b="1" u="none" strike="noStrike">
+                          <a:effectLst/>
+                        </a:rPr>
+                        <a:t>2</a:t>
+                      </a:r>
+                      <a:endParaRPr lang="en-US" sz="1100" b="1" i="0" u="none" strike="noStrike">
+                        <a:solidFill>
+                          <a:srgbClr val="000000"/>
+                        </a:solidFill>
+                        <a:effectLst/>
+                        <a:latin typeface="Calibri" panose="020F0502020204030204" pitchFamily="34" charset="0"/>
+                      </a:endParaRPr>
+                    </a:p>
+                  </a:txBody>
+                  <a:tcPr marL="7620" marR="7620" marT="7620" marB="0" anchor="b"/>
+                </a:tc>
+                <a:tc>
+                  <a:txBody>
+                    <a:bodyPr/>
+                    <a:lstStyle/>
+                    <a:p>
+                      <a:pPr algn="ctr" fontAlgn="b"/>
+                      <a:r>
+                        <a:rPr lang="en-US" sz="1100" b="1" u="none" strike="noStrike">
+                          <a:effectLst/>
+                        </a:rPr>
+                        <a:t>3</a:t>
+                      </a:r>
+                      <a:endParaRPr lang="en-US" sz="1100" b="1" i="0" u="none" strike="noStrike">
+                        <a:solidFill>
+                          <a:srgbClr val="000000"/>
+                        </a:solidFill>
+                        <a:effectLst/>
+                        <a:latin typeface="Calibri" panose="020F0502020204030204" pitchFamily="34" charset="0"/>
+                      </a:endParaRPr>
+                    </a:p>
+                  </a:txBody>
+                  <a:tcPr marL="7620" marR="7620" marT="7620" marB="0" anchor="b"/>
+                </a:tc>
+                <a:tc>
+                  <a:txBody>
+                    <a:bodyPr/>
+                    <a:lstStyle/>
+                    <a:p>
+                      <a:pPr algn="ctr" fontAlgn="b"/>
+                      <a:r>
+                        <a:rPr lang="en-US" sz="1100" b="1" u="none" strike="noStrike">
+                          <a:effectLst/>
+                        </a:rPr>
+                        <a:t>4</a:t>
+                      </a:r>
+                      <a:endParaRPr lang="en-US" sz="1100" b="1" i="0" u="none" strike="noStrike">
+                        <a:solidFill>
+                          <a:srgbClr val="000000"/>
+                        </a:solidFill>
+                        <a:effectLst/>
+                        <a:latin typeface="Calibri" panose="020F0502020204030204" pitchFamily="34" charset="0"/>
+                      </a:endParaRPr>
+                    </a:p>
+                  </a:txBody>
+                  <a:tcPr marL="7620" marR="7620" marT="7620" marB="0" anchor="b"/>
+                </a:tc>
+                <a:tc>
+                  <a:txBody>
+                    <a:bodyPr/>
+                    <a:lstStyle/>
+                    <a:p>
+                      <a:pPr algn="ctr" fontAlgn="b"/>
+                      <a:r>
+                        <a:rPr lang="en-US" sz="1100" b="1" u="none" strike="noStrike">
+                          <a:effectLst/>
+                        </a:rPr>
+                        <a:t>5</a:t>
+                      </a:r>
+                      <a:endParaRPr lang="en-US" sz="1100" b="1" i="0" u="none" strike="noStrike">
+                        <a:solidFill>
+                          <a:srgbClr val="000000"/>
+                        </a:solidFill>
+                        <a:effectLst/>
+                        <a:latin typeface="Calibri" panose="020F0502020204030204" pitchFamily="34" charset="0"/>
+                      </a:endParaRPr>
+                    </a:p>
+                  </a:txBody>
+                  <a:tcPr marL="7620" marR="7620" marT="7620" marB="0" anchor="b"/>
+                </a:tc>
+                <a:tc>
+                  <a:txBody>
+                    <a:bodyPr/>
+                    <a:lstStyle/>
+                    <a:p>
+                      <a:pPr algn="ctr" fontAlgn="b"/>
+                      <a:r>
+                        <a:rPr lang="en-US" sz="1100" b="1" u="none" strike="noStrike">
+                          <a:effectLst/>
+                        </a:rPr>
+                        <a:t>6</a:t>
+                      </a:r>
+                      <a:endParaRPr lang="en-US" sz="1100" b="1" i="0" u="none" strike="noStrike">
+                        <a:solidFill>
+                          <a:srgbClr val="000000"/>
+                        </a:solidFill>
+                        <a:effectLst/>
+                        <a:latin typeface="Calibri" panose="020F0502020204030204" pitchFamily="34" charset="0"/>
+                      </a:endParaRPr>
+                    </a:p>
+                  </a:txBody>
+                  <a:tcPr marL="7620" marR="7620" marT="7620" marB="0" anchor="b"/>
+                </a:tc>
+                <a:tc>
+                  <a:txBody>
+                    <a:bodyPr/>
+                    <a:lstStyle/>
+                    <a:p>
+                      <a:pPr algn="ctr" fontAlgn="b"/>
+                      <a:r>
+                        <a:rPr lang="en-US" sz="1100" b="1" u="none" strike="noStrike">
+                          <a:effectLst/>
+                        </a:rPr>
+                        <a:t>7</a:t>
+                      </a:r>
+                      <a:endParaRPr lang="en-US" sz="1100" b="1" i="0" u="none" strike="noStrike">
+                        <a:solidFill>
+                          <a:srgbClr val="000000"/>
+                        </a:solidFill>
+                        <a:effectLst/>
+                        <a:latin typeface="Calibri" panose="020F0502020204030204" pitchFamily="34" charset="0"/>
+                      </a:endParaRPr>
+                    </a:p>
+                  </a:txBody>
+                  <a:tcPr marL="7620" marR="7620" marT="7620" marB="0" anchor="b"/>
+                </a:tc>
+                <a:tc>
+                  <a:txBody>
+                    <a:bodyPr/>
+                    <a:lstStyle/>
+                    <a:p>
+                      <a:pPr algn="ctr" fontAlgn="b"/>
+                      <a:r>
+                        <a:rPr lang="en-US" sz="1100" b="1" u="none" strike="noStrike">
+                          <a:effectLst/>
+                        </a:rPr>
+                        <a:t>8</a:t>
+                      </a:r>
+                      <a:endParaRPr lang="en-US" sz="1100" b="1" i="0" u="none" strike="noStrike">
+                        <a:solidFill>
+                          <a:srgbClr val="000000"/>
+                        </a:solidFill>
+                        <a:effectLst/>
+                        <a:latin typeface="Calibri" panose="020F0502020204030204" pitchFamily="34" charset="0"/>
+                      </a:endParaRPr>
+                    </a:p>
+                  </a:txBody>
+                  <a:tcPr marL="7620" marR="7620" marT="7620" marB="0" anchor="b"/>
+                </a:tc>
+                <a:tc>
+                  <a:txBody>
+                    <a:bodyPr/>
+                    <a:lstStyle/>
+                    <a:p>
+                      <a:pPr algn="ctr" fontAlgn="b"/>
+                      <a:r>
+                        <a:rPr lang="en-US" sz="1100" b="1" u="none" strike="noStrike">
+                          <a:effectLst/>
+                        </a:rPr>
+                        <a:t>9</a:t>
+                      </a:r>
+                      <a:endParaRPr lang="en-US" sz="1100" b="1" i="0" u="none" strike="noStrike">
+                        <a:solidFill>
+                          <a:srgbClr val="000000"/>
+                        </a:solidFill>
+                        <a:effectLst/>
+                        <a:latin typeface="Calibri" panose="020F0502020204030204" pitchFamily="34" charset="0"/>
+                      </a:endParaRPr>
+                    </a:p>
+                  </a:txBody>
+                  <a:tcPr marL="7620" marR="7620" marT="7620" marB="0" anchor="b"/>
+                </a:tc>
+                <a:tc>
+                  <a:txBody>
+                    <a:bodyPr/>
+                    <a:lstStyle/>
+                    <a:p>
+                      <a:pPr algn="ctr" fontAlgn="b"/>
+                      <a:r>
+                        <a:rPr lang="en-US" sz="1100" b="1" u="none" strike="noStrike">
+                          <a:effectLst/>
+                        </a:rPr>
+                        <a:t>10</a:t>
+                      </a:r>
+                      <a:endParaRPr lang="en-US" sz="1100" b="1" i="0" u="none" strike="noStrike">
+                        <a:solidFill>
+                          <a:srgbClr val="000000"/>
+                        </a:solidFill>
+                        <a:effectLst/>
+                        <a:latin typeface="Calibri" panose="020F0502020204030204" pitchFamily="34" charset="0"/>
+                      </a:endParaRPr>
+                    </a:p>
+                  </a:txBody>
+                  <a:tcPr marL="7620" marR="7620" marT="7620" marB="0" anchor="b"/>
+                </a:tc>
+                <a:tc>
+                  <a:txBody>
+                    <a:bodyPr/>
+                    <a:lstStyle/>
+                    <a:p>
+                      <a:pPr algn="ctr" fontAlgn="b"/>
+                      <a:r>
+                        <a:rPr lang="en-US" sz="1100" b="1" u="none" strike="noStrike">
+                          <a:effectLst/>
+                        </a:rPr>
+                        <a:t>11</a:t>
+                      </a:r>
+                      <a:endParaRPr lang="en-US" sz="1100" b="1" i="0" u="none" strike="noStrike">
+                        <a:solidFill>
+                          <a:srgbClr val="000000"/>
+                        </a:solidFill>
+                        <a:effectLst/>
+                        <a:latin typeface="Calibri" panose="020F0502020204030204" pitchFamily="34" charset="0"/>
+                      </a:endParaRPr>
+                    </a:p>
+                  </a:txBody>
+                  <a:tcPr marL="7620" marR="7620" marT="7620" marB="0" anchor="b"/>
+                </a:tc>
+                <a:tc>
+                  <a:txBody>
+                    <a:bodyPr/>
+                    <a:lstStyle/>
+                    <a:p>
+                      <a:pPr algn="ctr" fontAlgn="b"/>
+                      <a:r>
+                        <a:rPr lang="en-US" sz="1100" b="1" u="none" strike="noStrike">
+                          <a:effectLst/>
+                        </a:rPr>
+                        <a:t>12</a:t>
+                      </a:r>
+                      <a:endParaRPr lang="en-US" sz="1100" b="1" i="0" u="none" strike="noStrike">
+                        <a:solidFill>
+                          <a:srgbClr val="000000"/>
+                        </a:solidFill>
+                        <a:effectLst/>
+                        <a:latin typeface="Calibri" panose="020F0502020204030204" pitchFamily="34" charset="0"/>
+                      </a:endParaRPr>
+                    </a:p>
+                  </a:txBody>
+                  <a:tcPr marL="7620" marR="7620" marT="7620" marB="0" anchor="b"/>
+                </a:tc>
+                <a:tc>
+                  <a:txBody>
+                    <a:bodyPr/>
+                    <a:lstStyle/>
+                    <a:p>
+                      <a:pPr algn="ctr" fontAlgn="b"/>
+                      <a:r>
+                        <a:rPr lang="en-US" sz="1100" b="1" u="none" strike="noStrike">
+                          <a:effectLst/>
+                        </a:rPr>
+                        <a:t>13</a:t>
+                      </a:r>
+                      <a:endParaRPr lang="en-US" sz="1100" b="1" i="0" u="none" strike="noStrike">
+                        <a:solidFill>
+                          <a:srgbClr val="000000"/>
+                        </a:solidFill>
+                        <a:effectLst/>
+                        <a:latin typeface="Calibri" panose="020F0502020204030204" pitchFamily="34" charset="0"/>
+                      </a:endParaRPr>
+                    </a:p>
+                  </a:txBody>
+                  <a:tcPr marL="7620" marR="7620" marT="7620" marB="0" anchor="b"/>
+                </a:tc>
+                <a:tc>
+                  <a:txBody>
+                    <a:bodyPr/>
+                    <a:lstStyle/>
+                    <a:p>
+                      <a:pPr algn="ctr" fontAlgn="b"/>
+                      <a:r>
+                        <a:rPr lang="en-US" sz="1100" b="1" u="none" strike="noStrike">
+                          <a:effectLst/>
+                        </a:rPr>
+                        <a:t>14</a:t>
+                      </a:r>
+                      <a:endParaRPr lang="en-US" sz="1100" b="1" i="0" u="none" strike="noStrike">
+                        <a:solidFill>
+                          <a:srgbClr val="000000"/>
+                        </a:solidFill>
+                        <a:effectLst/>
+                        <a:latin typeface="Calibri" panose="020F0502020204030204" pitchFamily="34" charset="0"/>
+                      </a:endParaRPr>
+                    </a:p>
+                  </a:txBody>
+                  <a:tcPr marL="7620" marR="7620" marT="7620" marB="0" anchor="b"/>
+                </a:tc>
+                <a:tc>
+                  <a:txBody>
+                    <a:bodyPr/>
+                    <a:lstStyle/>
+                    <a:p>
+                      <a:pPr algn="ctr" fontAlgn="b"/>
+                      <a:r>
+                        <a:rPr lang="en-US" sz="1100" b="1" u="none" strike="noStrike">
+                          <a:effectLst/>
+                        </a:rPr>
+                        <a:t>15</a:t>
+                      </a:r>
+                      <a:endParaRPr lang="en-US" sz="1100" b="1" i="0" u="none" strike="noStrike">
+                        <a:solidFill>
+                          <a:srgbClr val="000000"/>
+                        </a:solidFill>
+                        <a:effectLst/>
+                        <a:latin typeface="Calibri" panose="020F0502020204030204" pitchFamily="34" charset="0"/>
+                      </a:endParaRPr>
+                    </a:p>
+                  </a:txBody>
+                  <a:tcPr marL="7620" marR="7620" marT="7620" marB="0" anchor="b"/>
+                </a:tc>
+                <a:extLst>
+                  <a:ext uri="{0D108BD9-81ED-4DB2-BD59-A6C34878D82A}">
+                    <a16:rowId xmlns:a16="http://schemas.microsoft.com/office/drawing/2014/main" val="3222809687"/>
+                  </a:ext>
+                </a:extLst>
+              </a:tr>
+              <a:tr h="298881">
+                <a:tc>
+                  <a:txBody>
+                    <a:bodyPr/>
+                    <a:lstStyle/>
+                    <a:p>
+                      <a:pPr algn="ctr" fontAlgn="b"/>
+                      <a:r>
+                        <a:rPr lang="en-US" sz="1100" b="1" u="none" strike="noStrike">
+                          <a:effectLst/>
+                        </a:rPr>
+                        <a:t>IG</a:t>
+                      </a:r>
+                      <a:endParaRPr lang="en-US" sz="1100" b="1" i="0" u="none" strike="noStrike">
+                        <a:solidFill>
+                          <a:srgbClr val="000000"/>
+                        </a:solidFill>
+                        <a:effectLst/>
+                        <a:latin typeface="Calibri" panose="020F0502020204030204" pitchFamily="34" charset="0"/>
+                      </a:endParaRPr>
+                    </a:p>
+                  </a:txBody>
+                  <a:tcPr marL="7620" marR="7620" marT="7620" marB="0" anchor="b"/>
+                </a:tc>
+                <a:tc>
+                  <a:txBody>
+                    <a:bodyPr/>
+                    <a:lstStyle/>
+                    <a:p>
+                      <a:pPr algn="ctr" fontAlgn="b"/>
+                      <a:r>
+                        <a:rPr lang="en-US" sz="1100" b="1" u="none" strike="noStrike" dirty="0">
+                          <a:effectLst/>
+                          <a:highlight>
+                            <a:srgbClr val="FFFF00"/>
+                          </a:highlight>
+                        </a:rPr>
+                        <a:t>F</a:t>
+                      </a:r>
+                      <a:endParaRPr lang="en-US" sz="1100" b="1" i="0" u="none" strike="noStrike" dirty="0">
+                        <a:solidFill>
+                          <a:srgbClr val="000000"/>
+                        </a:solidFill>
+                        <a:effectLst/>
+                        <a:highlight>
+                          <a:srgbClr val="FFFF00"/>
+                        </a:highlight>
+                        <a:latin typeface="Calibri" panose="020F0502020204030204" pitchFamily="34" charset="0"/>
+                      </a:endParaRPr>
+                    </a:p>
+                  </a:txBody>
+                  <a:tcPr marL="7620" marR="7620" marT="7620" marB="0" anchor="b"/>
+                </a:tc>
+                <a:tc>
+                  <a:txBody>
+                    <a:bodyPr/>
+                    <a:lstStyle/>
+                    <a:p>
+                      <a:pPr algn="ctr" fontAlgn="ctr"/>
+                      <a:endParaRPr lang="en-US" sz="1100" b="1" u="none" strike="noStrike" dirty="0">
+                        <a:effectLst/>
+                        <a:highlight>
+                          <a:srgbClr val="FFFF00"/>
+                        </a:highlight>
+                      </a:endParaRPr>
+                    </a:p>
+                    <a:p>
+                      <a:pPr algn="ctr" fontAlgn="ctr"/>
+                      <a:r>
+                        <a:rPr lang="en-US" sz="1100" b="1" u="none" strike="noStrike" dirty="0">
+                          <a:effectLst/>
+                          <a:highlight>
+                            <a:srgbClr val="FFFF00"/>
+                          </a:highlight>
+                        </a:rPr>
+                        <a:t>F</a:t>
+                      </a:r>
+                      <a:endParaRPr lang="en-US" sz="1100" b="1" i="0" u="none" strike="noStrike" dirty="0">
+                        <a:solidFill>
+                          <a:srgbClr val="000000"/>
+                        </a:solidFill>
+                        <a:effectLst/>
+                        <a:highlight>
+                          <a:srgbClr val="FFFF00"/>
+                        </a:highlight>
+                        <a:latin typeface="Calibri" panose="020F0502020204030204" pitchFamily="34" charset="0"/>
+                      </a:endParaRPr>
+                    </a:p>
+                  </a:txBody>
+                  <a:tcPr marL="7620" marR="7620" marT="7620" marB="0" anchor="ctr"/>
+                </a:tc>
+                <a:tc>
+                  <a:txBody>
+                    <a:bodyPr/>
+                    <a:lstStyle/>
+                    <a:p>
+                      <a:pPr algn="ctr" fontAlgn="b"/>
+                      <a:r>
+                        <a:rPr lang="en-US" sz="1100" b="1" u="none" strike="noStrike" dirty="0">
+                          <a:effectLst/>
+                          <a:highlight>
+                            <a:srgbClr val="FFFF00"/>
+                          </a:highlight>
+                        </a:rPr>
+                        <a:t>F</a:t>
+                      </a:r>
+                      <a:endParaRPr lang="en-US" sz="1100" b="1" i="0" u="none" strike="noStrike" dirty="0">
+                        <a:solidFill>
+                          <a:srgbClr val="000000"/>
+                        </a:solidFill>
+                        <a:effectLst/>
+                        <a:highlight>
+                          <a:srgbClr val="FFFF00"/>
+                        </a:highlight>
+                        <a:latin typeface="Calibri" panose="020F0502020204030204" pitchFamily="34" charset="0"/>
+                      </a:endParaRPr>
+                    </a:p>
+                  </a:txBody>
+                  <a:tcPr marL="7620" marR="7620" marT="7620" marB="0" anchor="b"/>
+                </a:tc>
+                <a:tc>
+                  <a:txBody>
+                    <a:bodyPr/>
+                    <a:lstStyle/>
+                    <a:p>
+                      <a:pPr algn="ctr" fontAlgn="b"/>
+                      <a:r>
+                        <a:rPr lang="en-US" sz="1100" b="1" u="none" strike="noStrike" dirty="0">
+                          <a:effectLst/>
+                          <a:highlight>
+                            <a:srgbClr val="FFFF00"/>
+                          </a:highlight>
+                        </a:rPr>
+                        <a:t>F</a:t>
+                      </a:r>
+                      <a:endParaRPr lang="en-US" sz="1100" b="1" i="0" u="none" strike="noStrike" dirty="0">
+                        <a:solidFill>
+                          <a:srgbClr val="000000"/>
+                        </a:solidFill>
+                        <a:effectLst/>
+                        <a:highlight>
+                          <a:srgbClr val="FFFF00"/>
+                        </a:highlight>
+                        <a:latin typeface="Calibri" panose="020F0502020204030204" pitchFamily="34" charset="0"/>
+                      </a:endParaRPr>
+                    </a:p>
+                  </a:txBody>
+                  <a:tcPr marL="7620" marR="7620" marT="7620" marB="0" anchor="b"/>
+                </a:tc>
+                <a:tc>
+                  <a:txBody>
+                    <a:bodyPr/>
+                    <a:lstStyle/>
+                    <a:p>
+                      <a:pPr algn="ctr" fontAlgn="b"/>
+                      <a:r>
+                        <a:rPr lang="en-US" sz="1100" b="1" u="none" strike="noStrike" dirty="0">
+                          <a:effectLst/>
+                        </a:rPr>
+                        <a:t>P</a:t>
+                      </a:r>
+                      <a:endParaRPr lang="en-US" sz="1100" b="1" i="0" u="none" strike="noStrike" dirty="0">
+                        <a:solidFill>
+                          <a:srgbClr val="000000"/>
+                        </a:solidFill>
+                        <a:effectLst/>
+                        <a:latin typeface="Calibri" panose="020F0502020204030204" pitchFamily="34" charset="0"/>
+                      </a:endParaRPr>
+                    </a:p>
+                  </a:txBody>
+                  <a:tcPr marL="7620" marR="7620" marT="7620" marB="0" anchor="b"/>
+                </a:tc>
+                <a:tc>
+                  <a:txBody>
+                    <a:bodyPr/>
+                    <a:lstStyle/>
+                    <a:p>
+                      <a:pPr algn="ctr" fontAlgn="b"/>
+                      <a:r>
+                        <a:rPr lang="en-US" sz="1100" b="1" u="none" strike="noStrike">
+                          <a:effectLst/>
+                        </a:rPr>
+                        <a:t>P</a:t>
+                      </a:r>
+                      <a:endParaRPr lang="en-US" sz="1100" b="1" i="0" u="none" strike="noStrike">
+                        <a:solidFill>
+                          <a:srgbClr val="000000"/>
+                        </a:solidFill>
+                        <a:effectLst/>
+                        <a:latin typeface="Calibri" panose="020F0502020204030204" pitchFamily="34" charset="0"/>
+                      </a:endParaRPr>
+                    </a:p>
+                  </a:txBody>
+                  <a:tcPr marL="7620" marR="7620" marT="7620" marB="0" anchor="b"/>
+                </a:tc>
+                <a:tc>
+                  <a:txBody>
+                    <a:bodyPr/>
+                    <a:lstStyle/>
+                    <a:p>
+                      <a:pPr algn="ctr" fontAlgn="b"/>
+                      <a:r>
+                        <a:rPr lang="en-US" sz="1100" b="1" u="none" strike="noStrike">
+                          <a:effectLst/>
+                        </a:rPr>
+                        <a:t>P</a:t>
+                      </a:r>
+                      <a:endParaRPr lang="en-US" sz="1100" b="1" i="0" u="none" strike="noStrike">
+                        <a:solidFill>
+                          <a:srgbClr val="000000"/>
+                        </a:solidFill>
+                        <a:effectLst/>
+                        <a:latin typeface="Calibri" panose="020F0502020204030204" pitchFamily="34" charset="0"/>
+                      </a:endParaRPr>
+                    </a:p>
+                  </a:txBody>
+                  <a:tcPr marL="7620" marR="7620" marT="7620" marB="0" anchor="b"/>
+                </a:tc>
+                <a:tc>
+                  <a:txBody>
+                    <a:bodyPr/>
+                    <a:lstStyle/>
+                    <a:p>
+                      <a:pPr algn="ctr" fontAlgn="b"/>
+                      <a:r>
+                        <a:rPr lang="en-US" sz="1100" b="1" u="none" strike="noStrike">
+                          <a:effectLst/>
+                        </a:rPr>
+                        <a:t>P</a:t>
+                      </a:r>
+                      <a:endParaRPr lang="en-US" sz="1100" b="1" i="0" u="none" strike="noStrike">
+                        <a:solidFill>
+                          <a:srgbClr val="000000"/>
+                        </a:solidFill>
+                        <a:effectLst/>
+                        <a:latin typeface="Calibri" panose="020F0502020204030204" pitchFamily="34" charset="0"/>
+                      </a:endParaRPr>
+                    </a:p>
+                  </a:txBody>
+                  <a:tcPr marL="7620" marR="7620" marT="7620" marB="0" anchor="b"/>
+                </a:tc>
+                <a:tc>
+                  <a:txBody>
+                    <a:bodyPr/>
+                    <a:lstStyle/>
+                    <a:p>
+                      <a:pPr algn="ctr" fontAlgn="b"/>
+                      <a:r>
+                        <a:rPr lang="en-US" sz="1100" b="1" u="none" strike="noStrike">
+                          <a:effectLst/>
+                        </a:rPr>
+                        <a:t>P</a:t>
+                      </a:r>
+                      <a:endParaRPr lang="en-US" sz="1100" b="1" i="0" u="none" strike="noStrike">
+                        <a:solidFill>
+                          <a:srgbClr val="000000"/>
+                        </a:solidFill>
+                        <a:effectLst/>
+                        <a:latin typeface="Calibri" panose="020F0502020204030204" pitchFamily="34" charset="0"/>
+                      </a:endParaRPr>
+                    </a:p>
+                  </a:txBody>
+                  <a:tcPr marL="7620" marR="7620" marT="7620" marB="0" anchor="b"/>
+                </a:tc>
+                <a:tc>
+                  <a:txBody>
+                    <a:bodyPr/>
+                    <a:lstStyle/>
+                    <a:p>
+                      <a:pPr algn="ctr" fontAlgn="b"/>
+                      <a:r>
+                        <a:rPr lang="en-US" sz="1100" b="1" u="none" strike="noStrike">
+                          <a:effectLst/>
+                        </a:rPr>
+                        <a:t>P</a:t>
+                      </a:r>
+                      <a:endParaRPr lang="en-US" sz="1100" b="1" i="0" u="none" strike="noStrike">
+                        <a:solidFill>
+                          <a:srgbClr val="000000"/>
+                        </a:solidFill>
+                        <a:effectLst/>
+                        <a:latin typeface="Calibri" panose="020F0502020204030204" pitchFamily="34" charset="0"/>
+                      </a:endParaRPr>
+                    </a:p>
+                  </a:txBody>
+                  <a:tcPr marL="7620" marR="7620" marT="7620" marB="0" anchor="b"/>
+                </a:tc>
+                <a:tc>
+                  <a:txBody>
+                    <a:bodyPr/>
+                    <a:lstStyle/>
+                    <a:p>
+                      <a:pPr algn="ctr" fontAlgn="b"/>
+                      <a:r>
+                        <a:rPr lang="en-US" sz="1100" b="1" u="none" strike="noStrike">
+                          <a:effectLst/>
+                        </a:rPr>
+                        <a:t>P</a:t>
+                      </a:r>
+                      <a:endParaRPr lang="en-US" sz="1100" b="1" i="0" u="none" strike="noStrike">
+                        <a:solidFill>
+                          <a:srgbClr val="000000"/>
+                        </a:solidFill>
+                        <a:effectLst/>
+                        <a:latin typeface="Calibri" panose="020F0502020204030204" pitchFamily="34" charset="0"/>
+                      </a:endParaRPr>
+                    </a:p>
+                  </a:txBody>
+                  <a:tcPr marL="7620" marR="7620" marT="7620" marB="0" anchor="b"/>
+                </a:tc>
+                <a:tc>
+                  <a:txBody>
+                    <a:bodyPr/>
+                    <a:lstStyle/>
+                    <a:p>
+                      <a:pPr algn="ctr" fontAlgn="b"/>
+                      <a:r>
+                        <a:rPr lang="en-US" sz="1100" b="1" u="none" strike="noStrike">
+                          <a:effectLst/>
+                        </a:rPr>
+                        <a:t>P</a:t>
+                      </a:r>
+                      <a:endParaRPr lang="en-US" sz="1100" b="1" i="0" u="none" strike="noStrike">
+                        <a:solidFill>
+                          <a:srgbClr val="000000"/>
+                        </a:solidFill>
+                        <a:effectLst/>
+                        <a:latin typeface="Calibri" panose="020F0502020204030204" pitchFamily="34" charset="0"/>
+                      </a:endParaRPr>
+                    </a:p>
+                  </a:txBody>
+                  <a:tcPr marL="7620" marR="7620" marT="7620" marB="0" anchor="b"/>
+                </a:tc>
+                <a:tc>
+                  <a:txBody>
+                    <a:bodyPr/>
+                    <a:lstStyle/>
+                    <a:p>
+                      <a:pPr algn="ctr" fontAlgn="b"/>
+                      <a:r>
+                        <a:rPr lang="en-US" sz="1100" b="1" u="none" strike="noStrike">
+                          <a:effectLst/>
+                        </a:rPr>
+                        <a:t>P</a:t>
+                      </a:r>
+                      <a:endParaRPr lang="en-US" sz="1100" b="1" i="0" u="none" strike="noStrike">
+                        <a:solidFill>
+                          <a:srgbClr val="000000"/>
+                        </a:solidFill>
+                        <a:effectLst/>
+                        <a:latin typeface="Calibri" panose="020F0502020204030204" pitchFamily="34" charset="0"/>
+                      </a:endParaRPr>
+                    </a:p>
+                  </a:txBody>
+                  <a:tcPr marL="7620" marR="7620" marT="7620" marB="0" anchor="b"/>
+                </a:tc>
+                <a:tc>
+                  <a:txBody>
+                    <a:bodyPr/>
+                    <a:lstStyle/>
+                    <a:p>
+                      <a:pPr algn="ctr" fontAlgn="b"/>
+                      <a:r>
+                        <a:rPr lang="en-US" sz="1100" b="1" u="none" strike="noStrike">
+                          <a:effectLst/>
+                        </a:rPr>
+                        <a:t>P</a:t>
+                      </a:r>
+                      <a:endParaRPr lang="en-US" sz="1100" b="1" i="0" u="none" strike="noStrike">
+                        <a:solidFill>
+                          <a:srgbClr val="000000"/>
+                        </a:solidFill>
+                        <a:effectLst/>
+                        <a:latin typeface="Calibri" panose="020F0502020204030204" pitchFamily="34" charset="0"/>
+                      </a:endParaRPr>
+                    </a:p>
+                  </a:txBody>
+                  <a:tcPr marL="7620" marR="7620" marT="7620" marB="0" anchor="b"/>
+                </a:tc>
+                <a:tc>
+                  <a:txBody>
+                    <a:bodyPr/>
+                    <a:lstStyle/>
+                    <a:p>
+                      <a:pPr algn="ctr" fontAlgn="b"/>
+                      <a:r>
+                        <a:rPr lang="en-US" sz="1100" b="1" u="none" strike="noStrike">
+                          <a:effectLst/>
+                        </a:rPr>
+                        <a:t>P</a:t>
+                      </a:r>
+                      <a:endParaRPr lang="en-US" sz="1100" b="1" i="0" u="none" strike="noStrike">
+                        <a:solidFill>
+                          <a:srgbClr val="000000"/>
+                        </a:solidFill>
+                        <a:effectLst/>
+                        <a:latin typeface="Calibri" panose="020F0502020204030204" pitchFamily="34" charset="0"/>
+                      </a:endParaRPr>
+                    </a:p>
+                  </a:txBody>
+                  <a:tcPr marL="7620" marR="7620" marT="7620" marB="0" anchor="b"/>
+                </a:tc>
+                <a:extLst>
+                  <a:ext uri="{0D108BD9-81ED-4DB2-BD59-A6C34878D82A}">
+                    <a16:rowId xmlns:a16="http://schemas.microsoft.com/office/drawing/2014/main" val="1619102543"/>
+                  </a:ext>
+                </a:extLst>
+              </a:tr>
+              <a:tr h="298881">
+                <a:tc>
+                  <a:txBody>
+                    <a:bodyPr/>
+                    <a:lstStyle/>
+                    <a:p>
+                      <a:pPr algn="ctr" fontAlgn="b"/>
+                      <a:r>
+                        <a:rPr lang="en-US" sz="1100" b="1" u="none" strike="noStrike">
+                          <a:effectLst/>
+                        </a:rPr>
+                        <a:t>TFB</a:t>
+                      </a:r>
+                      <a:endParaRPr lang="en-US" sz="1100" b="1" i="0" u="none" strike="noStrike">
+                        <a:solidFill>
+                          <a:srgbClr val="000000"/>
+                        </a:solidFill>
+                        <a:effectLst/>
+                        <a:latin typeface="Calibri" panose="020F0502020204030204" pitchFamily="34" charset="0"/>
+                      </a:endParaRPr>
+                    </a:p>
+                  </a:txBody>
+                  <a:tcPr marL="7620" marR="7620" marT="7620" marB="0" anchor="b"/>
+                </a:tc>
+                <a:tc>
+                  <a:txBody>
+                    <a:bodyPr/>
+                    <a:lstStyle/>
+                    <a:p>
+                      <a:pPr algn="ctr" fontAlgn="b"/>
+                      <a:r>
+                        <a:rPr lang="en-US" sz="1100" b="1" u="none" strike="noStrike">
+                          <a:effectLst/>
+                        </a:rPr>
+                        <a:t>P</a:t>
+                      </a:r>
+                      <a:endParaRPr lang="en-US" sz="1100" b="1" i="0" u="none" strike="noStrike">
+                        <a:solidFill>
+                          <a:srgbClr val="000000"/>
+                        </a:solidFill>
+                        <a:effectLst/>
+                        <a:latin typeface="Calibri" panose="020F0502020204030204" pitchFamily="34" charset="0"/>
+                      </a:endParaRPr>
+                    </a:p>
+                  </a:txBody>
+                  <a:tcPr marL="7620" marR="7620" marT="7620" marB="0" anchor="b"/>
+                </a:tc>
+                <a:tc>
+                  <a:txBody>
+                    <a:bodyPr/>
+                    <a:lstStyle/>
+                    <a:p>
+                      <a:pPr algn="ctr" fontAlgn="ctr"/>
+                      <a:endParaRPr lang="en-US" sz="1100" b="1" u="none" strike="noStrike" dirty="0">
+                        <a:effectLst/>
+                      </a:endParaRPr>
+                    </a:p>
+                    <a:p>
+                      <a:pPr algn="ctr" fontAlgn="ctr"/>
+                      <a:r>
+                        <a:rPr lang="en-US" sz="1100" b="1" u="none" strike="noStrike" dirty="0">
+                          <a:effectLst/>
+                        </a:rPr>
+                        <a:t>P</a:t>
+                      </a:r>
+                      <a:endParaRPr lang="en-US" sz="1100" b="1" i="0" u="none" strike="noStrike" dirty="0">
+                        <a:solidFill>
+                          <a:srgbClr val="000000"/>
+                        </a:solidFill>
+                        <a:effectLst/>
+                        <a:latin typeface="Calibri" panose="020F0502020204030204" pitchFamily="34" charset="0"/>
+                      </a:endParaRPr>
+                    </a:p>
+                  </a:txBody>
+                  <a:tcPr marL="7620" marR="7620" marT="7620" marB="0" anchor="ctr"/>
+                </a:tc>
+                <a:tc>
+                  <a:txBody>
+                    <a:bodyPr/>
+                    <a:lstStyle/>
+                    <a:p>
+                      <a:pPr algn="ctr" fontAlgn="b"/>
+                      <a:r>
+                        <a:rPr lang="en-US" sz="1100" b="1" u="none" strike="noStrike">
+                          <a:effectLst/>
+                        </a:rPr>
+                        <a:t>P</a:t>
+                      </a:r>
+                      <a:endParaRPr lang="en-US" sz="1100" b="1" i="0" u="none" strike="noStrike">
+                        <a:solidFill>
+                          <a:srgbClr val="000000"/>
+                        </a:solidFill>
+                        <a:effectLst/>
+                        <a:latin typeface="Calibri" panose="020F0502020204030204" pitchFamily="34" charset="0"/>
+                      </a:endParaRPr>
+                    </a:p>
+                  </a:txBody>
+                  <a:tcPr marL="7620" marR="7620" marT="7620" marB="0" anchor="b"/>
+                </a:tc>
+                <a:tc>
+                  <a:txBody>
+                    <a:bodyPr/>
+                    <a:lstStyle/>
+                    <a:p>
+                      <a:pPr algn="ctr" fontAlgn="b"/>
+                      <a:r>
+                        <a:rPr lang="en-US" sz="1100" b="1" u="none" strike="noStrike" dirty="0">
+                          <a:effectLst/>
+                          <a:highlight>
+                            <a:srgbClr val="FFFF00"/>
+                          </a:highlight>
+                        </a:rPr>
+                        <a:t>F</a:t>
+                      </a:r>
+                      <a:endParaRPr lang="en-US" sz="1100" b="1" i="0" u="none" strike="noStrike" dirty="0">
+                        <a:solidFill>
+                          <a:srgbClr val="000000"/>
+                        </a:solidFill>
+                        <a:effectLst/>
+                        <a:highlight>
+                          <a:srgbClr val="FFFF00"/>
+                        </a:highlight>
+                        <a:latin typeface="Calibri" panose="020F0502020204030204" pitchFamily="34" charset="0"/>
+                      </a:endParaRPr>
+                    </a:p>
+                  </a:txBody>
+                  <a:tcPr marL="7620" marR="7620" marT="7620" marB="0" anchor="b"/>
+                </a:tc>
+                <a:tc>
+                  <a:txBody>
+                    <a:bodyPr/>
+                    <a:lstStyle/>
+                    <a:p>
+                      <a:pPr algn="ctr" fontAlgn="b"/>
+                      <a:r>
+                        <a:rPr lang="en-US" sz="1100" b="1" u="none" strike="noStrike" dirty="0">
+                          <a:effectLst/>
+                          <a:highlight>
+                            <a:srgbClr val="FFFF00"/>
+                          </a:highlight>
+                        </a:rPr>
+                        <a:t>F</a:t>
+                      </a:r>
+                      <a:endParaRPr lang="en-US" sz="1100" b="1" i="0" u="none" strike="noStrike" dirty="0">
+                        <a:solidFill>
+                          <a:srgbClr val="000000"/>
+                        </a:solidFill>
+                        <a:effectLst/>
+                        <a:highlight>
+                          <a:srgbClr val="FFFF00"/>
+                        </a:highlight>
+                        <a:latin typeface="Calibri" panose="020F0502020204030204" pitchFamily="34" charset="0"/>
+                      </a:endParaRPr>
+                    </a:p>
+                  </a:txBody>
+                  <a:tcPr marL="7620" marR="7620" marT="7620" marB="0" anchor="b"/>
+                </a:tc>
+                <a:tc>
+                  <a:txBody>
+                    <a:bodyPr/>
+                    <a:lstStyle/>
+                    <a:p>
+                      <a:pPr algn="ctr" fontAlgn="b"/>
+                      <a:r>
+                        <a:rPr lang="en-US" sz="1100" b="1" u="none" strike="noStrike" dirty="0">
+                          <a:effectLst/>
+                          <a:highlight>
+                            <a:srgbClr val="FFFF00"/>
+                          </a:highlight>
+                        </a:rPr>
+                        <a:t>F</a:t>
+                      </a:r>
+                      <a:endParaRPr lang="en-US" sz="1100" b="1" i="0" u="none" strike="noStrike" dirty="0">
+                        <a:solidFill>
+                          <a:srgbClr val="000000"/>
+                        </a:solidFill>
+                        <a:effectLst/>
+                        <a:highlight>
+                          <a:srgbClr val="FFFF00"/>
+                        </a:highlight>
+                        <a:latin typeface="Calibri" panose="020F0502020204030204" pitchFamily="34" charset="0"/>
+                      </a:endParaRPr>
+                    </a:p>
+                  </a:txBody>
+                  <a:tcPr marL="7620" marR="7620" marT="7620" marB="0" anchor="b"/>
+                </a:tc>
+                <a:tc>
+                  <a:txBody>
+                    <a:bodyPr/>
+                    <a:lstStyle/>
+                    <a:p>
+                      <a:pPr algn="ctr" fontAlgn="b"/>
+                      <a:r>
+                        <a:rPr lang="en-US" sz="1100" b="1" u="none" strike="noStrike">
+                          <a:effectLst/>
+                        </a:rPr>
+                        <a:t>P</a:t>
+                      </a:r>
+                      <a:endParaRPr lang="en-US" sz="1100" b="1" i="0" u="none" strike="noStrike">
+                        <a:solidFill>
+                          <a:srgbClr val="000000"/>
+                        </a:solidFill>
+                        <a:effectLst/>
+                        <a:latin typeface="Calibri" panose="020F0502020204030204" pitchFamily="34" charset="0"/>
+                      </a:endParaRPr>
+                    </a:p>
+                  </a:txBody>
+                  <a:tcPr marL="7620" marR="7620" marT="7620" marB="0" anchor="b"/>
+                </a:tc>
+                <a:tc>
+                  <a:txBody>
+                    <a:bodyPr/>
+                    <a:lstStyle/>
+                    <a:p>
+                      <a:pPr algn="ctr" fontAlgn="b"/>
+                      <a:r>
+                        <a:rPr lang="en-US" sz="1100" b="1" u="none" strike="noStrike">
+                          <a:effectLst/>
+                        </a:rPr>
+                        <a:t>P</a:t>
+                      </a:r>
+                      <a:endParaRPr lang="en-US" sz="1100" b="1" i="0" u="none" strike="noStrike">
+                        <a:solidFill>
+                          <a:srgbClr val="000000"/>
+                        </a:solidFill>
+                        <a:effectLst/>
+                        <a:latin typeface="Calibri" panose="020F0502020204030204" pitchFamily="34" charset="0"/>
+                      </a:endParaRPr>
+                    </a:p>
+                  </a:txBody>
+                  <a:tcPr marL="7620" marR="7620" marT="7620" marB="0" anchor="b"/>
+                </a:tc>
+                <a:tc>
+                  <a:txBody>
+                    <a:bodyPr/>
+                    <a:lstStyle/>
+                    <a:p>
+                      <a:pPr algn="ctr" fontAlgn="b"/>
+                      <a:r>
+                        <a:rPr lang="en-US" sz="1100" b="1" u="none" strike="noStrike">
+                          <a:effectLst/>
+                        </a:rPr>
+                        <a:t>P</a:t>
+                      </a:r>
+                      <a:endParaRPr lang="en-US" sz="1100" b="1" i="0" u="none" strike="noStrike">
+                        <a:solidFill>
+                          <a:srgbClr val="000000"/>
+                        </a:solidFill>
+                        <a:effectLst/>
+                        <a:latin typeface="Calibri" panose="020F0502020204030204" pitchFamily="34" charset="0"/>
+                      </a:endParaRPr>
+                    </a:p>
+                  </a:txBody>
+                  <a:tcPr marL="7620" marR="7620" marT="7620" marB="0" anchor="b"/>
+                </a:tc>
+                <a:tc>
+                  <a:txBody>
+                    <a:bodyPr/>
+                    <a:lstStyle/>
+                    <a:p>
+                      <a:pPr algn="ctr" fontAlgn="b"/>
+                      <a:r>
+                        <a:rPr lang="en-US" sz="1100" b="1" u="none" strike="noStrike">
+                          <a:effectLst/>
+                        </a:rPr>
+                        <a:t>P</a:t>
+                      </a:r>
+                      <a:endParaRPr lang="en-US" sz="1100" b="1" i="0" u="none" strike="noStrike">
+                        <a:solidFill>
+                          <a:srgbClr val="000000"/>
+                        </a:solidFill>
+                        <a:effectLst/>
+                        <a:latin typeface="Calibri" panose="020F0502020204030204" pitchFamily="34" charset="0"/>
+                      </a:endParaRPr>
+                    </a:p>
+                  </a:txBody>
+                  <a:tcPr marL="7620" marR="7620" marT="7620" marB="0" anchor="b"/>
+                </a:tc>
+                <a:tc>
+                  <a:txBody>
+                    <a:bodyPr/>
+                    <a:lstStyle/>
+                    <a:p>
+                      <a:pPr algn="ctr" fontAlgn="b"/>
+                      <a:r>
+                        <a:rPr lang="en-US" sz="1100" b="1" u="none" strike="noStrike">
+                          <a:effectLst/>
+                        </a:rPr>
+                        <a:t>P</a:t>
+                      </a:r>
+                      <a:endParaRPr lang="en-US" sz="1100" b="1" i="0" u="none" strike="noStrike">
+                        <a:solidFill>
+                          <a:srgbClr val="000000"/>
+                        </a:solidFill>
+                        <a:effectLst/>
+                        <a:latin typeface="Calibri" panose="020F0502020204030204" pitchFamily="34" charset="0"/>
+                      </a:endParaRPr>
+                    </a:p>
+                  </a:txBody>
+                  <a:tcPr marL="7620" marR="7620" marT="7620" marB="0" anchor="b"/>
+                </a:tc>
+                <a:tc>
+                  <a:txBody>
+                    <a:bodyPr/>
+                    <a:lstStyle/>
+                    <a:p>
+                      <a:pPr algn="ctr" fontAlgn="b"/>
+                      <a:r>
+                        <a:rPr lang="en-US" sz="1100" b="1" u="none" strike="noStrike">
+                          <a:effectLst/>
+                        </a:rPr>
+                        <a:t>P</a:t>
+                      </a:r>
+                      <a:endParaRPr lang="en-US" sz="1100" b="1" i="0" u="none" strike="noStrike">
+                        <a:solidFill>
+                          <a:srgbClr val="000000"/>
+                        </a:solidFill>
+                        <a:effectLst/>
+                        <a:latin typeface="Calibri" panose="020F0502020204030204" pitchFamily="34" charset="0"/>
+                      </a:endParaRPr>
+                    </a:p>
+                  </a:txBody>
+                  <a:tcPr marL="7620" marR="7620" marT="7620" marB="0" anchor="b"/>
+                </a:tc>
+                <a:tc>
+                  <a:txBody>
+                    <a:bodyPr/>
+                    <a:lstStyle/>
+                    <a:p>
+                      <a:pPr algn="ctr" fontAlgn="b"/>
+                      <a:r>
+                        <a:rPr lang="en-US" sz="1100" b="1" u="none" strike="noStrike">
+                          <a:effectLst/>
+                        </a:rPr>
+                        <a:t>P</a:t>
+                      </a:r>
+                      <a:endParaRPr lang="en-US" sz="1100" b="1" i="0" u="none" strike="noStrike">
+                        <a:solidFill>
+                          <a:srgbClr val="000000"/>
+                        </a:solidFill>
+                        <a:effectLst/>
+                        <a:latin typeface="Calibri" panose="020F0502020204030204" pitchFamily="34" charset="0"/>
+                      </a:endParaRPr>
+                    </a:p>
+                  </a:txBody>
+                  <a:tcPr marL="7620" marR="7620" marT="7620" marB="0" anchor="b"/>
+                </a:tc>
+                <a:tc>
+                  <a:txBody>
+                    <a:bodyPr/>
+                    <a:lstStyle/>
+                    <a:p>
+                      <a:pPr algn="ctr" fontAlgn="b"/>
+                      <a:r>
+                        <a:rPr lang="en-US" sz="1100" b="1" u="none" strike="noStrike">
+                          <a:effectLst/>
+                        </a:rPr>
+                        <a:t>P</a:t>
+                      </a:r>
+                      <a:endParaRPr lang="en-US" sz="1100" b="1" i="0" u="none" strike="noStrike">
+                        <a:solidFill>
+                          <a:srgbClr val="000000"/>
+                        </a:solidFill>
+                        <a:effectLst/>
+                        <a:latin typeface="Calibri" panose="020F0502020204030204" pitchFamily="34" charset="0"/>
+                      </a:endParaRPr>
+                    </a:p>
+                  </a:txBody>
+                  <a:tcPr marL="7620" marR="7620" marT="7620" marB="0" anchor="b"/>
+                </a:tc>
+                <a:tc>
+                  <a:txBody>
+                    <a:bodyPr/>
+                    <a:lstStyle/>
+                    <a:p>
+                      <a:pPr algn="ctr" fontAlgn="b"/>
+                      <a:r>
+                        <a:rPr lang="en-US" sz="1100" b="1" u="none" strike="noStrike" dirty="0">
+                          <a:effectLst/>
+                          <a:highlight>
+                            <a:srgbClr val="FFFF00"/>
+                          </a:highlight>
+                        </a:rPr>
+                        <a:t>F</a:t>
+                      </a:r>
+                      <a:endParaRPr lang="en-US" sz="1100" b="1" i="0" u="none" strike="noStrike" dirty="0">
+                        <a:solidFill>
+                          <a:srgbClr val="000000"/>
+                        </a:solidFill>
+                        <a:effectLst/>
+                        <a:highlight>
+                          <a:srgbClr val="FFFF00"/>
+                        </a:highlight>
+                        <a:latin typeface="Calibri" panose="020F0502020204030204" pitchFamily="34" charset="0"/>
+                      </a:endParaRPr>
+                    </a:p>
+                  </a:txBody>
+                  <a:tcPr marL="7620" marR="7620" marT="7620" marB="0" anchor="b"/>
+                </a:tc>
+                <a:extLst>
+                  <a:ext uri="{0D108BD9-81ED-4DB2-BD59-A6C34878D82A}">
+                    <a16:rowId xmlns:a16="http://schemas.microsoft.com/office/drawing/2014/main" val="2707276461"/>
+                  </a:ext>
+                </a:extLst>
+              </a:tr>
+            </a:tbl>
+          </a:graphicData>
+        </a:graphic>
+      </p:graphicFrame>
     </p:spTree>
     <p:extLst>
       <p:ext uri="{BB962C8B-B14F-4D97-AF65-F5344CB8AC3E}">
@@ -7942,13 +10026,7 @@
           <a:p>
             <a:r>
               <a:rPr lang="en-US" dirty="0"/>
-              <a:t>Calculate components failure entropy for all components.</a:t>
-            </a:r>
-          </a:p>
-          <a:p>
-            <a:r>
-              <a:rPr lang="en-US" dirty="0"/>
-              <a:t>Calculate components failure entropy for each test.</a:t>
+              <a:t>Calculate components entropy for all components.</a:t>
             </a:r>
           </a:p>
           <a:p>
@@ -7969,6 +10047,12 @@
             <a:r>
               <a:rPr lang="en-US" dirty="0"/>
               <a:t>. </a:t>
+            </a:r>
+          </a:p>
+          <a:p>
+            <a:r>
+              <a:rPr lang="en-US" dirty="0"/>
+              <a:t>Calculate components entropy after test simulation(for fail and pass outcome).</a:t>
             </a:r>
           </a:p>
           <a:p>
@@ -8119,6 +10203,29 @@
             <a:r>
               <a:rPr lang="en-US" altLang="en-US" dirty="0"/>
               <a:t>(test)</a:t>
+            </a:r>
+          </a:p>
+          <a:p>
+            <a:pPr marL="0" indent="0">
+              <a:buNone/>
+            </a:pPr>
+            <a:endParaRPr lang="en-US" altLang="en-US" dirty="0"/>
+          </a:p>
+          <a:p>
+            <a:pPr marL="0" indent="0">
+              <a:buNone/>
+            </a:pPr>
+            <a:r>
+              <a:rPr lang="en-US" altLang="en-US" dirty="0"/>
+              <a:t>Entropy calculated on all </a:t>
+            </a:r>
+            <a:r>
+              <a:rPr lang="en-US" altLang="en-US" dirty="0" err="1"/>
+              <a:t>componenets</a:t>
+            </a:r>
+            <a:r>
+              <a:rPr lang="en-US" altLang="en-US" dirty="0"/>
+              <a:t>.</a:t>
             </a:r>
           </a:p>
           <a:p>

</xml_diff>

<commit_message>
calculate new general entropy in each round and finish PPT
</commit_message>
<xml_diff>
--- a/Test Set Optimization.pptx
+++ b/Test Set Optimization.pptx
@@ -17,7 +17,9 @@
     <p:sldId id="274" r:id="rId11"/>
     <p:sldId id="275" r:id="rId12"/>
     <p:sldId id="277" r:id="rId13"/>
-    <p:sldId id="267" r:id="rId14"/>
+    <p:sldId id="278" r:id="rId14"/>
+    <p:sldId id="279" r:id="rId15"/>
+    <p:sldId id="267" r:id="rId16"/>
   </p:sldIdLst>
   <p:sldSz cx="12192000" cy="6858000"/>
   <p:notesSz cx="6858000" cy="9144000"/>
@@ -126,6 +128,1823 @@
 
 <file path=ppt/revisionInfo.xml><?xml version="1.0" encoding="utf-8"?>
 <p1510:revInfo xmlns:a="http://schemas.openxmlformats.org/drawingml/2006/main" xmlns:r="http://schemas.openxmlformats.org/officeDocument/2006/relationships" xmlns:p1510="http://schemas.microsoft.com/office/powerpoint/2015/10/main"/>
+</file>
+
+<file path=ppt/charts/chart1.xml><?xml version="1.0" encoding="utf-8"?>
+<c:chartSpace xmlns:c="http://schemas.openxmlformats.org/drawingml/2006/chart" xmlns:a="http://schemas.openxmlformats.org/drawingml/2006/main" xmlns:r="http://schemas.openxmlformats.org/officeDocument/2006/relationships" xmlns:c16r2="http://schemas.microsoft.com/office/drawing/2015/06/chart">
+  <c:date1904 val="0"/>
+  <c:lang val="en-US"/>
+  <c:roundedCorners val="0"/>
+  <mc:AlternateContent xmlns:mc="http://schemas.openxmlformats.org/markup-compatibility/2006">
+    <mc:Choice xmlns:c14="http://schemas.microsoft.com/office/drawing/2007/8/2/chart" Requires="c14">
+      <c14:style val="102"/>
+    </mc:Choice>
+    <mc:Fallback>
+      <c:style val="2"/>
+    </mc:Fallback>
+  </mc:AlternateContent>
+  <c:pivotSource>
+    <c:name>[Presentation.xlsx]Sheet4!PivotTable1</c:name>
+    <c:fmtId val="3"/>
+  </c:pivotSource>
+  <c:chart>
+    <c:autoTitleDeleted val="0"/>
+    <c:pivotFmts>
+      <c:pivotFmt>
+        <c:idx val="0"/>
+      </c:pivotFmt>
+      <c:pivotFmt>
+        <c:idx val="1"/>
+      </c:pivotFmt>
+      <c:pivotFmt>
+        <c:idx val="2"/>
+      </c:pivotFmt>
+      <c:pivotFmt>
+        <c:idx val="3"/>
+      </c:pivotFmt>
+      <c:pivotFmt>
+        <c:idx val="4"/>
+        <c:spPr>
+          <a:gradFill rotWithShape="1">
+            <a:gsLst>
+              <a:gs pos="0">
+                <a:schemeClr val="accent1">
+                  <a:satMod val="103000"/>
+                  <a:lumMod val="102000"/>
+                  <a:tint val="94000"/>
+                </a:schemeClr>
+              </a:gs>
+              <a:gs pos="50000">
+                <a:schemeClr val="accent1">
+                  <a:satMod val="110000"/>
+                  <a:lumMod val="100000"/>
+                  <a:shade val="100000"/>
+                </a:schemeClr>
+              </a:gs>
+              <a:gs pos="100000">
+                <a:schemeClr val="accent1">
+                  <a:lumMod val="99000"/>
+                  <a:satMod val="120000"/>
+                  <a:shade val="78000"/>
+                </a:schemeClr>
+              </a:gs>
+            </a:gsLst>
+            <a:lin ang="5400000" scaled="0"/>
+          </a:gradFill>
+          <a:ln w="34925" cap="rnd">
+            <a:solidFill>
+              <a:schemeClr val="accent1"/>
+            </a:solidFill>
+            <a:round/>
+          </a:ln>
+          <a:effectLst>
+            <a:outerShdw blurRad="57150" dist="19050" dir="5400000" algn="ctr" rotWithShape="0">
+              <a:srgbClr val="000000">
+                <a:alpha val="63000"/>
+              </a:srgbClr>
+            </a:outerShdw>
+          </a:effectLst>
+        </c:spPr>
+        <c:marker>
+          <c:symbol val="circle"/>
+          <c:size val="6"/>
+          <c:spPr>
+            <a:gradFill rotWithShape="1">
+              <a:gsLst>
+                <a:gs pos="0">
+                  <a:schemeClr val="accent1">
+                    <a:satMod val="103000"/>
+                    <a:lumMod val="102000"/>
+                    <a:tint val="94000"/>
+                  </a:schemeClr>
+                </a:gs>
+                <a:gs pos="50000">
+                  <a:schemeClr val="accent1">
+                    <a:satMod val="110000"/>
+                    <a:lumMod val="100000"/>
+                    <a:shade val="100000"/>
+                  </a:schemeClr>
+                </a:gs>
+                <a:gs pos="100000">
+                  <a:schemeClr val="accent1">
+                    <a:lumMod val="99000"/>
+                    <a:satMod val="120000"/>
+                    <a:shade val="78000"/>
+                  </a:schemeClr>
+                </a:gs>
+              </a:gsLst>
+              <a:lin ang="5400000" scaled="0"/>
+            </a:gradFill>
+            <a:ln w="9525">
+              <a:solidFill>
+                <a:schemeClr val="accent1"/>
+              </a:solidFill>
+              <a:round/>
+            </a:ln>
+            <a:effectLst>
+              <a:outerShdw blurRad="57150" dist="19050" dir="5400000" algn="ctr" rotWithShape="0">
+                <a:srgbClr val="000000">
+                  <a:alpha val="63000"/>
+                </a:srgbClr>
+              </a:outerShdw>
+            </a:effectLst>
+          </c:spPr>
+        </c:marker>
+      </c:pivotFmt>
+      <c:pivotFmt>
+        <c:idx val="5"/>
+        <c:spPr>
+          <a:gradFill rotWithShape="1">
+            <a:gsLst>
+              <a:gs pos="0">
+                <a:schemeClr val="accent1">
+                  <a:satMod val="103000"/>
+                  <a:lumMod val="102000"/>
+                  <a:tint val="94000"/>
+                </a:schemeClr>
+              </a:gs>
+              <a:gs pos="50000">
+                <a:schemeClr val="accent1">
+                  <a:satMod val="110000"/>
+                  <a:lumMod val="100000"/>
+                  <a:shade val="100000"/>
+                </a:schemeClr>
+              </a:gs>
+              <a:gs pos="100000">
+                <a:schemeClr val="accent1">
+                  <a:lumMod val="99000"/>
+                  <a:satMod val="120000"/>
+                  <a:shade val="78000"/>
+                </a:schemeClr>
+              </a:gs>
+            </a:gsLst>
+            <a:lin ang="5400000" scaled="0"/>
+          </a:gradFill>
+          <a:ln w="34925" cap="rnd">
+            <a:solidFill>
+              <a:schemeClr val="accent1"/>
+            </a:solidFill>
+            <a:round/>
+          </a:ln>
+          <a:effectLst>
+            <a:outerShdw blurRad="57150" dist="19050" dir="5400000" algn="ctr" rotWithShape="0">
+              <a:srgbClr val="000000">
+                <a:alpha val="63000"/>
+              </a:srgbClr>
+            </a:outerShdw>
+          </a:effectLst>
+        </c:spPr>
+        <c:marker>
+          <c:symbol val="circle"/>
+          <c:size val="6"/>
+          <c:spPr>
+            <a:gradFill rotWithShape="1">
+              <a:gsLst>
+                <a:gs pos="0">
+                  <a:schemeClr val="accent2">
+                    <a:satMod val="103000"/>
+                    <a:lumMod val="102000"/>
+                    <a:tint val="94000"/>
+                  </a:schemeClr>
+                </a:gs>
+                <a:gs pos="50000">
+                  <a:schemeClr val="accent2">
+                    <a:satMod val="110000"/>
+                    <a:lumMod val="100000"/>
+                    <a:shade val="100000"/>
+                  </a:schemeClr>
+                </a:gs>
+                <a:gs pos="100000">
+                  <a:schemeClr val="accent2">
+                    <a:lumMod val="99000"/>
+                    <a:satMod val="120000"/>
+                    <a:shade val="78000"/>
+                  </a:schemeClr>
+                </a:gs>
+              </a:gsLst>
+              <a:lin ang="5400000" scaled="0"/>
+            </a:gradFill>
+            <a:ln w="9525">
+              <a:solidFill>
+                <a:schemeClr val="accent2"/>
+              </a:solidFill>
+              <a:round/>
+            </a:ln>
+            <a:effectLst>
+              <a:outerShdw blurRad="57150" dist="19050" dir="5400000" algn="ctr" rotWithShape="0">
+                <a:srgbClr val="000000">
+                  <a:alpha val="63000"/>
+                </a:srgbClr>
+              </a:outerShdw>
+            </a:effectLst>
+          </c:spPr>
+        </c:marker>
+      </c:pivotFmt>
+      <c:pivotFmt>
+        <c:idx val="6"/>
+        <c:spPr>
+          <a:blipFill rotWithShape="1">
+            <a:blip xmlns:r="http://schemas.openxmlformats.org/officeDocument/2006/relationships" r:embed="rId3">
+              <a:duotone>
+                <a:schemeClr val="accent1">
+                  <a:shade val="36000"/>
+                  <a:satMod val="120000"/>
+                </a:schemeClr>
+                <a:schemeClr val="accent1">
+                  <a:tint val="40000"/>
+                </a:schemeClr>
+              </a:duotone>
+            </a:blip>
+            <a:tile tx="0" ty="0" sx="60000" sy="59000" flip="none" algn="tl"/>
+          </a:blipFill>
+          <a:ln w="34925" cap="rnd">
+            <a:solidFill>
+              <a:schemeClr val="accent1"/>
+            </a:solidFill>
+            <a:round/>
+          </a:ln>
+          <a:effectLst>
+            <a:outerShdw blurRad="57150" dist="19050" dir="5400000" algn="ctr" rotWithShape="0">
+              <a:srgbClr val="000000">
+                <a:alpha val="63000"/>
+              </a:srgbClr>
+            </a:outerShdw>
+          </a:effectLst>
+        </c:spPr>
+        <c:marker>
+          <c:symbol val="circle"/>
+          <c:size val="6"/>
+          <c:spPr>
+            <a:gradFill rotWithShape="1">
+              <a:gsLst>
+                <a:gs pos="0">
+                  <a:schemeClr val="accent1">
+                    <a:satMod val="103000"/>
+                    <a:lumMod val="102000"/>
+                    <a:tint val="94000"/>
+                  </a:schemeClr>
+                </a:gs>
+                <a:gs pos="50000">
+                  <a:schemeClr val="accent1">
+                    <a:satMod val="110000"/>
+                    <a:lumMod val="100000"/>
+                    <a:shade val="100000"/>
+                  </a:schemeClr>
+                </a:gs>
+                <a:gs pos="100000">
+                  <a:schemeClr val="accent1">
+                    <a:lumMod val="99000"/>
+                    <a:satMod val="120000"/>
+                    <a:shade val="78000"/>
+                  </a:schemeClr>
+                </a:gs>
+              </a:gsLst>
+              <a:lin ang="5400000" scaled="0"/>
+            </a:gradFill>
+            <a:ln w="9525">
+              <a:solidFill>
+                <a:schemeClr val="accent1"/>
+              </a:solidFill>
+              <a:round/>
+            </a:ln>
+            <a:effectLst>
+              <a:outerShdw blurRad="57150" dist="19050" dir="5400000" algn="ctr" rotWithShape="0">
+                <a:srgbClr val="000000">
+                  <a:alpha val="63000"/>
+                </a:srgbClr>
+              </a:outerShdw>
+            </a:effectLst>
+          </c:spPr>
+        </c:marker>
+      </c:pivotFmt>
+      <c:pivotFmt>
+        <c:idx val="7"/>
+        <c:spPr>
+          <a:blipFill rotWithShape="1">
+            <a:blip xmlns:r="http://schemas.openxmlformats.org/officeDocument/2006/relationships" r:embed="rId3">
+              <a:duotone>
+                <a:schemeClr val="accent1">
+                  <a:shade val="36000"/>
+                  <a:satMod val="120000"/>
+                </a:schemeClr>
+                <a:schemeClr val="accent1">
+                  <a:tint val="40000"/>
+                </a:schemeClr>
+              </a:duotone>
+            </a:blip>
+            <a:tile tx="0" ty="0" sx="60000" sy="59000" flip="none" algn="tl"/>
+          </a:blipFill>
+          <a:ln w="34925" cap="rnd">
+            <a:solidFill>
+              <a:schemeClr val="accent1"/>
+            </a:solidFill>
+            <a:round/>
+          </a:ln>
+          <a:effectLst>
+            <a:outerShdw blurRad="57150" dist="19050" dir="5400000" algn="ctr" rotWithShape="0">
+              <a:srgbClr val="000000">
+                <a:alpha val="63000"/>
+              </a:srgbClr>
+            </a:outerShdw>
+          </a:effectLst>
+        </c:spPr>
+        <c:marker>
+          <c:symbol val="circle"/>
+          <c:size val="6"/>
+          <c:spPr>
+            <a:gradFill rotWithShape="1">
+              <a:gsLst>
+                <a:gs pos="0">
+                  <a:schemeClr val="accent2">
+                    <a:satMod val="103000"/>
+                    <a:lumMod val="102000"/>
+                    <a:tint val="94000"/>
+                  </a:schemeClr>
+                </a:gs>
+                <a:gs pos="50000">
+                  <a:schemeClr val="accent2">
+                    <a:satMod val="110000"/>
+                    <a:lumMod val="100000"/>
+                    <a:shade val="100000"/>
+                  </a:schemeClr>
+                </a:gs>
+                <a:gs pos="100000">
+                  <a:schemeClr val="accent2">
+                    <a:lumMod val="99000"/>
+                    <a:satMod val="120000"/>
+                    <a:shade val="78000"/>
+                  </a:schemeClr>
+                </a:gs>
+              </a:gsLst>
+              <a:lin ang="5400000" scaled="0"/>
+            </a:gradFill>
+            <a:ln w="9525">
+              <a:solidFill>
+                <a:schemeClr val="accent2"/>
+              </a:solidFill>
+              <a:round/>
+            </a:ln>
+            <a:effectLst>
+              <a:outerShdw blurRad="57150" dist="19050" dir="5400000" algn="ctr" rotWithShape="0">
+                <a:srgbClr val="000000">
+                  <a:alpha val="63000"/>
+                </a:srgbClr>
+              </a:outerShdw>
+            </a:effectLst>
+          </c:spPr>
+        </c:marker>
+      </c:pivotFmt>
+    </c:pivotFmts>
+    <c:plotArea>
+      <c:layout>
+        <c:manualLayout>
+          <c:layoutTarget val="inner"/>
+          <c:xMode val="edge"/>
+          <c:yMode val="edge"/>
+          <c:x val="4.2441119472039386E-2"/>
+          <c:y val="0.13786818314377369"/>
+          <c:w val="0.81635996997049431"/>
+          <c:h val="0.65853091280256637"/>
+        </c:manualLayout>
+      </c:layout>
+      <c:lineChart>
+        <c:grouping val="standard"/>
+        <c:varyColors val="0"/>
+        <c:ser>
+          <c:idx val="0"/>
+          <c:order val="0"/>
+          <c:tx>
+            <c:strRef>
+              <c:f>Sheet4!$B$1</c:f>
+              <c:strCache>
+                <c:ptCount val="1"/>
+                <c:pt idx="0">
+                  <c:v>TFB Bugs</c:v>
+                </c:pt>
+              </c:strCache>
+            </c:strRef>
+          </c:tx>
+          <c:spPr>
+            <a:ln w="34925" cap="rnd">
+              <a:solidFill>
+                <a:schemeClr val="accent1"/>
+              </a:solidFill>
+              <a:round/>
+            </a:ln>
+            <a:effectLst>
+              <a:outerShdw blurRad="57150" dist="19050" dir="5400000" algn="ctr" rotWithShape="0">
+                <a:srgbClr val="000000">
+                  <a:alpha val="63000"/>
+                </a:srgbClr>
+              </a:outerShdw>
+            </a:effectLst>
+          </c:spPr>
+          <c:marker>
+            <c:symbol val="circle"/>
+            <c:size val="6"/>
+            <c:spPr>
+              <a:gradFill rotWithShape="1">
+                <a:gsLst>
+                  <a:gs pos="0">
+                    <a:schemeClr val="accent1">
+                      <a:satMod val="103000"/>
+                      <a:lumMod val="102000"/>
+                      <a:tint val="94000"/>
+                    </a:schemeClr>
+                  </a:gs>
+                  <a:gs pos="50000">
+                    <a:schemeClr val="accent1">
+                      <a:satMod val="110000"/>
+                      <a:lumMod val="100000"/>
+                      <a:shade val="100000"/>
+                    </a:schemeClr>
+                  </a:gs>
+                  <a:gs pos="100000">
+                    <a:schemeClr val="accent1">
+                      <a:lumMod val="99000"/>
+                      <a:satMod val="120000"/>
+                      <a:shade val="78000"/>
+                    </a:schemeClr>
+                  </a:gs>
+                </a:gsLst>
+                <a:lin ang="5400000" scaled="0"/>
+              </a:gradFill>
+              <a:ln w="9525">
+                <a:solidFill>
+                  <a:schemeClr val="accent1"/>
+                </a:solidFill>
+                <a:round/>
+              </a:ln>
+              <a:effectLst>
+                <a:outerShdw blurRad="57150" dist="19050" dir="5400000" algn="ctr" rotWithShape="0">
+                  <a:srgbClr val="000000">
+                    <a:alpha val="63000"/>
+                  </a:srgbClr>
+                </a:outerShdw>
+              </a:effectLst>
+            </c:spPr>
+          </c:marker>
+          <c:cat>
+            <c:strRef>
+              <c:f>Sheet4!$A$2:$A$17</c:f>
+              <c:strCache>
+                <c:ptCount val="15"/>
+                <c:pt idx="0">
+                  <c:v>1</c:v>
+                </c:pt>
+                <c:pt idx="1">
+                  <c:v>2</c:v>
+                </c:pt>
+                <c:pt idx="2">
+                  <c:v>3</c:v>
+                </c:pt>
+                <c:pt idx="3">
+                  <c:v>4</c:v>
+                </c:pt>
+                <c:pt idx="4">
+                  <c:v>5</c:v>
+                </c:pt>
+                <c:pt idx="5">
+                  <c:v>6</c:v>
+                </c:pt>
+                <c:pt idx="6">
+                  <c:v>7</c:v>
+                </c:pt>
+                <c:pt idx="7">
+                  <c:v>8</c:v>
+                </c:pt>
+                <c:pt idx="8">
+                  <c:v>9</c:v>
+                </c:pt>
+                <c:pt idx="9">
+                  <c:v>10</c:v>
+                </c:pt>
+                <c:pt idx="10">
+                  <c:v>11</c:v>
+                </c:pt>
+                <c:pt idx="11">
+                  <c:v>12</c:v>
+                </c:pt>
+                <c:pt idx="12">
+                  <c:v>13</c:v>
+                </c:pt>
+                <c:pt idx="13">
+                  <c:v>14</c:v>
+                </c:pt>
+                <c:pt idx="14">
+                  <c:v>15</c:v>
+                </c:pt>
+              </c:strCache>
+            </c:strRef>
+          </c:cat>
+          <c:val>
+            <c:numRef>
+              <c:f>Sheet4!$B$2:$B$17</c:f>
+              <c:numCache>
+                <c:formatCode>General</c:formatCode>
+                <c:ptCount val="15"/>
+                <c:pt idx="0">
+                  <c:v>0</c:v>
+                </c:pt>
+                <c:pt idx="1">
+                  <c:v>0</c:v>
+                </c:pt>
+                <c:pt idx="2">
+                  <c:v>0</c:v>
+                </c:pt>
+                <c:pt idx="3">
+                  <c:v>1</c:v>
+                </c:pt>
+                <c:pt idx="4">
+                  <c:v>2</c:v>
+                </c:pt>
+                <c:pt idx="5">
+                  <c:v>3</c:v>
+                </c:pt>
+                <c:pt idx="6">
+                  <c:v>3</c:v>
+                </c:pt>
+                <c:pt idx="7">
+                  <c:v>3</c:v>
+                </c:pt>
+                <c:pt idx="8">
+                  <c:v>3</c:v>
+                </c:pt>
+                <c:pt idx="9">
+                  <c:v>3</c:v>
+                </c:pt>
+                <c:pt idx="10">
+                  <c:v>3</c:v>
+                </c:pt>
+                <c:pt idx="11">
+                  <c:v>3</c:v>
+                </c:pt>
+                <c:pt idx="12">
+                  <c:v>3</c:v>
+                </c:pt>
+                <c:pt idx="13">
+                  <c:v>3</c:v>
+                </c:pt>
+                <c:pt idx="14">
+                  <c:v>4</c:v>
+                </c:pt>
+              </c:numCache>
+            </c:numRef>
+          </c:val>
+          <c:smooth val="0"/>
+          <c:extLst>
+            <c:ext xmlns:c16="http://schemas.microsoft.com/office/drawing/2014/chart" uri="{C3380CC4-5D6E-409C-BE32-E72D297353CC}">
+              <c16:uniqueId val="{00000000-EA13-4A7B-A01D-61AAFB6F3E56}"/>
+            </c:ext>
+          </c:extLst>
+        </c:ser>
+        <c:ser>
+          <c:idx val="1"/>
+          <c:order val="1"/>
+          <c:tx>
+            <c:strRef>
+              <c:f>Sheet4!$C$1</c:f>
+              <c:strCache>
+                <c:ptCount val="1"/>
+                <c:pt idx="0">
+                  <c:v>IG Bugs</c:v>
+                </c:pt>
+              </c:strCache>
+            </c:strRef>
+          </c:tx>
+          <c:spPr>
+            <a:ln w="34925" cap="rnd">
+              <a:solidFill>
+                <a:schemeClr val="accent2"/>
+              </a:solidFill>
+              <a:round/>
+            </a:ln>
+            <a:effectLst>
+              <a:outerShdw blurRad="57150" dist="19050" dir="5400000" algn="ctr" rotWithShape="0">
+                <a:srgbClr val="000000">
+                  <a:alpha val="63000"/>
+                </a:srgbClr>
+              </a:outerShdw>
+            </a:effectLst>
+          </c:spPr>
+          <c:marker>
+            <c:symbol val="circle"/>
+            <c:size val="6"/>
+            <c:spPr>
+              <a:gradFill rotWithShape="1">
+                <a:gsLst>
+                  <a:gs pos="0">
+                    <a:schemeClr val="accent2">
+                      <a:satMod val="103000"/>
+                      <a:lumMod val="102000"/>
+                      <a:tint val="94000"/>
+                    </a:schemeClr>
+                  </a:gs>
+                  <a:gs pos="50000">
+                    <a:schemeClr val="accent2">
+                      <a:satMod val="110000"/>
+                      <a:lumMod val="100000"/>
+                      <a:shade val="100000"/>
+                    </a:schemeClr>
+                  </a:gs>
+                  <a:gs pos="100000">
+                    <a:schemeClr val="accent2">
+                      <a:lumMod val="99000"/>
+                      <a:satMod val="120000"/>
+                      <a:shade val="78000"/>
+                    </a:schemeClr>
+                  </a:gs>
+                </a:gsLst>
+                <a:lin ang="5400000" scaled="0"/>
+              </a:gradFill>
+              <a:ln w="9525">
+                <a:solidFill>
+                  <a:schemeClr val="accent2"/>
+                </a:solidFill>
+                <a:round/>
+              </a:ln>
+              <a:effectLst>
+                <a:outerShdw blurRad="57150" dist="19050" dir="5400000" algn="ctr" rotWithShape="0">
+                  <a:srgbClr val="000000">
+                    <a:alpha val="63000"/>
+                  </a:srgbClr>
+                </a:outerShdw>
+              </a:effectLst>
+            </c:spPr>
+          </c:marker>
+          <c:cat>
+            <c:strRef>
+              <c:f>Sheet4!$A$2:$A$17</c:f>
+              <c:strCache>
+                <c:ptCount val="15"/>
+                <c:pt idx="0">
+                  <c:v>1</c:v>
+                </c:pt>
+                <c:pt idx="1">
+                  <c:v>2</c:v>
+                </c:pt>
+                <c:pt idx="2">
+                  <c:v>3</c:v>
+                </c:pt>
+                <c:pt idx="3">
+                  <c:v>4</c:v>
+                </c:pt>
+                <c:pt idx="4">
+                  <c:v>5</c:v>
+                </c:pt>
+                <c:pt idx="5">
+                  <c:v>6</c:v>
+                </c:pt>
+                <c:pt idx="6">
+                  <c:v>7</c:v>
+                </c:pt>
+                <c:pt idx="7">
+                  <c:v>8</c:v>
+                </c:pt>
+                <c:pt idx="8">
+                  <c:v>9</c:v>
+                </c:pt>
+                <c:pt idx="9">
+                  <c:v>10</c:v>
+                </c:pt>
+                <c:pt idx="10">
+                  <c:v>11</c:v>
+                </c:pt>
+                <c:pt idx="11">
+                  <c:v>12</c:v>
+                </c:pt>
+                <c:pt idx="12">
+                  <c:v>13</c:v>
+                </c:pt>
+                <c:pt idx="13">
+                  <c:v>14</c:v>
+                </c:pt>
+                <c:pt idx="14">
+                  <c:v>15</c:v>
+                </c:pt>
+              </c:strCache>
+            </c:strRef>
+          </c:cat>
+          <c:val>
+            <c:numRef>
+              <c:f>Sheet4!$C$2:$C$17</c:f>
+              <c:numCache>
+                <c:formatCode>General</c:formatCode>
+                <c:ptCount val="15"/>
+                <c:pt idx="0">
+                  <c:v>1</c:v>
+                </c:pt>
+                <c:pt idx="1">
+                  <c:v>2</c:v>
+                </c:pt>
+                <c:pt idx="2">
+                  <c:v>3</c:v>
+                </c:pt>
+                <c:pt idx="3">
+                  <c:v>4</c:v>
+                </c:pt>
+                <c:pt idx="4">
+                  <c:v>4</c:v>
+                </c:pt>
+                <c:pt idx="5">
+                  <c:v>4</c:v>
+                </c:pt>
+                <c:pt idx="6">
+                  <c:v>4</c:v>
+                </c:pt>
+                <c:pt idx="7">
+                  <c:v>4</c:v>
+                </c:pt>
+                <c:pt idx="8">
+                  <c:v>4</c:v>
+                </c:pt>
+                <c:pt idx="9">
+                  <c:v>4</c:v>
+                </c:pt>
+                <c:pt idx="10">
+                  <c:v>4</c:v>
+                </c:pt>
+                <c:pt idx="11">
+                  <c:v>4</c:v>
+                </c:pt>
+                <c:pt idx="12">
+                  <c:v>4</c:v>
+                </c:pt>
+                <c:pt idx="13">
+                  <c:v>4</c:v>
+                </c:pt>
+                <c:pt idx="14">
+                  <c:v>4</c:v>
+                </c:pt>
+              </c:numCache>
+            </c:numRef>
+          </c:val>
+          <c:smooth val="0"/>
+          <c:extLst>
+            <c:ext xmlns:c16="http://schemas.microsoft.com/office/drawing/2014/chart" uri="{C3380CC4-5D6E-409C-BE32-E72D297353CC}">
+              <c16:uniqueId val="{00000001-EA13-4A7B-A01D-61AAFB6F3E56}"/>
+            </c:ext>
+          </c:extLst>
+        </c:ser>
+        <c:dLbls>
+          <c:showLegendKey val="0"/>
+          <c:showVal val="0"/>
+          <c:showCatName val="0"/>
+          <c:showSerName val="0"/>
+          <c:showPercent val="0"/>
+          <c:showBubbleSize val="0"/>
+        </c:dLbls>
+        <c:marker val="1"/>
+        <c:smooth val="0"/>
+        <c:axId val="496137008"/>
+        <c:axId val="496136352"/>
+      </c:lineChart>
+      <c:catAx>
+        <c:axId val="496137008"/>
+        <c:scaling>
+          <c:orientation val="minMax"/>
+        </c:scaling>
+        <c:delete val="0"/>
+        <c:axPos val="b"/>
+        <c:numFmt formatCode="General" sourceLinked="1"/>
+        <c:majorTickMark val="none"/>
+        <c:minorTickMark val="none"/>
+        <c:tickLblPos val="nextTo"/>
+        <c:spPr>
+          <a:noFill/>
+          <a:ln w="9525" cap="flat" cmpd="sng" algn="ctr">
+            <a:solidFill>
+              <a:schemeClr val="lt1">
+                <a:lumMod val="95000"/>
+                <a:alpha val="10000"/>
+              </a:schemeClr>
+            </a:solidFill>
+            <a:round/>
+          </a:ln>
+          <a:effectLst/>
+        </c:spPr>
+        <c:txPr>
+          <a:bodyPr rot="-60000000" spcFirstLastPara="1" vertOverflow="ellipsis" vert="horz" wrap="square" anchor="ctr" anchorCtr="1"/>
+          <a:lstStyle/>
+          <a:p>
+            <a:pPr>
+              <a:defRPr sz="900" b="0" i="0" u="none" strike="noStrike" kern="1200" baseline="0">
+                <a:solidFill>
+                  <a:schemeClr val="lt1">
+                    <a:lumMod val="85000"/>
+                  </a:schemeClr>
+                </a:solidFill>
+                <a:latin typeface="+mn-lt"/>
+                <a:ea typeface="+mn-ea"/>
+                <a:cs typeface="+mn-cs"/>
+              </a:defRPr>
+            </a:pPr>
+            <a:endParaRPr lang="en-US"/>
+          </a:p>
+        </c:txPr>
+        <c:crossAx val="496136352"/>
+        <c:crosses val="autoZero"/>
+        <c:auto val="1"/>
+        <c:lblAlgn val="ctr"/>
+        <c:lblOffset val="100"/>
+        <c:noMultiLvlLbl val="0"/>
+      </c:catAx>
+      <c:valAx>
+        <c:axId val="496136352"/>
+        <c:scaling>
+          <c:orientation val="minMax"/>
+          <c:max val="5"/>
+          <c:min val="0"/>
+        </c:scaling>
+        <c:delete val="0"/>
+        <c:axPos val="l"/>
+        <c:majorGridlines>
+          <c:spPr>
+            <a:ln w="9525" cap="flat" cmpd="sng" algn="ctr">
+              <a:solidFill>
+                <a:schemeClr val="lt1">
+                  <a:lumMod val="95000"/>
+                  <a:alpha val="10000"/>
+                </a:schemeClr>
+              </a:solidFill>
+              <a:round/>
+            </a:ln>
+            <a:effectLst/>
+          </c:spPr>
+        </c:majorGridlines>
+        <c:numFmt formatCode="General" sourceLinked="1"/>
+        <c:majorTickMark val="none"/>
+        <c:minorTickMark val="none"/>
+        <c:tickLblPos val="nextTo"/>
+        <c:spPr>
+          <a:noFill/>
+          <a:ln>
+            <a:noFill/>
+          </a:ln>
+          <a:effectLst/>
+        </c:spPr>
+        <c:txPr>
+          <a:bodyPr rot="-60000000" spcFirstLastPara="1" vertOverflow="ellipsis" vert="horz" wrap="square" anchor="ctr" anchorCtr="1"/>
+          <a:lstStyle/>
+          <a:p>
+            <a:pPr>
+              <a:defRPr sz="900" b="0" i="0" u="none" strike="noStrike" kern="1200" baseline="0">
+                <a:solidFill>
+                  <a:schemeClr val="lt1">
+                    <a:lumMod val="85000"/>
+                  </a:schemeClr>
+                </a:solidFill>
+                <a:latin typeface="+mn-lt"/>
+                <a:ea typeface="+mn-ea"/>
+                <a:cs typeface="+mn-cs"/>
+              </a:defRPr>
+            </a:pPr>
+            <a:endParaRPr lang="en-US"/>
+          </a:p>
+        </c:txPr>
+        <c:crossAx val="496137008"/>
+        <c:crosses val="autoZero"/>
+        <c:crossBetween val="between"/>
+        <c:majorUnit val="1"/>
+      </c:valAx>
+      <c:spPr>
+        <a:noFill/>
+        <a:ln>
+          <a:noFill/>
+        </a:ln>
+        <a:effectLst/>
+      </c:spPr>
+    </c:plotArea>
+    <c:legend>
+      <c:legendPos val="r"/>
+      <c:layout>
+        <c:manualLayout>
+          <c:xMode val="edge"/>
+          <c:yMode val="edge"/>
+          <c:x val="0.89208178704849095"/>
+          <c:y val="0.44003156321877673"/>
+          <c:w val="9.8510875228084729E-2"/>
+          <c:h val="0.20877838031440099"/>
+        </c:manualLayout>
+      </c:layout>
+      <c:overlay val="0"/>
+      <c:spPr>
+        <a:noFill/>
+        <a:ln>
+          <a:noFill/>
+        </a:ln>
+        <a:effectLst/>
+      </c:spPr>
+      <c:txPr>
+        <a:bodyPr rot="0" spcFirstLastPara="1" vertOverflow="ellipsis" vert="horz" wrap="square" anchor="ctr" anchorCtr="1"/>
+        <a:lstStyle/>
+        <a:p>
+          <a:pPr>
+            <a:defRPr sz="900" b="0" i="0" u="none" strike="noStrike" kern="1200" baseline="0">
+              <a:solidFill>
+                <a:schemeClr val="lt1">
+                  <a:lumMod val="85000"/>
+                </a:schemeClr>
+              </a:solidFill>
+              <a:latin typeface="+mn-lt"/>
+              <a:ea typeface="+mn-ea"/>
+              <a:cs typeface="+mn-cs"/>
+            </a:defRPr>
+          </a:pPr>
+          <a:endParaRPr lang="en-US"/>
+        </a:p>
+      </c:txPr>
+    </c:legend>
+    <c:plotVisOnly val="1"/>
+    <c:dispBlanksAs val="gap"/>
+    <c:showDLblsOverMax val="0"/>
+  </c:chart>
+  <c:spPr>
+    <a:gradFill flip="none" rotWithShape="1">
+      <a:gsLst>
+        <a:gs pos="0">
+          <a:schemeClr val="dk1">
+            <a:lumMod val="65000"/>
+            <a:lumOff val="35000"/>
+          </a:schemeClr>
+        </a:gs>
+        <a:gs pos="100000">
+          <a:schemeClr val="dk1">
+            <a:lumMod val="85000"/>
+            <a:lumOff val="15000"/>
+          </a:schemeClr>
+        </a:gs>
+      </a:gsLst>
+      <a:path path="circle">
+        <a:fillToRect l="50000" t="50000" r="50000" b="50000"/>
+      </a:path>
+      <a:tileRect/>
+    </a:gradFill>
+    <a:ln>
+      <a:noFill/>
+    </a:ln>
+    <a:effectLst/>
+  </c:spPr>
+  <c:txPr>
+    <a:bodyPr/>
+    <a:lstStyle/>
+    <a:p>
+      <a:pPr>
+        <a:defRPr/>
+      </a:pPr>
+      <a:endParaRPr lang="en-US"/>
+    </a:p>
+  </c:txPr>
+  <c:externalData r:id="rId4">
+    <c:autoUpdate val="0"/>
+  </c:externalData>
+  <c:userShapes r:id="rId5"/>
+  <c:extLst>
+    <c:ext xmlns:c14="http://schemas.microsoft.com/office/drawing/2007/8/2/chart" uri="{781A3756-C4B2-4CAC-9D66-4F8BD8637D16}">
+      <c14:pivotOptions>
+        <c14:dropZoneFilter val="1"/>
+        <c14:dropZoneCategories val="1"/>
+        <c14:dropZoneData val="1"/>
+        <c14:dropZoneSeries val="1"/>
+      </c14:pivotOptions>
+    </c:ext>
+    <c:ext xmlns:c16="http://schemas.microsoft.com/office/drawing/2014/chart" uri="{E28EC0CA-F0BB-4C9C-879D-F8772B89E7AC}">
+      <c16:pivotOptions16>
+        <c16:showExpandCollapseFieldButtons val="1"/>
+      </c16:pivotOptions16>
+    </c:ext>
+  </c:extLst>
+</c:chartSpace>
+</file>
+
+<file path=ppt/charts/colors1.xml><?xml version="1.0" encoding="utf-8"?>
+<cs:colorStyle xmlns:cs="http://schemas.microsoft.com/office/drawing/2012/chartStyle" xmlns:a="http://schemas.openxmlformats.org/drawingml/2006/main" meth="cycle" id="10">
+  <a:schemeClr val="accent1"/>
+  <a:schemeClr val="accent2"/>
+  <a:schemeClr val="accent3"/>
+  <a:schemeClr val="accent4"/>
+  <a:schemeClr val="accent5"/>
+  <a:schemeClr val="accent6"/>
+  <cs:variation/>
+  <cs:variation>
+    <a:lumMod val="60000"/>
+  </cs:variation>
+  <cs:variation>
+    <a:lumMod val="80000"/>
+    <a:lumOff val="20000"/>
+  </cs:variation>
+  <cs:variation>
+    <a:lumMod val="80000"/>
+  </cs:variation>
+  <cs:variation>
+    <a:lumMod val="60000"/>
+    <a:lumOff val="40000"/>
+  </cs:variation>
+  <cs:variation>
+    <a:lumMod val="50000"/>
+  </cs:variation>
+  <cs:variation>
+    <a:lumMod val="70000"/>
+    <a:lumOff val="30000"/>
+  </cs:variation>
+  <cs:variation>
+    <a:lumMod val="70000"/>
+  </cs:variation>
+  <cs:variation>
+    <a:lumMod val="50000"/>
+    <a:lumOff val="50000"/>
+  </cs:variation>
+</cs:colorStyle>
+</file>
+
+<file path=ppt/charts/style1.xml><?xml version="1.0" encoding="utf-8"?>
+<cs:chartStyle xmlns:cs="http://schemas.microsoft.com/office/drawing/2012/chartStyle" xmlns:a="http://schemas.openxmlformats.org/drawingml/2006/main" id="233">
+  <cs:axisTitle>
+    <cs:lnRef idx="0"/>
+    <cs:fillRef idx="0"/>
+    <cs:effectRef idx="0"/>
+    <cs:fontRef idx="minor">
+      <a:schemeClr val="lt1">
+        <a:lumMod val="85000"/>
+      </a:schemeClr>
+    </cs:fontRef>
+    <cs:defRPr sz="900" b="1" kern="1200" cap="all"/>
+  </cs:axisTitle>
+  <cs:categoryAxis>
+    <cs:lnRef idx="0"/>
+    <cs:fillRef idx="0"/>
+    <cs:effectRef idx="0"/>
+    <cs:fontRef idx="minor">
+      <a:schemeClr val="lt1">
+        <a:lumMod val="85000"/>
+      </a:schemeClr>
+    </cs:fontRef>
+    <cs:spPr>
+      <a:ln w="9525" cap="flat" cmpd="sng" algn="ctr">
+        <a:solidFill>
+          <a:schemeClr val="lt1">
+            <a:lumMod val="95000"/>
+            <a:alpha val="10000"/>
+          </a:schemeClr>
+        </a:solidFill>
+        <a:round/>
+      </a:ln>
+    </cs:spPr>
+    <cs:defRPr sz="900" kern="1200"/>
+  </cs:categoryAxis>
+  <cs:chartArea>
+    <cs:lnRef idx="0"/>
+    <cs:fillRef idx="0"/>
+    <cs:effectRef idx="0"/>
+    <cs:fontRef idx="minor">
+      <a:schemeClr val="dk1"/>
+    </cs:fontRef>
+    <cs:spPr>
+      <a:gradFill flip="none" rotWithShape="1">
+        <a:gsLst>
+          <a:gs pos="0">
+            <a:schemeClr val="dk1">
+              <a:lumMod val="65000"/>
+              <a:lumOff val="35000"/>
+            </a:schemeClr>
+          </a:gs>
+          <a:gs pos="100000">
+            <a:schemeClr val="dk1">
+              <a:lumMod val="85000"/>
+              <a:lumOff val="15000"/>
+            </a:schemeClr>
+          </a:gs>
+        </a:gsLst>
+        <a:path path="circle">
+          <a:fillToRect l="50000" t="50000" r="50000" b="50000"/>
+        </a:path>
+        <a:tileRect/>
+      </a:gradFill>
+    </cs:spPr>
+    <cs:defRPr sz="1000" kern="1200"/>
+  </cs:chartArea>
+  <cs:dataLabel>
+    <cs:lnRef idx="0"/>
+    <cs:fillRef idx="0"/>
+    <cs:effectRef idx="0"/>
+    <cs:fontRef idx="minor">
+      <a:schemeClr val="lt1">
+        <a:lumMod val="85000"/>
+      </a:schemeClr>
+    </cs:fontRef>
+    <cs:defRPr sz="900" kern="1200"/>
+  </cs:dataLabel>
+  <cs:dataLabelCallout>
+    <cs:lnRef idx="0"/>
+    <cs:fillRef idx="0"/>
+    <cs:effectRef idx="0"/>
+    <cs:fontRef idx="minor">
+      <a:schemeClr val="dk1">
+        <a:lumMod val="65000"/>
+        <a:lumOff val="35000"/>
+      </a:schemeClr>
+    </cs:fontRef>
+    <cs:spPr>
+      <a:solidFill>
+        <a:schemeClr val="lt1"/>
+      </a:solidFill>
+    </cs:spPr>
+    <cs:defRPr sz="900" kern="1200"/>
+    <cs:bodyPr rot="0" spcFirstLastPara="1" vertOverflow="clip" horzOverflow="clip" vert="horz" wrap="square" lIns="36576" tIns="18288" rIns="36576" bIns="18288" anchor="ctr" anchorCtr="1">
+      <a:spAutoFit/>
+    </cs:bodyPr>
+  </cs:dataLabelCallout>
+  <cs:dataPoint>
+    <cs:lnRef idx="0"/>
+    <cs:fillRef idx="3">
+      <cs:styleClr val="auto"/>
+    </cs:fillRef>
+    <cs:effectRef idx="3"/>
+    <cs:fontRef idx="minor">
+      <a:schemeClr val="tx1"/>
+    </cs:fontRef>
+  </cs:dataPoint>
+  <cs:dataPoint3D>
+    <cs:lnRef idx="0"/>
+    <cs:fillRef idx="3">
+      <cs:styleClr val="auto"/>
+    </cs:fillRef>
+    <cs:effectRef idx="3"/>
+    <cs:fontRef idx="minor">
+      <a:schemeClr val="tx1"/>
+    </cs:fontRef>
+  </cs:dataPoint3D>
+  <cs:dataPointLine>
+    <cs:lnRef idx="0">
+      <cs:styleClr val="auto"/>
+    </cs:lnRef>
+    <cs:fillRef idx="3"/>
+    <cs:effectRef idx="3"/>
+    <cs:fontRef idx="minor">
+      <a:schemeClr val="tx1"/>
+    </cs:fontRef>
+    <cs:spPr>
+      <a:ln w="34925" cap="rnd">
+        <a:solidFill>
+          <a:schemeClr val="phClr"/>
+        </a:solidFill>
+        <a:round/>
+      </a:ln>
+    </cs:spPr>
+  </cs:dataPointLine>
+  <cs:dataPointMarker>
+    <cs:lnRef idx="0">
+      <cs:styleClr val="auto"/>
+    </cs:lnRef>
+    <cs:fillRef idx="3">
+      <cs:styleClr val="auto"/>
+    </cs:fillRef>
+    <cs:effectRef idx="3"/>
+    <cs:fontRef idx="minor">
+      <a:schemeClr val="tx1"/>
+    </cs:fontRef>
+    <cs:spPr>
+      <a:ln w="9525">
+        <a:solidFill>
+          <a:schemeClr val="phClr"/>
+        </a:solidFill>
+        <a:round/>
+      </a:ln>
+    </cs:spPr>
+  </cs:dataPointMarker>
+  <cs:dataPointMarkerLayout symbol="circle" size="6"/>
+  <cs:dataPointWireframe>
+    <cs:lnRef idx="0">
+      <cs:styleClr val="auto"/>
+    </cs:lnRef>
+    <cs:fillRef idx="3"/>
+    <cs:effectRef idx="3"/>
+    <cs:fontRef idx="minor">
+      <a:schemeClr val="tx1"/>
+    </cs:fontRef>
+    <cs:spPr>
+      <a:ln w="9525" cap="rnd">
+        <a:solidFill>
+          <a:schemeClr val="phClr"/>
+        </a:solidFill>
+        <a:round/>
+      </a:ln>
+    </cs:spPr>
+  </cs:dataPointWireframe>
+  <cs:dataTable>
+    <cs:lnRef idx="0"/>
+    <cs:fillRef idx="0"/>
+    <cs:effectRef idx="0"/>
+    <cs:fontRef idx="minor">
+      <a:schemeClr val="lt1">
+        <a:lumMod val="85000"/>
+      </a:schemeClr>
+    </cs:fontRef>
+    <cs:spPr>
+      <a:ln w="9525">
+        <a:solidFill>
+          <a:schemeClr val="lt1">
+            <a:lumMod val="95000"/>
+            <a:alpha val="54000"/>
+          </a:schemeClr>
+        </a:solidFill>
+      </a:ln>
+    </cs:spPr>
+    <cs:defRPr sz="900" kern="1200"/>
+  </cs:dataTable>
+  <cs:downBar>
+    <cs:lnRef idx="0"/>
+    <cs:fillRef idx="0"/>
+    <cs:effectRef idx="0"/>
+    <cs:fontRef idx="minor">
+      <a:schemeClr val="tx1"/>
+    </cs:fontRef>
+    <cs:spPr>
+      <a:solidFill>
+        <a:schemeClr val="dk1">
+          <a:lumMod val="75000"/>
+          <a:lumOff val="25000"/>
+        </a:schemeClr>
+      </a:solidFill>
+      <a:ln w="9525">
+        <a:solidFill>
+          <a:schemeClr val="lt1">
+            <a:lumMod val="95000"/>
+            <a:alpha val="54000"/>
+          </a:schemeClr>
+        </a:solidFill>
+      </a:ln>
+    </cs:spPr>
+  </cs:downBar>
+  <cs:dropLine>
+    <cs:lnRef idx="0"/>
+    <cs:fillRef idx="0"/>
+    <cs:effectRef idx="0"/>
+    <cs:fontRef idx="minor">
+      <a:schemeClr val="tx1"/>
+    </cs:fontRef>
+    <cs:spPr>
+      <a:ln w="9525">
+        <a:solidFill>
+          <a:schemeClr val="lt1">
+            <a:lumMod val="95000"/>
+            <a:alpha val="54000"/>
+          </a:schemeClr>
+        </a:solidFill>
+        <a:prstDash val="dash"/>
+      </a:ln>
+    </cs:spPr>
+  </cs:dropLine>
+  <cs:errorBar>
+    <cs:lnRef idx="0"/>
+    <cs:fillRef idx="0"/>
+    <cs:effectRef idx="0"/>
+    <cs:fontRef idx="minor">
+      <a:schemeClr val="tx1"/>
+    </cs:fontRef>
+    <cs:spPr>
+      <a:ln w="9525" cap="flat" cmpd="sng" algn="ctr">
+        <a:solidFill>
+          <a:schemeClr val="lt1">
+            <a:lumMod val="95000"/>
+          </a:schemeClr>
+        </a:solidFill>
+        <a:round/>
+      </a:ln>
+    </cs:spPr>
+  </cs:errorBar>
+  <cs:floor>
+    <cs:lnRef idx="0"/>
+    <cs:fillRef idx="0"/>
+    <cs:effectRef idx="0"/>
+    <cs:fontRef idx="minor">
+      <a:schemeClr val="tx1"/>
+    </cs:fontRef>
+  </cs:floor>
+  <cs:gridlineMajor>
+    <cs:lnRef idx="0"/>
+    <cs:fillRef idx="0"/>
+    <cs:effectRef idx="0"/>
+    <cs:fontRef idx="minor">
+      <a:schemeClr val="tx1"/>
+    </cs:fontRef>
+    <cs:spPr>
+      <a:ln w="9525" cap="flat" cmpd="sng" algn="ctr">
+        <a:solidFill>
+          <a:schemeClr val="lt1">
+            <a:lumMod val="95000"/>
+            <a:alpha val="10000"/>
+          </a:schemeClr>
+        </a:solidFill>
+        <a:round/>
+      </a:ln>
+    </cs:spPr>
+  </cs:gridlineMajor>
+  <cs:gridlineMinor>
+    <cs:lnRef idx="0"/>
+    <cs:fillRef idx="0"/>
+    <cs:effectRef idx="0"/>
+    <cs:fontRef idx="minor">
+      <a:schemeClr val="tx1"/>
+    </cs:fontRef>
+    <cs:spPr>
+      <a:ln>
+        <a:solidFill>
+          <a:schemeClr val="lt1">
+            <a:lumMod val="95000"/>
+            <a:alpha val="5000"/>
+          </a:schemeClr>
+        </a:solidFill>
+      </a:ln>
+    </cs:spPr>
+  </cs:gridlineMinor>
+  <cs:hiLoLine>
+    <cs:lnRef idx="0"/>
+    <cs:fillRef idx="0"/>
+    <cs:effectRef idx="0"/>
+    <cs:fontRef idx="minor">
+      <a:schemeClr val="tx1"/>
+    </cs:fontRef>
+    <cs:spPr>
+      <a:ln w="9525">
+        <a:solidFill>
+          <a:schemeClr val="lt1">
+            <a:lumMod val="95000"/>
+            <a:alpha val="54000"/>
+          </a:schemeClr>
+        </a:solidFill>
+        <a:prstDash val="dash"/>
+      </a:ln>
+    </cs:spPr>
+  </cs:hiLoLine>
+  <cs:leaderLine>
+    <cs:lnRef idx="0"/>
+    <cs:fillRef idx="0"/>
+    <cs:effectRef idx="0"/>
+    <cs:fontRef idx="minor">
+      <a:schemeClr val="tx1"/>
+    </cs:fontRef>
+    <cs:spPr>
+      <a:ln w="9525">
+        <a:solidFill>
+          <a:schemeClr val="lt1">
+            <a:lumMod val="95000"/>
+            <a:alpha val="54000"/>
+          </a:schemeClr>
+        </a:solidFill>
+      </a:ln>
+    </cs:spPr>
+  </cs:leaderLine>
+  <cs:legend>
+    <cs:lnRef idx="0"/>
+    <cs:fillRef idx="0"/>
+    <cs:effectRef idx="0"/>
+    <cs:fontRef idx="minor">
+      <a:schemeClr val="lt1">
+        <a:lumMod val="85000"/>
+      </a:schemeClr>
+    </cs:fontRef>
+    <cs:defRPr sz="900" kern="1200"/>
+  </cs:legend>
+  <cs:plotArea>
+    <cs:lnRef idx="0"/>
+    <cs:fillRef idx="0"/>
+    <cs:effectRef idx="0"/>
+    <cs:fontRef idx="minor">
+      <a:schemeClr val="tx1"/>
+    </cs:fontRef>
+  </cs:plotArea>
+  <cs:plotArea3D>
+    <cs:lnRef idx="0"/>
+    <cs:fillRef idx="0"/>
+    <cs:effectRef idx="0"/>
+    <cs:fontRef idx="minor">
+      <a:schemeClr val="tx1"/>
+    </cs:fontRef>
+  </cs:plotArea3D>
+  <cs:seriesAxis>
+    <cs:lnRef idx="0"/>
+    <cs:fillRef idx="0"/>
+    <cs:effectRef idx="0"/>
+    <cs:fontRef idx="minor">
+      <a:schemeClr val="lt1">
+        <a:lumMod val="85000"/>
+      </a:schemeClr>
+    </cs:fontRef>
+    <cs:spPr>
+      <a:ln w="12700" cap="flat" cmpd="sng" algn="ctr">
+        <a:solidFill>
+          <a:schemeClr val="lt1">
+            <a:lumMod val="95000"/>
+            <a:alpha val="54000"/>
+          </a:schemeClr>
+        </a:solidFill>
+        <a:round/>
+      </a:ln>
+    </cs:spPr>
+    <cs:defRPr sz="900" kern="1200"/>
+  </cs:seriesAxis>
+  <cs:seriesLine>
+    <cs:lnRef idx="0"/>
+    <cs:fillRef idx="0"/>
+    <cs:effectRef idx="0"/>
+    <cs:fontRef idx="minor">
+      <a:schemeClr val="lt1"/>
+    </cs:fontRef>
+    <cs:spPr>
+      <a:ln w="9525" cap="flat" cmpd="sng" algn="ctr">
+        <a:solidFill>
+          <a:schemeClr val="lt1">
+            <a:lumMod val="95000"/>
+            <a:alpha val="54000"/>
+          </a:schemeClr>
+        </a:solidFill>
+        <a:round/>
+      </a:ln>
+    </cs:spPr>
+  </cs:seriesLine>
+  <cs:title>
+    <cs:lnRef idx="0"/>
+    <cs:fillRef idx="0"/>
+    <cs:effectRef idx="0"/>
+    <cs:fontRef idx="minor">
+      <a:schemeClr val="lt1">
+        <a:lumMod val="95000"/>
+      </a:schemeClr>
+    </cs:fontRef>
+    <cs:defRPr sz="1600" b="1" kern="1200" spc="100" baseline="0">
+      <a:effectLst>
+        <a:outerShdw blurRad="50800" dist="38100" dir="5400000" algn="t" rotWithShape="0">
+          <a:prstClr val="black">
+            <a:alpha val="40000"/>
+          </a:prstClr>
+        </a:outerShdw>
+      </a:effectLst>
+    </cs:defRPr>
+  </cs:title>
+  <cs:trendline>
+    <cs:lnRef idx="0">
+      <cs:styleClr val="auto"/>
+    </cs:lnRef>
+    <cs:fillRef idx="0"/>
+    <cs:effectRef idx="0"/>
+    <cs:fontRef idx="minor">
+      <a:schemeClr val="tx1"/>
+    </cs:fontRef>
+    <cs:spPr>
+      <a:ln w="19050" cap="rnd">
+        <a:solidFill>
+          <a:schemeClr val="phClr"/>
+        </a:solidFill>
+      </a:ln>
+    </cs:spPr>
+  </cs:trendline>
+  <cs:trendlineLabel>
+    <cs:lnRef idx="0"/>
+    <cs:fillRef idx="0"/>
+    <cs:effectRef idx="0"/>
+    <cs:fontRef idx="minor">
+      <a:schemeClr val="lt1">
+        <a:lumMod val="85000"/>
+      </a:schemeClr>
+    </cs:fontRef>
+    <cs:defRPr sz="900" kern="1200"/>
+  </cs:trendlineLabel>
+  <cs:upBar>
+    <cs:lnRef idx="0"/>
+    <cs:fillRef idx="0"/>
+    <cs:effectRef idx="0"/>
+    <cs:fontRef idx="minor">
+      <a:schemeClr val="tx1"/>
+    </cs:fontRef>
+    <cs:spPr>
+      <a:solidFill>
+        <a:schemeClr val="lt1"/>
+      </a:solidFill>
+      <a:ln w="9525">
+        <a:solidFill>
+          <a:schemeClr val="lt1">
+            <a:lumMod val="95000"/>
+            <a:alpha val="54000"/>
+          </a:schemeClr>
+        </a:solidFill>
+      </a:ln>
+    </cs:spPr>
+  </cs:upBar>
+  <cs:valueAxis>
+    <cs:lnRef idx="0"/>
+    <cs:fillRef idx="0"/>
+    <cs:effectRef idx="0"/>
+    <cs:fontRef idx="minor">
+      <a:schemeClr val="lt1">
+        <a:lumMod val="85000"/>
+      </a:schemeClr>
+    </cs:fontRef>
+    <cs:defRPr sz="900" kern="1200"/>
+  </cs:valueAxis>
+  <cs:wall>
+    <cs:lnRef idx="0"/>
+    <cs:fillRef idx="0"/>
+    <cs:effectRef idx="0"/>
+    <cs:fontRef idx="minor">
+      <a:schemeClr val="tx1"/>
+    </cs:fontRef>
+  </cs:wall>
+</cs:chartStyle>
+</file>
+
+<file path=ppt/drawings/drawing1.xml><?xml version="1.0" encoding="utf-8"?>
+<c:userShapes xmlns:c="http://schemas.openxmlformats.org/drawingml/2006/chart">
+  <cdr:relSizeAnchor xmlns:cdr="http://schemas.openxmlformats.org/drawingml/2006/chartDrawing">
+    <cdr:from>
+      <cdr:x>0.01317</cdr:x>
+      <cdr:y>0.02345</cdr:y>
+    </cdr:from>
+    <cdr:to>
+      <cdr:x>0.07244</cdr:x>
+      <cdr:y>0.08955</cdr:y>
+    </cdr:to>
+    <cdr:sp macro="" textlink="">
+      <cdr:nvSpPr>
+        <cdr:cNvPr id="2" name="TextBox 1">
+          <a:extLst xmlns:a="http://schemas.openxmlformats.org/drawingml/2006/main">
+            <a:ext uri="{FF2B5EF4-FFF2-40B4-BE49-F238E27FC236}">
+              <a16:creationId xmlns:a16="http://schemas.microsoft.com/office/drawing/2014/main" id="{64B3F357-F064-42C7-96FC-CFC8F7A5F5D2}"/>
+            </a:ext>
+          </a:extLst>
+        </cdr:cNvPr>
+        <cdr:cNvSpPr txBox="1"/>
+      </cdr:nvSpPr>
+      <cdr:spPr>
+        <a:xfrm xmlns:a="http://schemas.openxmlformats.org/drawingml/2006/main">
+          <a:off x="106680" y="83820"/>
+          <a:ext cx="480060" cy="236220"/>
+        </a:xfrm>
+        <a:prstGeom xmlns:a="http://schemas.openxmlformats.org/drawingml/2006/main" prst="rect">
+          <a:avLst/>
+        </a:prstGeom>
+      </cdr:spPr>
+      <cdr:txBody>
+        <a:bodyPr xmlns:a="http://schemas.openxmlformats.org/drawingml/2006/main" vertOverflow="clip" wrap="square" rtlCol="0"/>
+        <a:lstStyle xmlns:a="http://schemas.openxmlformats.org/drawingml/2006/main"/>
+        <a:p xmlns:a="http://schemas.openxmlformats.org/drawingml/2006/main">
+          <a:endParaRPr lang="en-US" sz="1100"/>
+        </a:p>
+      </cdr:txBody>
+    </cdr:sp>
+  </cdr:relSizeAnchor>
+  <cdr:relSizeAnchor xmlns:cdr="http://schemas.openxmlformats.org/drawingml/2006/chartDrawing">
+    <cdr:from>
+      <cdr:x>0</cdr:x>
+      <cdr:y>0.02132</cdr:y>
+    </cdr:from>
+    <cdr:to>
+      <cdr:x>0.108</cdr:x>
+      <cdr:y>0.08453</cdr:y>
+    </cdr:to>
+    <cdr:sp macro="" textlink="">
+      <cdr:nvSpPr>
+        <cdr:cNvPr id="3" name="TextBox 2">
+          <a:extLst xmlns:a="http://schemas.openxmlformats.org/drawingml/2006/main">
+            <a:ext uri="{FF2B5EF4-FFF2-40B4-BE49-F238E27FC236}">
+              <a16:creationId xmlns:a16="http://schemas.microsoft.com/office/drawing/2014/main" id="{D6EC7A4C-F64C-4341-BC5D-D7D8B4E94619}"/>
+            </a:ext>
+          </a:extLst>
+        </cdr:cNvPr>
+        <cdr:cNvSpPr txBox="1"/>
+      </cdr:nvSpPr>
+      <cdr:spPr>
+        <a:xfrm xmlns:a="http://schemas.openxmlformats.org/drawingml/2006/main">
+          <a:off x="0" y="76193"/>
+          <a:ext cx="874783" cy="225907"/>
+        </a:xfrm>
+        <a:prstGeom xmlns:a="http://schemas.openxmlformats.org/drawingml/2006/main" prst="rect">
+          <a:avLst/>
+        </a:prstGeom>
+      </cdr:spPr>
+      <cdr:txBody>
+        <a:bodyPr xmlns:a="http://schemas.openxmlformats.org/drawingml/2006/main" vertOverflow="clip" wrap="square" rtlCol="0"/>
+        <a:lstStyle xmlns:a="http://schemas.openxmlformats.org/drawingml/2006/main"/>
+        <a:p xmlns:a="http://schemas.openxmlformats.org/drawingml/2006/main">
+          <a:r>
+            <a:rPr lang="en-US" sz="1050" dirty="0">
+              <a:solidFill>
+                <a:schemeClr val="bg1"/>
+              </a:solidFill>
+            </a:rPr>
+            <a:t># of Bugs</a:t>
+          </a:r>
+        </a:p>
+      </cdr:txBody>
+    </cdr:sp>
+  </cdr:relSizeAnchor>
+  <cdr:relSizeAnchor xmlns:cdr="http://schemas.openxmlformats.org/drawingml/2006/chartDrawing">
+    <cdr:from>
+      <cdr:x>0.87927</cdr:x>
+      <cdr:y>0.7946</cdr:y>
+    </cdr:from>
+    <cdr:to>
+      <cdr:x>0.98918</cdr:x>
+      <cdr:y>0.86951</cdr:y>
+    </cdr:to>
+    <cdr:sp macro="" textlink="">
+      <cdr:nvSpPr>
+        <cdr:cNvPr id="4" name="TextBox 1">
+          <a:extLst xmlns:a="http://schemas.openxmlformats.org/drawingml/2006/main">
+            <a:ext uri="{FF2B5EF4-FFF2-40B4-BE49-F238E27FC236}">
+              <a16:creationId xmlns:a16="http://schemas.microsoft.com/office/drawing/2014/main" id="{BF4F0A2B-7FE9-4E19-85A2-74C269DD08B1}"/>
+            </a:ext>
+          </a:extLst>
+        </cdr:cNvPr>
+        <cdr:cNvSpPr txBox="1"/>
+      </cdr:nvSpPr>
+      <cdr:spPr>
+        <a:xfrm xmlns:a="http://schemas.openxmlformats.org/drawingml/2006/main">
+          <a:off x="7122140" y="2839726"/>
+          <a:ext cx="890290" cy="267717"/>
+        </a:xfrm>
+        <a:prstGeom xmlns:a="http://schemas.openxmlformats.org/drawingml/2006/main" prst="rect">
+          <a:avLst/>
+        </a:prstGeom>
+      </cdr:spPr>
+      <cdr:txBody>
+        <a:bodyPr xmlns:a="http://schemas.openxmlformats.org/drawingml/2006/main" wrap="square" rtlCol="0"/>
+        <a:lstStyle xmlns:a="http://schemas.openxmlformats.org/drawingml/2006/main">
+          <a:lvl1pPr marL="0" indent="0">
+            <a:defRPr sz="1100">
+              <a:latin typeface="+mn-lt"/>
+              <a:ea typeface="+mn-ea"/>
+              <a:cs typeface="+mn-cs"/>
+            </a:defRPr>
+          </a:lvl1pPr>
+          <a:lvl2pPr marL="457200" indent="0">
+            <a:defRPr sz="1100">
+              <a:latin typeface="+mn-lt"/>
+              <a:ea typeface="+mn-ea"/>
+              <a:cs typeface="+mn-cs"/>
+            </a:defRPr>
+          </a:lvl2pPr>
+          <a:lvl3pPr marL="914400" indent="0">
+            <a:defRPr sz="1100">
+              <a:latin typeface="+mn-lt"/>
+              <a:ea typeface="+mn-ea"/>
+              <a:cs typeface="+mn-cs"/>
+            </a:defRPr>
+          </a:lvl3pPr>
+          <a:lvl4pPr marL="1371600" indent="0">
+            <a:defRPr sz="1100">
+              <a:latin typeface="+mn-lt"/>
+              <a:ea typeface="+mn-ea"/>
+              <a:cs typeface="+mn-cs"/>
+            </a:defRPr>
+          </a:lvl4pPr>
+          <a:lvl5pPr marL="1828800" indent="0">
+            <a:defRPr sz="1100">
+              <a:latin typeface="+mn-lt"/>
+              <a:ea typeface="+mn-ea"/>
+              <a:cs typeface="+mn-cs"/>
+            </a:defRPr>
+          </a:lvl5pPr>
+          <a:lvl6pPr marL="2286000" indent="0">
+            <a:defRPr sz="1100">
+              <a:latin typeface="+mn-lt"/>
+              <a:ea typeface="+mn-ea"/>
+              <a:cs typeface="+mn-cs"/>
+            </a:defRPr>
+          </a:lvl6pPr>
+          <a:lvl7pPr marL="2743200" indent="0">
+            <a:defRPr sz="1100">
+              <a:latin typeface="+mn-lt"/>
+              <a:ea typeface="+mn-ea"/>
+              <a:cs typeface="+mn-cs"/>
+            </a:defRPr>
+          </a:lvl7pPr>
+          <a:lvl8pPr marL="3200400" indent="0">
+            <a:defRPr sz="1100">
+              <a:latin typeface="+mn-lt"/>
+              <a:ea typeface="+mn-ea"/>
+              <a:cs typeface="+mn-cs"/>
+            </a:defRPr>
+          </a:lvl8pPr>
+          <a:lvl9pPr marL="3657600" indent="0">
+            <a:defRPr sz="1100">
+              <a:latin typeface="+mn-lt"/>
+              <a:ea typeface="+mn-ea"/>
+              <a:cs typeface="+mn-cs"/>
+            </a:defRPr>
+          </a:lvl9pPr>
+        </a:lstStyle>
+        <a:p xmlns:a="http://schemas.openxmlformats.org/drawingml/2006/main">
+          <a:r>
+            <a:rPr lang="en-US" sz="1050" dirty="0">
+              <a:solidFill>
+                <a:schemeClr val="bg1"/>
+              </a:solidFill>
+            </a:rPr>
+            <a:t># of Tests</a:t>
+          </a:r>
+        </a:p>
+      </cdr:txBody>
+    </cdr:sp>
+  </cdr:relSizeAnchor>
+  <cdr:relSizeAnchor xmlns:cdr="http://schemas.openxmlformats.org/drawingml/2006/chartDrawing">
+    <cdr:from>
+      <cdr:x>0.30762</cdr:x>
+      <cdr:y>0.04264</cdr:y>
+    </cdr:from>
+    <cdr:to>
+      <cdr:x>0.65663</cdr:x>
+      <cdr:y>0.1194</cdr:y>
+    </cdr:to>
+    <cdr:sp macro="" textlink="">
+      <cdr:nvSpPr>
+        <cdr:cNvPr id="5" name="TextBox 4">
+          <a:extLst xmlns:a="http://schemas.openxmlformats.org/drawingml/2006/main">
+            <a:ext uri="{FF2B5EF4-FFF2-40B4-BE49-F238E27FC236}">
+              <a16:creationId xmlns:a16="http://schemas.microsoft.com/office/drawing/2014/main" id="{FAC1D15F-69DA-493A-A6F9-6757F7346F6B}"/>
+            </a:ext>
+          </a:extLst>
+        </cdr:cNvPr>
+        <cdr:cNvSpPr txBox="1"/>
+      </cdr:nvSpPr>
+      <cdr:spPr>
+        <a:xfrm xmlns:a="http://schemas.openxmlformats.org/drawingml/2006/main">
+          <a:off x="2491740" y="152400"/>
+          <a:ext cx="2827020" cy="274320"/>
+        </a:xfrm>
+        <a:prstGeom xmlns:a="http://schemas.openxmlformats.org/drawingml/2006/main" prst="rect">
+          <a:avLst/>
+        </a:prstGeom>
+      </cdr:spPr>
+      <cdr:txBody>
+        <a:bodyPr xmlns:a="http://schemas.openxmlformats.org/drawingml/2006/main" vertOverflow="clip" wrap="square" rtlCol="0"/>
+        <a:lstStyle xmlns:a="http://schemas.openxmlformats.org/drawingml/2006/main"/>
+        <a:p xmlns:a="http://schemas.openxmlformats.org/drawingml/2006/main">
+          <a:endParaRPr lang="en-US" sz="1100"/>
+        </a:p>
+      </cdr:txBody>
+    </cdr:sp>
+  </cdr:relSizeAnchor>
+  <cdr:relSizeAnchor xmlns:cdr="http://schemas.openxmlformats.org/drawingml/2006/chartDrawing">
+    <cdr:from>
+      <cdr:x>0.29069</cdr:x>
+      <cdr:y>0.03625</cdr:y>
+    </cdr:from>
+    <cdr:to>
+      <cdr:x>0.73189</cdr:x>
+      <cdr:y>0.10661</cdr:y>
+    </cdr:to>
+    <cdr:sp macro="" textlink="">
+      <cdr:nvSpPr>
+        <cdr:cNvPr id="6" name="TextBox 5">
+          <a:extLst xmlns:a="http://schemas.openxmlformats.org/drawingml/2006/main">
+            <a:ext uri="{FF2B5EF4-FFF2-40B4-BE49-F238E27FC236}">
+              <a16:creationId xmlns:a16="http://schemas.microsoft.com/office/drawing/2014/main" id="{06CEEFD0-A49A-4926-A4EF-4ADCB09E247A}"/>
+            </a:ext>
+          </a:extLst>
+        </cdr:cNvPr>
+        <cdr:cNvSpPr txBox="1"/>
+      </cdr:nvSpPr>
+      <cdr:spPr>
+        <a:xfrm xmlns:a="http://schemas.openxmlformats.org/drawingml/2006/main">
+          <a:off x="2354580" y="129540"/>
+          <a:ext cx="3573780" cy="251460"/>
+        </a:xfrm>
+        <a:prstGeom xmlns:a="http://schemas.openxmlformats.org/drawingml/2006/main" prst="rect">
+          <a:avLst/>
+        </a:prstGeom>
+      </cdr:spPr>
+      <cdr:txBody>
+        <a:bodyPr xmlns:a="http://schemas.openxmlformats.org/drawingml/2006/main" vertOverflow="clip" wrap="square" rtlCol="0"/>
+        <a:lstStyle xmlns:a="http://schemas.openxmlformats.org/drawingml/2006/main"/>
+        <a:p xmlns:a="http://schemas.openxmlformats.org/drawingml/2006/main">
+          <a:pPr algn="ctr"/>
+          <a:r>
+            <a:rPr lang="en-US" sz="1400">
+              <a:solidFill>
+                <a:schemeClr val="bg1"/>
+              </a:solidFill>
+            </a:rPr>
+            <a:t>Compare</a:t>
+          </a:r>
+          <a:r>
+            <a:rPr lang="en-US" sz="1400" baseline="0">
+              <a:solidFill>
+                <a:schemeClr val="bg1"/>
+              </a:solidFill>
+            </a:rPr>
+            <a:t> IG Vs. TFB Algorithm</a:t>
+          </a:r>
+          <a:endParaRPr lang="en-US" sz="1400">
+            <a:solidFill>
+              <a:schemeClr val="bg1"/>
+            </a:solidFill>
+          </a:endParaRPr>
+        </a:p>
+      </cdr:txBody>
+    </cdr:sp>
+  </cdr:relSizeAnchor>
+</c:userShapes>
 </file>
 
 <file path=ppt/slideLayouts/slideLayout1.xml><?xml version="1.0" encoding="utf-8"?>
@@ -531,7 +2350,7 @@
           <a:p>
             <a:fld id="{83284890-85D2-4D7B-8EF5-15A9C1DB8F42}" type="datetimeFigureOut">
               <a:rPr lang="en-US" dirty="0"/>
-              <a:t>7/16/2018</a:t>
+              <a:t>7/17/2018</a:t>
             </a:fld>
             <a:endParaRPr lang="en-US" dirty="0"/>
           </a:p>
@@ -706,7 +2525,7 @@
           <a:p>
             <a:fld id="{87157CC2-0FC8-4686-B024-99790E0F5162}" type="datetimeFigureOut">
               <a:rPr lang="en-US" dirty="0"/>
-              <a:t>7/16/2018</a:t>
+              <a:t>7/17/2018</a:t>
             </a:fld>
             <a:endParaRPr lang="en-US" dirty="0"/>
           </a:p>
@@ -881,7 +2700,7 @@
           <a:p>
             <a:fld id="{F6764DA5-CD3D-4590-A511-FCD3BC7A793E}" type="datetimeFigureOut">
               <a:rPr lang="en-US" dirty="0"/>
-              <a:t>7/16/2018</a:t>
+              <a:t>7/17/2018</a:t>
             </a:fld>
             <a:endParaRPr lang="en-US" dirty="0"/>
           </a:p>
@@ -1046,7 +2865,7 @@
           <a:p>
             <a:fld id="{82F5661D-6934-4B32-B92C-470368BF1EC6}" type="datetimeFigureOut">
               <a:rPr lang="en-US" dirty="0"/>
-              <a:t>7/16/2018</a:t>
+              <a:t>7/17/2018</a:t>
             </a:fld>
             <a:endParaRPr lang="en-US" dirty="0"/>
           </a:p>
@@ -1354,7 +3173,7 @@
           <a:p>
             <a:fld id="{C6F822A4-8DA6-4447-9B1F-C5DB58435268}" type="datetimeFigureOut">
               <a:rPr lang="en-US" dirty="0"/>
-              <a:t>7/16/2018</a:t>
+              <a:t>7/17/2018</a:t>
             </a:fld>
             <a:endParaRPr lang="en-US" dirty="0"/>
           </a:p>
@@ -1736,7 +3555,7 @@
           <a:p>
             <a:fld id="{E548D31E-DCDA-41A7-9C67-C4B11B94D21D}" type="datetimeFigureOut">
               <a:rPr lang="en-US" dirty="0"/>
-              <a:t>7/16/2018</a:t>
+              <a:t>7/17/2018</a:t>
             </a:fld>
             <a:endParaRPr lang="en-US" dirty="0"/>
           </a:p>
@@ -2165,7 +3984,7 @@
           <a:p>
             <a:fld id="{9B3762C0-B258-48F1-ADE6-176B4174CCDD}" type="datetimeFigureOut">
               <a:rPr lang="en-US" dirty="0"/>
-              <a:t>7/16/2018</a:t>
+              <a:t>7/17/2018</a:t>
             </a:fld>
             <a:endParaRPr lang="en-US" dirty="0"/>
           </a:p>
@@ -2278,7 +4097,7 @@
           <a:p>
             <a:fld id="{677919A6-33EB-49BD-A62F-1FA56B9F9712}" type="datetimeFigureOut">
               <a:rPr lang="en-US" dirty="0"/>
-              <a:t>7/16/2018</a:t>
+              <a:t>7/17/2018</a:t>
             </a:fld>
             <a:endParaRPr lang="en-US" dirty="0"/>
           </a:p>
@@ -2368,7 +4187,7 @@
           <a:p>
             <a:fld id="{CA4E7D1B-D673-4CF6-8672-009D42ABD2A0}" type="datetimeFigureOut">
               <a:rPr lang="en-US" dirty="0"/>
-              <a:t>7/16/2018</a:t>
+              <a:t>7/17/2018</a:t>
             </a:fld>
             <a:endParaRPr lang="en-US" dirty="0"/>
           </a:p>
@@ -2713,7 +4532,7 @@
           <a:p>
             <a:fld id="{DA16AA21-1863-4931-97CB-99D0A168701B}" type="datetimeFigureOut">
               <a:rPr lang="en-US" dirty="0"/>
-              <a:t>7/16/2018</a:t>
+              <a:t>7/17/2018</a:t>
             </a:fld>
             <a:endParaRPr lang="en-US" dirty="0"/>
           </a:p>
@@ -3133,7 +4952,7 @@
           <a:p>
             <a:fld id="{3772C379-9A7C-4C87-A116-CBE9F58B04C5}" type="datetimeFigureOut">
               <a:rPr lang="en-US" dirty="0"/>
-              <a:t>7/16/2018</a:t>
+              <a:t>7/17/2018</a:t>
             </a:fld>
             <a:endParaRPr lang="en-US" dirty="0"/>
           </a:p>
@@ -3409,7 +5228,7 @@
           <a:p>
             <a:fld id="{8664C608-40B1-4030-A28D-5B74BC98ADCE}" type="datetimeFigureOut">
               <a:rPr lang="en-US" dirty="0"/>
-              <a:t>7/16/2018</a:t>
+              <a:t>7/17/2018</a:t>
             </a:fld>
             <a:endParaRPr lang="en-US" dirty="0"/>
           </a:p>
@@ -9352,6 +11171,849 @@
       </p:grpSpPr>
       <p:sp>
         <p:nvSpPr>
+          <p:cNvPr id="2" name="Title 1"/>
+          <p:cNvSpPr>
+            <a:spLocks noGrp="1"/>
+          </p:cNvSpPr>
+          <p:nvPr>
+            <p:ph type="title"/>
+          </p:nvPr>
+        </p:nvSpPr>
+        <p:spPr/>
+        <p:txBody>
+          <a:bodyPr/>
+          <a:lstStyle/>
+          <a:p>
+            <a:r>
+              <a:rPr lang="en-US" dirty="0"/>
+              <a:t>Experiment Results</a:t>
+            </a:r>
+          </a:p>
+        </p:txBody>
+      </p:sp>
+      <p:sp>
+        <p:nvSpPr>
+          <p:cNvPr id="7" name="Content Placeholder 2">
+            <a:extLst>
+              <a:ext uri="{FF2B5EF4-FFF2-40B4-BE49-F238E27FC236}">
+                <a16:creationId xmlns:a16="http://schemas.microsoft.com/office/drawing/2014/main" id="{0BBCA04D-4A8B-47A6-B72E-18B9FFC206D7}"/>
+              </a:ext>
+            </a:extLst>
+          </p:cNvPr>
+          <p:cNvSpPr txBox="1">
+            <a:spLocks/>
+          </p:cNvSpPr>
+          <p:nvPr/>
+        </p:nvSpPr>
+        <p:spPr>
+          <a:xfrm>
+            <a:off x="1069848" y="1873189"/>
+            <a:ext cx="10058400" cy="4675220"/>
+          </a:xfrm>
+          <a:prstGeom prst="rect">
+            <a:avLst/>
+          </a:prstGeom>
+        </p:spPr>
+        <p:txBody>
+          <a:bodyPr vert="horz" lIns="91440" tIns="45720" rIns="91440" bIns="45720" rtlCol="0">
+            <a:normAutofit/>
+          </a:bodyPr>
+          <a:lstStyle>
+            <a:lvl1pPr marL="182880" indent="-182880" algn="l" defTabSz="914400" rtl="0" eaLnBrk="1" latinLnBrk="0" hangingPunct="1">
+              <a:lnSpc>
+                <a:spcPct val="90000"/>
+              </a:lnSpc>
+              <a:spcBef>
+                <a:spcPts val="1200"/>
+              </a:spcBef>
+              <a:buClr>
+                <a:schemeClr val="accent1">
+                  <a:lumMod val="75000"/>
+                </a:schemeClr>
+              </a:buClr>
+              <a:buSzPct val="85000"/>
+              <a:buFont typeface="Wingdings" pitchFamily="2" charset="2"/>
+              <a:buChar char="§"/>
+              <a:defRPr sz="2000" kern="1200">
+                <a:solidFill>
+                  <a:schemeClr val="tx1"/>
+                </a:solidFill>
+                <a:latin typeface="+mn-lt"/>
+                <a:ea typeface="+mn-ea"/>
+                <a:cs typeface="+mn-cs"/>
+              </a:defRPr>
+            </a:lvl1pPr>
+            <a:lvl2pPr marL="457200" indent="-182880" algn="l" defTabSz="914400" rtl="0" eaLnBrk="1" latinLnBrk="0" hangingPunct="1">
+              <a:lnSpc>
+                <a:spcPct val="90000"/>
+              </a:lnSpc>
+              <a:spcBef>
+                <a:spcPts val="400"/>
+              </a:spcBef>
+              <a:spcAft>
+                <a:spcPts val="200"/>
+              </a:spcAft>
+              <a:buClr>
+                <a:schemeClr val="accent1">
+                  <a:lumMod val="75000"/>
+                </a:schemeClr>
+              </a:buClr>
+              <a:buSzPct val="85000"/>
+              <a:buFont typeface="Wingdings" pitchFamily="2" charset="2"/>
+              <a:buChar char="§"/>
+              <a:defRPr sz="1800" kern="1200">
+                <a:solidFill>
+                  <a:schemeClr val="tx1"/>
+                </a:solidFill>
+                <a:latin typeface="+mn-lt"/>
+                <a:ea typeface="+mn-ea"/>
+                <a:cs typeface="+mn-cs"/>
+              </a:defRPr>
+            </a:lvl2pPr>
+            <a:lvl3pPr marL="731520" indent="-182880" algn="l" defTabSz="914400" rtl="0" eaLnBrk="1" latinLnBrk="0" hangingPunct="1">
+              <a:lnSpc>
+                <a:spcPct val="90000"/>
+              </a:lnSpc>
+              <a:spcBef>
+                <a:spcPts val="400"/>
+              </a:spcBef>
+              <a:spcAft>
+                <a:spcPts val="200"/>
+              </a:spcAft>
+              <a:buClr>
+                <a:schemeClr val="accent1">
+                  <a:lumMod val="75000"/>
+                </a:schemeClr>
+              </a:buClr>
+              <a:buSzPct val="85000"/>
+              <a:buFont typeface="Wingdings" pitchFamily="2" charset="2"/>
+              <a:buChar char="§"/>
+              <a:defRPr sz="1600" kern="1200">
+                <a:solidFill>
+                  <a:schemeClr val="tx1"/>
+                </a:solidFill>
+                <a:latin typeface="+mn-lt"/>
+                <a:ea typeface="+mn-ea"/>
+                <a:cs typeface="+mn-cs"/>
+              </a:defRPr>
+            </a:lvl3pPr>
+            <a:lvl4pPr marL="1005840" indent="-182880" algn="l" defTabSz="914400" rtl="0" eaLnBrk="1" latinLnBrk="0" hangingPunct="1">
+              <a:lnSpc>
+                <a:spcPct val="90000"/>
+              </a:lnSpc>
+              <a:spcBef>
+                <a:spcPts val="400"/>
+              </a:spcBef>
+              <a:spcAft>
+                <a:spcPts val="200"/>
+              </a:spcAft>
+              <a:buClr>
+                <a:schemeClr val="accent1">
+                  <a:lumMod val="75000"/>
+                </a:schemeClr>
+              </a:buClr>
+              <a:buSzPct val="85000"/>
+              <a:buFont typeface="Wingdings" pitchFamily="2" charset="2"/>
+              <a:buChar char="§"/>
+              <a:defRPr sz="1600" kern="1200">
+                <a:solidFill>
+                  <a:schemeClr val="tx1"/>
+                </a:solidFill>
+                <a:latin typeface="+mn-lt"/>
+                <a:ea typeface="+mn-ea"/>
+                <a:cs typeface="+mn-cs"/>
+              </a:defRPr>
+            </a:lvl4pPr>
+            <a:lvl5pPr marL="1280160" indent="-182880" algn="l" defTabSz="914400" rtl="0" eaLnBrk="1" latinLnBrk="0" hangingPunct="1">
+              <a:lnSpc>
+                <a:spcPct val="90000"/>
+              </a:lnSpc>
+              <a:spcBef>
+                <a:spcPts val="400"/>
+              </a:spcBef>
+              <a:spcAft>
+                <a:spcPts val="200"/>
+              </a:spcAft>
+              <a:buClr>
+                <a:schemeClr val="accent1">
+                  <a:lumMod val="75000"/>
+                </a:schemeClr>
+              </a:buClr>
+              <a:buSzPct val="85000"/>
+              <a:buFont typeface="Wingdings" pitchFamily="2" charset="2"/>
+              <a:buChar char="§"/>
+              <a:defRPr sz="1600" kern="1200">
+                <a:solidFill>
+                  <a:schemeClr val="tx1"/>
+                </a:solidFill>
+                <a:latin typeface="+mn-lt"/>
+                <a:ea typeface="+mn-ea"/>
+                <a:cs typeface="+mn-cs"/>
+              </a:defRPr>
+            </a:lvl5pPr>
+            <a:lvl6pPr marL="1600000" indent="-228600" algn="l" defTabSz="914400" rtl="0" eaLnBrk="1" latinLnBrk="0" hangingPunct="1">
+              <a:lnSpc>
+                <a:spcPct val="90000"/>
+              </a:lnSpc>
+              <a:spcBef>
+                <a:spcPts val="400"/>
+              </a:spcBef>
+              <a:spcAft>
+                <a:spcPts val="200"/>
+              </a:spcAft>
+              <a:buClr>
+                <a:schemeClr val="accent1">
+                  <a:lumMod val="75000"/>
+                </a:schemeClr>
+              </a:buClr>
+              <a:buSzPct val="85000"/>
+              <a:buFont typeface="Wingdings" pitchFamily="2" charset="2"/>
+              <a:buChar char="§"/>
+              <a:defRPr sz="1600" kern="1200">
+                <a:solidFill>
+                  <a:schemeClr val="tx1"/>
+                </a:solidFill>
+                <a:latin typeface="+mn-lt"/>
+                <a:ea typeface="+mn-ea"/>
+                <a:cs typeface="+mn-cs"/>
+              </a:defRPr>
+            </a:lvl6pPr>
+            <a:lvl7pPr marL="1900000" indent="-228600" algn="l" defTabSz="914400" rtl="0" eaLnBrk="1" latinLnBrk="0" hangingPunct="1">
+              <a:lnSpc>
+                <a:spcPct val="90000"/>
+              </a:lnSpc>
+              <a:spcBef>
+                <a:spcPts val="400"/>
+              </a:spcBef>
+              <a:spcAft>
+                <a:spcPts val="200"/>
+              </a:spcAft>
+              <a:buClr>
+                <a:schemeClr val="accent1">
+                  <a:lumMod val="75000"/>
+                </a:schemeClr>
+              </a:buClr>
+              <a:buSzPct val="85000"/>
+              <a:buFont typeface="Wingdings" pitchFamily="2" charset="2"/>
+              <a:buChar char="§"/>
+              <a:defRPr sz="1600" kern="1200">
+                <a:solidFill>
+                  <a:schemeClr val="tx1"/>
+                </a:solidFill>
+                <a:latin typeface="+mn-lt"/>
+                <a:ea typeface="+mn-ea"/>
+                <a:cs typeface="+mn-cs"/>
+              </a:defRPr>
+            </a:lvl7pPr>
+            <a:lvl8pPr marL="2200000" indent="-228600" algn="l" defTabSz="914400" rtl="0" eaLnBrk="1" latinLnBrk="0" hangingPunct="1">
+              <a:lnSpc>
+                <a:spcPct val="90000"/>
+              </a:lnSpc>
+              <a:spcBef>
+                <a:spcPts val="400"/>
+              </a:spcBef>
+              <a:spcAft>
+                <a:spcPts val="200"/>
+              </a:spcAft>
+              <a:buClr>
+                <a:schemeClr val="accent1">
+                  <a:lumMod val="75000"/>
+                </a:schemeClr>
+              </a:buClr>
+              <a:buSzPct val="85000"/>
+              <a:buFont typeface="Wingdings" pitchFamily="2" charset="2"/>
+              <a:buChar char="§"/>
+              <a:defRPr sz="1600" kern="1200">
+                <a:solidFill>
+                  <a:schemeClr val="tx1"/>
+                </a:solidFill>
+                <a:latin typeface="+mn-lt"/>
+                <a:ea typeface="+mn-ea"/>
+                <a:cs typeface="+mn-cs"/>
+              </a:defRPr>
+            </a:lvl8pPr>
+            <a:lvl9pPr marL="2500000" indent="-228600" algn="l" defTabSz="914400" rtl="0" eaLnBrk="1" latinLnBrk="0" hangingPunct="1">
+              <a:lnSpc>
+                <a:spcPct val="90000"/>
+              </a:lnSpc>
+              <a:spcBef>
+                <a:spcPts val="400"/>
+              </a:spcBef>
+              <a:spcAft>
+                <a:spcPts val="200"/>
+              </a:spcAft>
+              <a:buClr>
+                <a:schemeClr val="accent1">
+                  <a:lumMod val="75000"/>
+                </a:schemeClr>
+              </a:buClr>
+              <a:buSzPct val="85000"/>
+              <a:buFont typeface="Wingdings" pitchFamily="2" charset="2"/>
+              <a:buChar char="§"/>
+              <a:defRPr sz="1600" kern="1200">
+                <a:solidFill>
+                  <a:schemeClr val="tx1"/>
+                </a:solidFill>
+                <a:latin typeface="+mn-lt"/>
+                <a:ea typeface="+mn-ea"/>
+                <a:cs typeface="+mn-cs"/>
+              </a:defRPr>
+            </a:lvl9pPr>
+          </a:lstStyle>
+          <a:p>
+            <a:pPr marL="274320" lvl="1" indent="0">
+              <a:buNone/>
+            </a:pPr>
+            <a:endParaRPr lang="en-US" dirty="0"/>
+          </a:p>
+          <a:p>
+            <a:pPr marL="274320" lvl="1" indent="0">
+              <a:buNone/>
+            </a:pPr>
+            <a:endParaRPr lang="en-US" dirty="0"/>
+          </a:p>
+        </p:txBody>
+      </p:sp>
+      <p:sp>
+        <p:nvSpPr>
+          <p:cNvPr id="12" name="Content Placeholder 2">
+            <a:extLst>
+              <a:ext uri="{FF2B5EF4-FFF2-40B4-BE49-F238E27FC236}">
+                <a16:creationId xmlns:a16="http://schemas.microsoft.com/office/drawing/2014/main" id="{4EE1D6B5-6C74-48AD-A4A6-FE46AB101D5F}"/>
+              </a:ext>
+            </a:extLst>
+          </p:cNvPr>
+          <p:cNvSpPr txBox="1">
+            <a:spLocks/>
+          </p:cNvSpPr>
+          <p:nvPr/>
+        </p:nvSpPr>
+        <p:spPr>
+          <a:xfrm>
+            <a:off x="1069848" y="1873189"/>
+            <a:ext cx="10058400" cy="4675219"/>
+          </a:xfrm>
+          <a:prstGeom prst="rect">
+            <a:avLst/>
+          </a:prstGeom>
+        </p:spPr>
+        <p:txBody>
+          <a:bodyPr vert="horz" lIns="91440" tIns="45720" rIns="91440" bIns="45720" rtlCol="0">
+            <a:normAutofit/>
+          </a:bodyPr>
+          <a:lstStyle>
+            <a:lvl1pPr marL="182880" indent="-182880" algn="l" defTabSz="914400" rtl="0" eaLnBrk="1" latinLnBrk="0" hangingPunct="1">
+              <a:lnSpc>
+                <a:spcPct val="90000"/>
+              </a:lnSpc>
+              <a:spcBef>
+                <a:spcPts val="1200"/>
+              </a:spcBef>
+              <a:buClr>
+                <a:schemeClr val="accent1">
+                  <a:lumMod val="75000"/>
+                </a:schemeClr>
+              </a:buClr>
+              <a:buSzPct val="85000"/>
+              <a:buFont typeface="Wingdings" pitchFamily="2" charset="2"/>
+              <a:buChar char="§"/>
+              <a:defRPr sz="2000" kern="1200">
+                <a:solidFill>
+                  <a:schemeClr val="tx1"/>
+                </a:solidFill>
+                <a:latin typeface="+mn-lt"/>
+                <a:ea typeface="+mn-ea"/>
+                <a:cs typeface="+mn-cs"/>
+              </a:defRPr>
+            </a:lvl1pPr>
+            <a:lvl2pPr marL="457200" indent="-182880" algn="l" defTabSz="914400" rtl="0" eaLnBrk="1" latinLnBrk="0" hangingPunct="1">
+              <a:lnSpc>
+                <a:spcPct val="90000"/>
+              </a:lnSpc>
+              <a:spcBef>
+                <a:spcPts val="400"/>
+              </a:spcBef>
+              <a:spcAft>
+                <a:spcPts val="200"/>
+              </a:spcAft>
+              <a:buClr>
+                <a:schemeClr val="accent1">
+                  <a:lumMod val="75000"/>
+                </a:schemeClr>
+              </a:buClr>
+              <a:buSzPct val="85000"/>
+              <a:buFont typeface="Wingdings" pitchFamily="2" charset="2"/>
+              <a:buChar char="§"/>
+              <a:defRPr sz="1800" kern="1200">
+                <a:solidFill>
+                  <a:schemeClr val="tx1"/>
+                </a:solidFill>
+                <a:latin typeface="+mn-lt"/>
+                <a:ea typeface="+mn-ea"/>
+                <a:cs typeface="+mn-cs"/>
+              </a:defRPr>
+            </a:lvl2pPr>
+            <a:lvl3pPr marL="731520" indent="-182880" algn="l" defTabSz="914400" rtl="0" eaLnBrk="1" latinLnBrk="0" hangingPunct="1">
+              <a:lnSpc>
+                <a:spcPct val="90000"/>
+              </a:lnSpc>
+              <a:spcBef>
+                <a:spcPts val="400"/>
+              </a:spcBef>
+              <a:spcAft>
+                <a:spcPts val="200"/>
+              </a:spcAft>
+              <a:buClr>
+                <a:schemeClr val="accent1">
+                  <a:lumMod val="75000"/>
+                </a:schemeClr>
+              </a:buClr>
+              <a:buSzPct val="85000"/>
+              <a:buFont typeface="Wingdings" pitchFamily="2" charset="2"/>
+              <a:buChar char="§"/>
+              <a:defRPr sz="1600" kern="1200">
+                <a:solidFill>
+                  <a:schemeClr val="tx1"/>
+                </a:solidFill>
+                <a:latin typeface="+mn-lt"/>
+                <a:ea typeface="+mn-ea"/>
+                <a:cs typeface="+mn-cs"/>
+              </a:defRPr>
+            </a:lvl3pPr>
+            <a:lvl4pPr marL="1005840" indent="-182880" algn="l" defTabSz="914400" rtl="0" eaLnBrk="1" latinLnBrk="0" hangingPunct="1">
+              <a:lnSpc>
+                <a:spcPct val="90000"/>
+              </a:lnSpc>
+              <a:spcBef>
+                <a:spcPts val="400"/>
+              </a:spcBef>
+              <a:spcAft>
+                <a:spcPts val="200"/>
+              </a:spcAft>
+              <a:buClr>
+                <a:schemeClr val="accent1">
+                  <a:lumMod val="75000"/>
+                </a:schemeClr>
+              </a:buClr>
+              <a:buSzPct val="85000"/>
+              <a:buFont typeface="Wingdings" pitchFamily="2" charset="2"/>
+              <a:buChar char="§"/>
+              <a:defRPr sz="1600" kern="1200">
+                <a:solidFill>
+                  <a:schemeClr val="tx1"/>
+                </a:solidFill>
+                <a:latin typeface="+mn-lt"/>
+                <a:ea typeface="+mn-ea"/>
+                <a:cs typeface="+mn-cs"/>
+              </a:defRPr>
+            </a:lvl4pPr>
+            <a:lvl5pPr marL="1280160" indent="-182880" algn="l" defTabSz="914400" rtl="0" eaLnBrk="1" latinLnBrk="0" hangingPunct="1">
+              <a:lnSpc>
+                <a:spcPct val="90000"/>
+              </a:lnSpc>
+              <a:spcBef>
+                <a:spcPts val="400"/>
+              </a:spcBef>
+              <a:spcAft>
+                <a:spcPts val="200"/>
+              </a:spcAft>
+              <a:buClr>
+                <a:schemeClr val="accent1">
+                  <a:lumMod val="75000"/>
+                </a:schemeClr>
+              </a:buClr>
+              <a:buSzPct val="85000"/>
+              <a:buFont typeface="Wingdings" pitchFamily="2" charset="2"/>
+              <a:buChar char="§"/>
+              <a:defRPr sz="1600" kern="1200">
+                <a:solidFill>
+                  <a:schemeClr val="tx1"/>
+                </a:solidFill>
+                <a:latin typeface="+mn-lt"/>
+                <a:ea typeface="+mn-ea"/>
+                <a:cs typeface="+mn-cs"/>
+              </a:defRPr>
+            </a:lvl5pPr>
+            <a:lvl6pPr marL="1600000" indent="-228600" algn="l" defTabSz="914400" rtl="0" eaLnBrk="1" latinLnBrk="0" hangingPunct="1">
+              <a:lnSpc>
+                <a:spcPct val="90000"/>
+              </a:lnSpc>
+              <a:spcBef>
+                <a:spcPts val="400"/>
+              </a:spcBef>
+              <a:spcAft>
+                <a:spcPts val="200"/>
+              </a:spcAft>
+              <a:buClr>
+                <a:schemeClr val="accent1">
+                  <a:lumMod val="75000"/>
+                </a:schemeClr>
+              </a:buClr>
+              <a:buSzPct val="85000"/>
+              <a:buFont typeface="Wingdings" pitchFamily="2" charset="2"/>
+              <a:buChar char="§"/>
+              <a:defRPr sz="1600" kern="1200">
+                <a:solidFill>
+                  <a:schemeClr val="tx1"/>
+                </a:solidFill>
+                <a:latin typeface="+mn-lt"/>
+                <a:ea typeface="+mn-ea"/>
+                <a:cs typeface="+mn-cs"/>
+              </a:defRPr>
+            </a:lvl6pPr>
+            <a:lvl7pPr marL="1900000" indent="-228600" algn="l" defTabSz="914400" rtl="0" eaLnBrk="1" latinLnBrk="0" hangingPunct="1">
+              <a:lnSpc>
+                <a:spcPct val="90000"/>
+              </a:lnSpc>
+              <a:spcBef>
+                <a:spcPts val="400"/>
+              </a:spcBef>
+              <a:spcAft>
+                <a:spcPts val="200"/>
+              </a:spcAft>
+              <a:buClr>
+                <a:schemeClr val="accent1">
+                  <a:lumMod val="75000"/>
+                </a:schemeClr>
+              </a:buClr>
+              <a:buSzPct val="85000"/>
+              <a:buFont typeface="Wingdings" pitchFamily="2" charset="2"/>
+              <a:buChar char="§"/>
+              <a:defRPr sz="1600" kern="1200">
+                <a:solidFill>
+                  <a:schemeClr val="tx1"/>
+                </a:solidFill>
+                <a:latin typeface="+mn-lt"/>
+                <a:ea typeface="+mn-ea"/>
+                <a:cs typeface="+mn-cs"/>
+              </a:defRPr>
+            </a:lvl7pPr>
+            <a:lvl8pPr marL="2200000" indent="-228600" algn="l" defTabSz="914400" rtl="0" eaLnBrk="1" latinLnBrk="0" hangingPunct="1">
+              <a:lnSpc>
+                <a:spcPct val="90000"/>
+              </a:lnSpc>
+              <a:spcBef>
+                <a:spcPts val="400"/>
+              </a:spcBef>
+              <a:spcAft>
+                <a:spcPts val="200"/>
+              </a:spcAft>
+              <a:buClr>
+                <a:schemeClr val="accent1">
+                  <a:lumMod val="75000"/>
+                </a:schemeClr>
+              </a:buClr>
+              <a:buSzPct val="85000"/>
+              <a:buFont typeface="Wingdings" pitchFamily="2" charset="2"/>
+              <a:buChar char="§"/>
+              <a:defRPr sz="1600" kern="1200">
+                <a:solidFill>
+                  <a:schemeClr val="tx1"/>
+                </a:solidFill>
+                <a:latin typeface="+mn-lt"/>
+                <a:ea typeface="+mn-ea"/>
+                <a:cs typeface="+mn-cs"/>
+              </a:defRPr>
+            </a:lvl8pPr>
+            <a:lvl9pPr marL="2500000" indent="-228600" algn="l" defTabSz="914400" rtl="0" eaLnBrk="1" latinLnBrk="0" hangingPunct="1">
+              <a:lnSpc>
+                <a:spcPct val="90000"/>
+              </a:lnSpc>
+              <a:spcBef>
+                <a:spcPts val="400"/>
+              </a:spcBef>
+              <a:spcAft>
+                <a:spcPts val="200"/>
+              </a:spcAft>
+              <a:buClr>
+                <a:schemeClr val="accent1">
+                  <a:lumMod val="75000"/>
+                </a:schemeClr>
+              </a:buClr>
+              <a:buSzPct val="85000"/>
+              <a:buFont typeface="Wingdings" pitchFamily="2" charset="2"/>
+              <a:buChar char="§"/>
+              <a:defRPr sz="1600" kern="1200">
+                <a:solidFill>
+                  <a:schemeClr val="tx1"/>
+                </a:solidFill>
+                <a:latin typeface="+mn-lt"/>
+                <a:ea typeface="+mn-ea"/>
+                <a:cs typeface="+mn-cs"/>
+              </a:defRPr>
+            </a:lvl9pPr>
+          </a:lstStyle>
+          <a:p>
+            <a:r>
+              <a:rPr lang="en-US" sz="1600" dirty="0"/>
+              <a:t>Compare test selection using information gain selection vs. top high failure probability tests.</a:t>
+            </a:r>
+          </a:p>
+          <a:p>
+            <a:pPr marL="0" indent="0">
+              <a:buNone/>
+            </a:pPr>
+            <a:r>
+              <a:rPr lang="en-US" sz="1600" dirty="0"/>
+              <a:t>   IG - Information gain selection </a:t>
+            </a:r>
+          </a:p>
+          <a:p>
+            <a:pPr marL="0" indent="0">
+              <a:buNone/>
+            </a:pPr>
+            <a:r>
+              <a:rPr lang="en-US" sz="1600" dirty="0"/>
+              <a:t>   TFB - Top high failure probability tests</a:t>
+            </a:r>
+          </a:p>
+          <a:p>
+            <a:pPr marL="0" indent="0">
+              <a:buNone/>
+            </a:pPr>
+            <a:r>
+              <a:rPr lang="en-US" dirty="0"/>
+              <a:t>   </a:t>
+            </a:r>
+          </a:p>
+          <a:p>
+            <a:pPr marL="0" indent="0">
+              <a:buNone/>
+            </a:pPr>
+            <a:endParaRPr lang="en-US" dirty="0"/>
+          </a:p>
+          <a:p>
+            <a:pPr marL="0" indent="0">
+              <a:buNone/>
+            </a:pPr>
+            <a:endParaRPr lang="en-US" dirty="0"/>
+          </a:p>
+          <a:p>
+            <a:pPr marL="0" indent="0">
+              <a:buNone/>
+            </a:pPr>
+            <a:endParaRPr lang="en-US" dirty="0"/>
+          </a:p>
+          <a:p>
+            <a:pPr marL="0" indent="0">
+              <a:buNone/>
+            </a:pPr>
+            <a:endParaRPr lang="en-US" dirty="0"/>
+          </a:p>
+          <a:p>
+            <a:pPr marL="0" indent="0">
+              <a:buNone/>
+            </a:pPr>
+            <a:endParaRPr lang="en-US" dirty="0"/>
+          </a:p>
+          <a:p>
+            <a:pPr marL="0" indent="0">
+              <a:buNone/>
+            </a:pPr>
+            <a:endParaRPr lang="en-US" dirty="0"/>
+          </a:p>
+          <a:p>
+            <a:pPr marL="0" indent="0">
+              <a:buNone/>
+            </a:pPr>
+            <a:endParaRPr lang="en-US" dirty="0"/>
+          </a:p>
+          <a:p>
+            <a:pPr marL="0" indent="0">
+              <a:buNone/>
+            </a:pPr>
+            <a:endParaRPr lang="en-US" dirty="0"/>
+          </a:p>
+          <a:p>
+            <a:pPr marL="274320" lvl="1" indent="0">
+              <a:buNone/>
+            </a:pPr>
+            <a:endParaRPr lang="en-US" dirty="0"/>
+          </a:p>
+          <a:p>
+            <a:pPr marL="274320" lvl="1" indent="0">
+              <a:buNone/>
+            </a:pPr>
+            <a:endParaRPr lang="en-US" dirty="0"/>
+          </a:p>
+        </p:txBody>
+      </p:sp>
+      <p:graphicFrame>
+        <p:nvGraphicFramePr>
+          <p:cNvPr id="8" name="Chart 7">
+            <a:extLst>
+              <a:ext uri="{FF2B5EF4-FFF2-40B4-BE49-F238E27FC236}">
+                <a16:creationId xmlns:a16="http://schemas.microsoft.com/office/drawing/2014/main" id="{DA22F8D6-0FAF-4E0A-A7DC-217A0C88992A}"/>
+              </a:ext>
+            </a:extLst>
+          </p:cNvPr>
+          <p:cNvGraphicFramePr>
+            <a:graphicFrameLocks/>
+          </p:cNvGraphicFramePr>
+          <p:nvPr>
+            <p:extLst>
+              <p:ext uri="{D42A27DB-BD31-4B8C-83A1-F6EECF244321}">
+                <p14:modId xmlns:p14="http://schemas.microsoft.com/office/powerpoint/2010/main" val="3964544800"/>
+              </p:ext>
+            </p:extLst>
+          </p:nvPr>
+        </p:nvGraphicFramePr>
+        <p:xfrm>
+          <a:off x="1322773" y="2944077"/>
+          <a:ext cx="8655728" cy="3749686"/>
+        </p:xfrm>
+        <a:graphic>
+          <a:graphicData uri="http://schemas.openxmlformats.org/drawingml/2006/chart">
+            <c:chart xmlns:c="http://schemas.openxmlformats.org/drawingml/2006/chart" xmlns:r="http://schemas.openxmlformats.org/officeDocument/2006/relationships" r:id="rId2"/>
+          </a:graphicData>
+        </a:graphic>
+      </p:graphicFrame>
+    </p:spTree>
+    <p:extLst>
+      <p:ext uri="{BB962C8B-B14F-4D97-AF65-F5344CB8AC3E}">
+        <p14:creationId xmlns:p14="http://schemas.microsoft.com/office/powerpoint/2010/main" val="3908426690"/>
+      </p:ext>
+    </p:extLst>
+  </p:cSld>
+  <p:clrMapOvr>
+    <a:masterClrMapping/>
+  </p:clrMapOvr>
+</p:sld>
+</file>
+
+<file path=ppt/slides/slide14.xml><?xml version="1.0" encoding="utf-8"?>
+<p:sld xmlns:a="http://schemas.openxmlformats.org/drawingml/2006/main" xmlns:r="http://schemas.openxmlformats.org/officeDocument/2006/relationships" xmlns:p="http://schemas.openxmlformats.org/presentationml/2006/main">
+  <p:cSld>
+    <p:spTree>
+      <p:nvGrpSpPr>
+        <p:cNvPr id="1" name=""/>
+        <p:cNvGrpSpPr/>
+        <p:nvPr/>
+      </p:nvGrpSpPr>
+      <p:grpSpPr>
+        <a:xfrm>
+          <a:off x="0" y="0"/>
+          <a:ext cx="0" cy="0"/>
+          <a:chOff x="0" y="0"/>
+          <a:chExt cx="0" cy="0"/>
+        </a:xfrm>
+      </p:grpSpPr>
+      <p:sp>
+        <p:nvSpPr>
+          <p:cNvPr id="2" name="Title 1">
+            <a:extLst>
+              <a:ext uri="{FF2B5EF4-FFF2-40B4-BE49-F238E27FC236}">
+                <a16:creationId xmlns:a16="http://schemas.microsoft.com/office/drawing/2014/main" id="{040FCF0E-7CE9-465E-AEE8-6F11580C285F}"/>
+              </a:ext>
+            </a:extLst>
+          </p:cNvPr>
+          <p:cNvSpPr>
+            <a:spLocks noGrp="1"/>
+          </p:cNvSpPr>
+          <p:nvPr>
+            <p:ph type="title"/>
+          </p:nvPr>
+        </p:nvSpPr>
+        <p:spPr/>
+        <p:txBody>
+          <a:bodyPr/>
+          <a:lstStyle/>
+          <a:p>
+            <a:r>
+              <a:rPr lang="en-US" dirty="0"/>
+              <a:t>Open Issues &amp; Future Work</a:t>
+            </a:r>
+          </a:p>
+        </p:txBody>
+      </p:sp>
+      <p:sp>
+        <p:nvSpPr>
+          <p:cNvPr id="3" name="Content Placeholder 2">
+            <a:extLst>
+              <a:ext uri="{FF2B5EF4-FFF2-40B4-BE49-F238E27FC236}">
+                <a16:creationId xmlns:a16="http://schemas.microsoft.com/office/drawing/2014/main" id="{51D59C22-CB34-46E4-9845-1FC09DD740F2}"/>
+              </a:ext>
+            </a:extLst>
+          </p:cNvPr>
+          <p:cNvSpPr>
+            <a:spLocks noGrp="1"/>
+          </p:cNvSpPr>
+          <p:nvPr>
+            <p:ph idx="1"/>
+          </p:nvPr>
+        </p:nvSpPr>
+        <p:spPr/>
+        <p:txBody>
+          <a:bodyPr/>
+          <a:lstStyle/>
+          <a:p>
+            <a:r>
+              <a:rPr lang="en-US" dirty="0"/>
+              <a:t>SFL </a:t>
+            </a:r>
+            <a:r>
+              <a:rPr lang="en-US" dirty="0" err="1"/>
+              <a:t>Diagnoser</a:t>
+            </a:r>
+            <a:r>
+              <a:rPr lang="en-US" dirty="0"/>
+              <a:t> does not allow state fail in some cases (run test simulation required).</a:t>
+            </a:r>
+          </a:p>
+          <a:p>
+            <a:r>
+              <a:rPr lang="en-US" dirty="0"/>
+              <a:t>Need to implement failure probability calculation independently from SFL </a:t>
+            </a:r>
+            <a:r>
+              <a:rPr lang="en-US" dirty="0" err="1"/>
+              <a:t>Diagnoser</a:t>
+            </a:r>
+            <a:r>
+              <a:rPr lang="en-US" dirty="0"/>
+              <a:t>.</a:t>
+            </a:r>
+          </a:p>
+          <a:p>
+            <a:r>
+              <a:rPr lang="en-US" dirty="0"/>
+              <a:t>Compare IG test selection algorithm according in terms of component test covering. </a:t>
+            </a:r>
+          </a:p>
+        </p:txBody>
+      </p:sp>
+    </p:spTree>
+    <p:extLst>
+      <p:ext uri="{BB962C8B-B14F-4D97-AF65-F5344CB8AC3E}">
+        <p14:creationId xmlns:p14="http://schemas.microsoft.com/office/powerpoint/2010/main" val="3331315475"/>
+      </p:ext>
+    </p:extLst>
+  </p:cSld>
+  <p:clrMapOvr>
+    <a:masterClrMapping/>
+  </p:clrMapOvr>
+</p:sld>
+</file>
+
+<file path=ppt/slides/slide15.xml><?xml version="1.0" encoding="utf-8"?>
+<p:sld xmlns:a="http://schemas.openxmlformats.org/drawingml/2006/main" xmlns:r="http://schemas.openxmlformats.org/officeDocument/2006/relationships" xmlns:p="http://schemas.openxmlformats.org/presentationml/2006/main">
+  <p:cSld>
+    <p:spTree>
+      <p:nvGrpSpPr>
+        <p:cNvPr id="1" name=""/>
+        <p:cNvGrpSpPr/>
+        <p:nvPr/>
+      </p:nvGrpSpPr>
+      <p:grpSpPr>
+        <a:xfrm>
+          <a:off x="0" y="0"/>
+          <a:ext cx="0" cy="0"/>
+          <a:chOff x="0" y="0"/>
+          <a:chExt cx="0" cy="0"/>
+        </a:xfrm>
+      </p:grpSpPr>
+      <p:sp>
+        <p:nvSpPr>
           <p:cNvPr id="3" name="Content Placeholder 2"/>
           <p:cNvSpPr>
             <a:spLocks noGrp="1"/>

</xml_diff>

<commit_message>
UPDATE - results ppt.
</commit_message>
<xml_diff>
--- a/Test Set Optimization.pptx
+++ b/Test Set Optimization.pptx
@@ -126,10 +126,6 @@
 </p:presentation>
 </file>
 
-<file path=ppt/revisionInfo.xml><?xml version="1.0" encoding="utf-8"?>
-<p1510:revInfo xmlns:a="http://schemas.openxmlformats.org/drawingml/2006/main" xmlns:r="http://schemas.openxmlformats.org/officeDocument/2006/relationships" xmlns:p1510="http://schemas.microsoft.com/office/powerpoint/2015/10/main"/>
-</file>
-
 <file path=ppt/charts/chart1.xml><?xml version="1.0" encoding="utf-8"?>
 <c:chartSpace xmlns:c="http://schemas.openxmlformats.org/drawingml/2006/chart" xmlns:a="http://schemas.openxmlformats.org/drawingml/2006/main" xmlns:r="http://schemas.openxmlformats.org/officeDocument/2006/relationships" xmlns:c16r2="http://schemas.microsoft.com/office/drawing/2015/06/chart">
   <c:date1904 val="0"/>
@@ -143,10 +139,6 @@
       <c:style val="2"/>
     </mc:Fallback>
   </mc:AlternateContent>
-  <c:pivotSource>
-    <c:name>[Presentation.xlsx]Sheet4!PivotTable1</c:name>
-    <c:fmtId val="3"/>
-  </c:pivotSource>
   <c:chart>
     <c:autoTitleDeleted val="0"/>
     <c:pivotFmts>
@@ -514,15 +506,7 @@
           <c:idx val="0"/>
           <c:order val="0"/>
           <c:tx>
-            <c:strRef>
-              <c:f>Sheet4!$B$1</c:f>
-              <c:strCache>
-                <c:ptCount val="1"/>
-                <c:pt idx="0">
-                  <c:v>TFB Bugs</c:v>
-                </c:pt>
-              </c:strCache>
-            </c:strRef>
+            <c:v>TFB Bugs</c:v>
           </c:tx>
           <c:spPr>
             <a:ln w="34925" cap="rnd">
@@ -585,116 +569,110 @@
             </c:spPr>
           </c:marker>
           <c:cat>
-            <c:strRef>
-              <c:f>Sheet4!$A$2:$A$17</c:f>
-              <c:strCache>
-                <c:ptCount val="15"/>
-                <c:pt idx="0">
-                  <c:v>1</c:v>
-                </c:pt>
-                <c:pt idx="1">
-                  <c:v>2</c:v>
-                </c:pt>
-                <c:pt idx="2">
-                  <c:v>3</c:v>
-                </c:pt>
-                <c:pt idx="3">
-                  <c:v>4</c:v>
-                </c:pt>
-                <c:pt idx="4">
-                  <c:v>5</c:v>
-                </c:pt>
-                <c:pt idx="5">
-                  <c:v>6</c:v>
-                </c:pt>
-                <c:pt idx="6">
-                  <c:v>7</c:v>
-                </c:pt>
-                <c:pt idx="7">
-                  <c:v>8</c:v>
-                </c:pt>
-                <c:pt idx="8">
-                  <c:v>9</c:v>
-                </c:pt>
-                <c:pt idx="9">
-                  <c:v>10</c:v>
-                </c:pt>
-                <c:pt idx="10">
-                  <c:v>11</c:v>
-                </c:pt>
-                <c:pt idx="11">
-                  <c:v>12</c:v>
-                </c:pt>
-                <c:pt idx="12">
-                  <c:v>13</c:v>
-                </c:pt>
-                <c:pt idx="13">
-                  <c:v>14</c:v>
-                </c:pt>
-                <c:pt idx="14">
-                  <c:v>15</c:v>
-                </c:pt>
-              </c:strCache>
-            </c:strRef>
+            <c:strLit>
+              <c:ptCount val="15"/>
+              <c:pt idx="0">
+                <c:v>1</c:v>
+              </c:pt>
+              <c:pt idx="1">
+                <c:v>2</c:v>
+              </c:pt>
+              <c:pt idx="2">
+                <c:v>3</c:v>
+              </c:pt>
+              <c:pt idx="3">
+                <c:v>4</c:v>
+              </c:pt>
+              <c:pt idx="4">
+                <c:v>5</c:v>
+              </c:pt>
+              <c:pt idx="5">
+                <c:v>6</c:v>
+              </c:pt>
+              <c:pt idx="6">
+                <c:v>7</c:v>
+              </c:pt>
+              <c:pt idx="7">
+                <c:v>8</c:v>
+              </c:pt>
+              <c:pt idx="8">
+                <c:v>9</c:v>
+              </c:pt>
+              <c:pt idx="9">
+                <c:v>10</c:v>
+              </c:pt>
+              <c:pt idx="10">
+                <c:v>11</c:v>
+              </c:pt>
+              <c:pt idx="11">
+                <c:v>12</c:v>
+              </c:pt>
+              <c:pt idx="12">
+                <c:v>13</c:v>
+              </c:pt>
+              <c:pt idx="13">
+                <c:v>14</c:v>
+              </c:pt>
+              <c:pt idx="14">
+                <c:v>15</c:v>
+              </c:pt>
+            </c:strLit>
           </c:cat>
           <c:val>
-            <c:numRef>
-              <c:f>Sheet4!$B$2:$B$17</c:f>
-              <c:numCache>
-                <c:formatCode>General</c:formatCode>
-                <c:ptCount val="15"/>
-                <c:pt idx="0">
-                  <c:v>0</c:v>
-                </c:pt>
-                <c:pt idx="1">
-                  <c:v>0</c:v>
-                </c:pt>
-                <c:pt idx="2">
-                  <c:v>0</c:v>
-                </c:pt>
-                <c:pt idx="3">
-                  <c:v>1</c:v>
-                </c:pt>
-                <c:pt idx="4">
-                  <c:v>2</c:v>
-                </c:pt>
-                <c:pt idx="5">
-                  <c:v>3</c:v>
-                </c:pt>
-                <c:pt idx="6">
-                  <c:v>3</c:v>
-                </c:pt>
-                <c:pt idx="7">
-                  <c:v>3</c:v>
-                </c:pt>
-                <c:pt idx="8">
-                  <c:v>3</c:v>
-                </c:pt>
-                <c:pt idx="9">
-                  <c:v>3</c:v>
-                </c:pt>
-                <c:pt idx="10">
-                  <c:v>3</c:v>
-                </c:pt>
-                <c:pt idx="11">
-                  <c:v>3</c:v>
-                </c:pt>
-                <c:pt idx="12">
-                  <c:v>3</c:v>
-                </c:pt>
-                <c:pt idx="13">
-                  <c:v>3</c:v>
-                </c:pt>
-                <c:pt idx="14">
-                  <c:v>4</c:v>
-                </c:pt>
-              </c:numCache>
-            </c:numRef>
+            <c:numLit>
+              <c:formatCode>General</c:formatCode>
+              <c:ptCount val="15"/>
+              <c:pt idx="0">
+                <c:v>0</c:v>
+              </c:pt>
+              <c:pt idx="1">
+                <c:v>0</c:v>
+              </c:pt>
+              <c:pt idx="2">
+                <c:v>0</c:v>
+              </c:pt>
+              <c:pt idx="3">
+                <c:v>1</c:v>
+              </c:pt>
+              <c:pt idx="4">
+                <c:v>2</c:v>
+              </c:pt>
+              <c:pt idx="5">
+                <c:v>3</c:v>
+              </c:pt>
+              <c:pt idx="6">
+                <c:v>3</c:v>
+              </c:pt>
+              <c:pt idx="7">
+                <c:v>3</c:v>
+              </c:pt>
+              <c:pt idx="8">
+                <c:v>3</c:v>
+              </c:pt>
+              <c:pt idx="9">
+                <c:v>3</c:v>
+              </c:pt>
+              <c:pt idx="10">
+                <c:v>3</c:v>
+              </c:pt>
+              <c:pt idx="11">
+                <c:v>3</c:v>
+              </c:pt>
+              <c:pt idx="12">
+                <c:v>3</c:v>
+              </c:pt>
+              <c:pt idx="13">
+                <c:v>3</c:v>
+              </c:pt>
+              <c:pt idx="14">
+                <c:v>4</c:v>
+              </c:pt>
+            </c:numLit>
           </c:val>
           <c:smooth val="0"/>
           <c:extLst>
             <c:ext xmlns:c16="http://schemas.microsoft.com/office/drawing/2014/chart" uri="{C3380CC4-5D6E-409C-BE32-E72D297353CC}">
-              <c16:uniqueId val="{00000000-EA13-4A7B-A01D-61AAFB6F3E56}"/>
+              <c16:uniqueId val="{00000000-B273-4781-8A25-486F80EC4547}"/>
             </c:ext>
           </c:extLst>
         </c:ser>
@@ -702,15 +680,7 @@
           <c:idx val="1"/>
           <c:order val="1"/>
           <c:tx>
-            <c:strRef>
-              <c:f>Sheet4!$C$1</c:f>
-              <c:strCache>
-                <c:ptCount val="1"/>
-                <c:pt idx="0">
-                  <c:v>IG Bugs</c:v>
-                </c:pt>
-              </c:strCache>
-            </c:strRef>
+            <c:v>IG Bugs</c:v>
           </c:tx>
           <c:spPr>
             <a:ln w="34925" cap="rnd">
@@ -773,116 +743,110 @@
             </c:spPr>
           </c:marker>
           <c:cat>
-            <c:strRef>
-              <c:f>Sheet4!$A$2:$A$17</c:f>
-              <c:strCache>
-                <c:ptCount val="15"/>
-                <c:pt idx="0">
-                  <c:v>1</c:v>
-                </c:pt>
-                <c:pt idx="1">
-                  <c:v>2</c:v>
-                </c:pt>
-                <c:pt idx="2">
-                  <c:v>3</c:v>
-                </c:pt>
-                <c:pt idx="3">
-                  <c:v>4</c:v>
-                </c:pt>
-                <c:pt idx="4">
-                  <c:v>5</c:v>
-                </c:pt>
-                <c:pt idx="5">
-                  <c:v>6</c:v>
-                </c:pt>
-                <c:pt idx="6">
-                  <c:v>7</c:v>
-                </c:pt>
-                <c:pt idx="7">
-                  <c:v>8</c:v>
-                </c:pt>
-                <c:pt idx="8">
-                  <c:v>9</c:v>
-                </c:pt>
-                <c:pt idx="9">
-                  <c:v>10</c:v>
-                </c:pt>
-                <c:pt idx="10">
-                  <c:v>11</c:v>
-                </c:pt>
-                <c:pt idx="11">
-                  <c:v>12</c:v>
-                </c:pt>
-                <c:pt idx="12">
-                  <c:v>13</c:v>
-                </c:pt>
-                <c:pt idx="13">
-                  <c:v>14</c:v>
-                </c:pt>
-                <c:pt idx="14">
-                  <c:v>15</c:v>
-                </c:pt>
-              </c:strCache>
-            </c:strRef>
+            <c:strLit>
+              <c:ptCount val="15"/>
+              <c:pt idx="0">
+                <c:v>1</c:v>
+              </c:pt>
+              <c:pt idx="1">
+                <c:v>2</c:v>
+              </c:pt>
+              <c:pt idx="2">
+                <c:v>3</c:v>
+              </c:pt>
+              <c:pt idx="3">
+                <c:v>4</c:v>
+              </c:pt>
+              <c:pt idx="4">
+                <c:v>5</c:v>
+              </c:pt>
+              <c:pt idx="5">
+                <c:v>6</c:v>
+              </c:pt>
+              <c:pt idx="6">
+                <c:v>7</c:v>
+              </c:pt>
+              <c:pt idx="7">
+                <c:v>8</c:v>
+              </c:pt>
+              <c:pt idx="8">
+                <c:v>9</c:v>
+              </c:pt>
+              <c:pt idx="9">
+                <c:v>10</c:v>
+              </c:pt>
+              <c:pt idx="10">
+                <c:v>11</c:v>
+              </c:pt>
+              <c:pt idx="11">
+                <c:v>12</c:v>
+              </c:pt>
+              <c:pt idx="12">
+                <c:v>13</c:v>
+              </c:pt>
+              <c:pt idx="13">
+                <c:v>14</c:v>
+              </c:pt>
+              <c:pt idx="14">
+                <c:v>15</c:v>
+              </c:pt>
+            </c:strLit>
           </c:cat>
           <c:val>
-            <c:numRef>
-              <c:f>Sheet4!$C$2:$C$17</c:f>
-              <c:numCache>
-                <c:formatCode>General</c:formatCode>
-                <c:ptCount val="15"/>
-                <c:pt idx="0">
-                  <c:v>1</c:v>
-                </c:pt>
-                <c:pt idx="1">
-                  <c:v>2</c:v>
-                </c:pt>
-                <c:pt idx="2">
-                  <c:v>3</c:v>
-                </c:pt>
-                <c:pt idx="3">
-                  <c:v>4</c:v>
-                </c:pt>
-                <c:pt idx="4">
-                  <c:v>4</c:v>
-                </c:pt>
-                <c:pt idx="5">
-                  <c:v>4</c:v>
-                </c:pt>
-                <c:pt idx="6">
-                  <c:v>4</c:v>
-                </c:pt>
-                <c:pt idx="7">
-                  <c:v>4</c:v>
-                </c:pt>
-                <c:pt idx="8">
-                  <c:v>4</c:v>
-                </c:pt>
-                <c:pt idx="9">
-                  <c:v>4</c:v>
-                </c:pt>
-                <c:pt idx="10">
-                  <c:v>4</c:v>
-                </c:pt>
-                <c:pt idx="11">
-                  <c:v>4</c:v>
-                </c:pt>
-                <c:pt idx="12">
-                  <c:v>4</c:v>
-                </c:pt>
-                <c:pt idx="13">
-                  <c:v>4</c:v>
-                </c:pt>
-                <c:pt idx="14">
-                  <c:v>4</c:v>
-                </c:pt>
-              </c:numCache>
-            </c:numRef>
+            <c:numLit>
+              <c:formatCode>General</c:formatCode>
+              <c:ptCount val="15"/>
+              <c:pt idx="0">
+                <c:v>1</c:v>
+              </c:pt>
+              <c:pt idx="1">
+                <c:v>2</c:v>
+              </c:pt>
+              <c:pt idx="2">
+                <c:v>2</c:v>
+              </c:pt>
+              <c:pt idx="3">
+                <c:v>2</c:v>
+              </c:pt>
+              <c:pt idx="4">
+                <c:v>2</c:v>
+              </c:pt>
+              <c:pt idx="5">
+                <c:v>2</c:v>
+              </c:pt>
+              <c:pt idx="6">
+                <c:v>2</c:v>
+              </c:pt>
+              <c:pt idx="7">
+                <c:v>2</c:v>
+              </c:pt>
+              <c:pt idx="8">
+                <c:v>2</c:v>
+              </c:pt>
+              <c:pt idx="9">
+                <c:v>2</c:v>
+              </c:pt>
+              <c:pt idx="10">
+                <c:v>2</c:v>
+              </c:pt>
+              <c:pt idx="11">
+                <c:v>2</c:v>
+              </c:pt>
+              <c:pt idx="12">
+                <c:v>2</c:v>
+              </c:pt>
+              <c:pt idx="13">
+                <c:v>2</c:v>
+              </c:pt>
+              <c:pt idx="14">
+                <c:v>2</c:v>
+              </c:pt>
+            </c:numLit>
           </c:val>
           <c:smooth val="0"/>
           <c:extLst>
             <c:ext xmlns:c16="http://schemas.microsoft.com/office/drawing/2014/chart" uri="{C3380CC4-5D6E-409C-BE32-E72D297353CC}">
-              <c16:uniqueId val="{00000001-EA13-4A7B-A01D-61AAFB6F3E56}"/>
+              <c16:uniqueId val="{00000001-B273-4781-8A25-486F80EC4547}"/>
             </c:ext>
           </c:extLst>
         </c:ser>
@@ -939,7 +903,7 @@
                 <a:cs typeface="+mn-cs"/>
               </a:defRPr>
             </a:pPr>
-            <a:endParaRPr lang="en-US"/>
+            <a:endParaRPr lang="he-IL"/>
           </a:p>
         </c:txPr>
         <c:crossAx val="496136352"/>
@@ -999,7 +963,7 @@
                 <a:cs typeface="+mn-cs"/>
               </a:defRPr>
             </a:pPr>
-            <a:endParaRPr lang="en-US"/>
+            <a:endParaRPr lang="he-IL"/>
           </a:p>
         </c:txPr>
         <c:crossAx val="496137008"/>
@@ -1051,7 +1015,7 @@
               <a:cs typeface="+mn-cs"/>
             </a:defRPr>
           </a:pPr>
-          <a:endParaRPr lang="en-US"/>
+          <a:endParaRPr lang="he-IL"/>
         </a:p>
       </c:txPr>
     </c:legend>
@@ -1092,28 +1056,14 @@
       <a:pPr>
         <a:defRPr/>
       </a:pPr>
-      <a:endParaRPr lang="en-US"/>
+      <a:endParaRPr lang="he-IL"/>
     </a:p>
   </c:txPr>
   <c:externalData r:id="rId4">
     <c:autoUpdate val="0"/>
   </c:externalData>
   <c:userShapes r:id="rId5"/>
-  <c:extLst>
-    <c:ext xmlns:c14="http://schemas.microsoft.com/office/drawing/2007/8/2/chart" uri="{781A3756-C4B2-4CAC-9D66-4F8BD8637D16}">
-      <c14:pivotOptions>
-        <c14:dropZoneFilter val="1"/>
-        <c14:dropZoneCategories val="1"/>
-        <c14:dropZoneData val="1"/>
-        <c14:dropZoneSeries val="1"/>
-      </c14:pivotOptions>
-    </c:ext>
-    <c:ext xmlns:c16="http://schemas.microsoft.com/office/drawing/2014/chart" uri="{E28EC0CA-F0BB-4C9C-879D-F8772B89E7AC}">
-      <c16:pivotOptions16>
-        <c16:showExpandCollapseFieldButtons val="1"/>
-      </c16:pivotOptions16>
-    </c:ext>
-  </c:extLst>
+  <c:extLst/>
 </c:chartSpace>
 </file>
 
@@ -2350,7 +2300,7 @@
           <a:p>
             <a:fld id="{83284890-85D2-4D7B-8EF5-15A9C1DB8F42}" type="datetimeFigureOut">
               <a:rPr lang="en-US" dirty="0"/>
-              <a:t>7/17/2018</a:t>
+              <a:t>7/24/2018</a:t>
             </a:fld>
             <a:endParaRPr lang="en-US" dirty="0"/>
           </a:p>
@@ -2525,7 +2475,7 @@
           <a:p>
             <a:fld id="{87157CC2-0FC8-4686-B024-99790E0F5162}" type="datetimeFigureOut">
               <a:rPr lang="en-US" dirty="0"/>
-              <a:t>7/17/2018</a:t>
+              <a:t>7/24/2018</a:t>
             </a:fld>
             <a:endParaRPr lang="en-US" dirty="0"/>
           </a:p>
@@ -2700,7 +2650,7 @@
           <a:p>
             <a:fld id="{F6764DA5-CD3D-4590-A511-FCD3BC7A793E}" type="datetimeFigureOut">
               <a:rPr lang="en-US" dirty="0"/>
-              <a:t>7/17/2018</a:t>
+              <a:t>7/24/2018</a:t>
             </a:fld>
             <a:endParaRPr lang="en-US" dirty="0"/>
           </a:p>
@@ -2865,7 +2815,7 @@
           <a:p>
             <a:fld id="{82F5661D-6934-4B32-B92C-470368BF1EC6}" type="datetimeFigureOut">
               <a:rPr lang="en-US" dirty="0"/>
-              <a:t>7/17/2018</a:t>
+              <a:t>7/24/2018</a:t>
             </a:fld>
             <a:endParaRPr lang="en-US" dirty="0"/>
           </a:p>
@@ -3173,7 +3123,7 @@
           <a:p>
             <a:fld id="{C6F822A4-8DA6-4447-9B1F-C5DB58435268}" type="datetimeFigureOut">
               <a:rPr lang="en-US" dirty="0"/>
-              <a:t>7/17/2018</a:t>
+              <a:t>7/24/2018</a:t>
             </a:fld>
             <a:endParaRPr lang="en-US" dirty="0"/>
           </a:p>
@@ -3555,7 +3505,7 @@
           <a:p>
             <a:fld id="{E548D31E-DCDA-41A7-9C67-C4B11B94D21D}" type="datetimeFigureOut">
               <a:rPr lang="en-US" dirty="0"/>
-              <a:t>7/17/2018</a:t>
+              <a:t>7/24/2018</a:t>
             </a:fld>
             <a:endParaRPr lang="en-US" dirty="0"/>
           </a:p>
@@ -3984,7 +3934,7 @@
           <a:p>
             <a:fld id="{9B3762C0-B258-48F1-ADE6-176B4174CCDD}" type="datetimeFigureOut">
               <a:rPr lang="en-US" dirty="0"/>
-              <a:t>7/17/2018</a:t>
+              <a:t>7/24/2018</a:t>
             </a:fld>
             <a:endParaRPr lang="en-US" dirty="0"/>
           </a:p>
@@ -4097,7 +4047,7 @@
           <a:p>
             <a:fld id="{677919A6-33EB-49BD-A62F-1FA56B9F9712}" type="datetimeFigureOut">
               <a:rPr lang="en-US" dirty="0"/>
-              <a:t>7/17/2018</a:t>
+              <a:t>7/24/2018</a:t>
             </a:fld>
             <a:endParaRPr lang="en-US" dirty="0"/>
           </a:p>
@@ -4187,7 +4137,7 @@
           <a:p>
             <a:fld id="{CA4E7D1B-D673-4CF6-8672-009D42ABD2A0}" type="datetimeFigureOut">
               <a:rPr lang="en-US" dirty="0"/>
-              <a:t>7/17/2018</a:t>
+              <a:t>7/24/2018</a:t>
             </a:fld>
             <a:endParaRPr lang="en-US" dirty="0"/>
           </a:p>
@@ -4532,7 +4482,7 @@
           <a:p>
             <a:fld id="{DA16AA21-1863-4931-97CB-99D0A168701B}" type="datetimeFigureOut">
               <a:rPr lang="en-US" dirty="0"/>
-              <a:t>7/17/2018</a:t>
+              <a:t>7/24/2018</a:t>
             </a:fld>
             <a:endParaRPr lang="en-US" dirty="0"/>
           </a:p>
@@ -4952,7 +4902,7 @@
           <a:p>
             <a:fld id="{3772C379-9A7C-4C87-A116-CBE9F58B04C5}" type="datetimeFigureOut">
               <a:rPr lang="en-US" dirty="0"/>
-              <a:t>7/17/2018</a:t>
+              <a:t>7/24/2018</a:t>
             </a:fld>
             <a:endParaRPr lang="en-US" dirty="0"/>
           </a:p>
@@ -5228,7 +5178,7 @@
           <a:p>
             <a:fld id="{8664C608-40B1-4030-A28D-5B74BC98ADCE}" type="datetimeFigureOut">
               <a:rPr lang="en-US" dirty="0"/>
-              <a:t>7/17/2018</a:t>
+              <a:t>7/24/2018</a:t>
             </a:fld>
             <a:endParaRPr lang="en-US" dirty="0"/>
           </a:p>
@@ -9163,7 +9113,7 @@
           <p:nvPr>
             <p:extLst>
               <p:ext uri="{D42A27DB-BD31-4B8C-83A1-F6EECF244321}">
-                <p14:modId xmlns:p14="http://schemas.microsoft.com/office/powerpoint/2010/main" val="4040775649"/>
+                <p14:modId xmlns:p14="http://schemas.microsoft.com/office/powerpoint/2010/main" val="1466305029"/>
               </p:ext>
             </p:extLst>
           </p:nvPr>
@@ -9279,12 +9229,12 @@
                     <a:p>
                       <a:pPr algn="ctr" fontAlgn="b"/>
                       <a:r>
-                        <a:rPr lang="en-US" sz="1200" b="1" u="none" strike="noStrike">
+                        <a:rPr lang="en-US" sz="1200" b="1" u="none" strike="noStrike" dirty="0">
                           <a:effectLst/>
                         </a:rPr>
                         <a:t>TFB</a:t>
                       </a:r>
-                      <a:endParaRPr lang="en-US" sz="1200" b="1" i="0" u="none" strike="noStrike">
+                      <a:endParaRPr lang="en-US" sz="1200" b="1" i="0" u="none" strike="noStrike" dirty="0">
                         <a:solidFill>
                           <a:srgbClr val="000000"/>
                         </a:solidFill>
@@ -9464,12 +9414,12 @@
                     <a:p>
                       <a:pPr algn="ctr" fontAlgn="b"/>
                       <a:r>
-                        <a:rPr lang="en-US" sz="1100" b="1" u="none" strike="noStrike">
-                          <a:effectLst/>
-                        </a:rPr>
-                        <a:t>4</a:t>
-                      </a:r>
-                      <a:endParaRPr lang="en-US" sz="1100" b="1" i="0" u="none" strike="noStrike">
+                        <a:rPr lang="en-US" sz="1100" b="1" u="none" strike="noStrike" dirty="0">
+                          <a:effectLst/>
+                        </a:rPr>
+                        <a:t>2</a:t>
+                      </a:r>
+                      <a:endParaRPr lang="en-US" sz="1100" b="1" i="0" u="none" strike="noStrike" dirty="0">
                         <a:solidFill>
                           <a:srgbClr val="000000"/>
                         </a:solidFill>
@@ -9487,12 +9437,12 @@
                     <a:p>
                       <a:pPr algn="ctr" fontAlgn="b"/>
                       <a:r>
-                        <a:rPr lang="en-US" sz="1100" b="1" u="none" strike="noStrike">
-                          <a:effectLst/>
-                        </a:rPr>
-                        <a:t>1</a:t>
-                      </a:r>
-                      <a:endParaRPr lang="en-US" sz="1100" b="1" i="0" u="none" strike="noStrike">
+                        <a:rPr lang="en-US" sz="1100" b="1" u="none" strike="noStrike" dirty="0">
+                          <a:effectLst/>
+                        </a:rPr>
+                        <a:t>3</a:t>
+                      </a:r>
+                      <a:endParaRPr lang="en-US" sz="1100" b="1" i="0" u="none" strike="noStrike" dirty="0">
                         <a:solidFill>
                           <a:srgbClr val="000000"/>
                         </a:solidFill>
@@ -9586,12 +9536,12 @@
                     <a:p>
                       <a:pPr algn="ctr" fontAlgn="b"/>
                       <a:r>
-                        <a:rPr lang="en-US" sz="1100" b="1" u="none" strike="noStrike">
-                          <a:effectLst/>
-                        </a:rPr>
-                        <a:t>4</a:t>
-                      </a:r>
-                      <a:endParaRPr lang="en-US" sz="1100" b="1" i="0" u="none" strike="noStrike">
+                        <a:rPr lang="en-US" sz="1100" b="1" u="none" strike="noStrike" dirty="0">
+                          <a:effectLst/>
+                        </a:rPr>
+                        <a:t>2</a:t>
+                      </a:r>
+                      <a:endParaRPr lang="en-US" sz="1100" b="1" i="0" u="none" strike="noStrike" dirty="0">
                         <a:solidFill>
                           <a:srgbClr val="000000"/>
                         </a:solidFill>
@@ -9609,12 +9559,12 @@
                     <a:p>
                       <a:pPr algn="ctr" fontAlgn="b"/>
                       <a:r>
-                        <a:rPr lang="en-US" sz="1100" b="1" u="none" strike="noStrike">
-                          <a:effectLst/>
-                        </a:rPr>
-                        <a:t>6</a:t>
-                      </a:r>
-                      <a:endParaRPr lang="en-US" sz="1100" b="1" i="0" u="none" strike="noStrike">
+                        <a:rPr lang="en-US" sz="1100" b="1" u="none" strike="noStrike" dirty="0">
+                          <a:effectLst/>
+                        </a:rPr>
+                        <a:t>8</a:t>
+                      </a:r>
+                      <a:endParaRPr lang="en-US" sz="1100" b="1" i="0" u="none" strike="noStrike" dirty="0">
                         <a:solidFill>
                           <a:srgbClr val="000000"/>
                         </a:solidFill>
@@ -9711,7 +9661,7 @@
                         <a:rPr lang="en-US" sz="1100" b="1" u="none" strike="noStrike" dirty="0">
                           <a:effectLst/>
                         </a:rPr>
-                        <a:t>4</a:t>
+                        <a:t>2</a:t>
                       </a:r>
                       <a:endParaRPr lang="en-US" sz="1100" b="1" i="0" u="none" strike="noStrike" dirty="0">
                         <a:solidFill>
@@ -9731,12 +9681,12 @@
                     <a:p>
                       <a:pPr algn="ctr" fontAlgn="b"/>
                       <a:r>
-                        <a:rPr lang="en-US" sz="1100" b="1" u="none" strike="noStrike">
-                          <a:effectLst/>
-                        </a:rPr>
-                        <a:t>11</a:t>
-                      </a:r>
-                      <a:endParaRPr lang="en-US" sz="1100" b="1" i="0" u="none" strike="noStrike">
+                        <a:rPr lang="en-US" sz="1100" b="1" u="none" strike="noStrike" dirty="0">
+                          <a:effectLst/>
+                        </a:rPr>
+                        <a:t>13</a:t>
+                      </a:r>
+                      <a:endParaRPr lang="en-US" sz="1100" b="1" i="0" u="none" strike="noStrike" dirty="0">
                         <a:solidFill>
                           <a:srgbClr val="000000"/>
                         </a:solidFill>
@@ -9818,7 +9768,7 @@
           <p:nvPr>
             <p:extLst>
               <p:ext uri="{D42A27DB-BD31-4B8C-83A1-F6EECF244321}">
-                <p14:modId xmlns:p14="http://schemas.microsoft.com/office/powerpoint/2010/main" val="974233334"/>
+                <p14:modId xmlns:p14="http://schemas.microsoft.com/office/powerpoint/2010/main" val="1720463037"/>
               </p:ext>
             </p:extLst>
           </p:nvPr>
@@ -10001,12 +9951,12 @@
                     <a:p>
                       <a:pPr algn="ctr" fontAlgn="b"/>
                       <a:r>
-                        <a:rPr lang="en-US" sz="1100" b="1" u="none" strike="noStrike">
+                        <a:rPr lang="en-US" sz="1100" b="1" u="none" strike="noStrike" dirty="0">
                           <a:effectLst/>
                         </a:rPr>
                         <a:t>2</a:t>
                       </a:r>
-                      <a:endParaRPr lang="en-US" sz="1100" b="1" i="0" u="none" strike="noStrike">
+                      <a:endParaRPr lang="en-US" sz="1100" b="1" i="0" u="none" strike="noStrike" dirty="0">
                         <a:solidFill>
                           <a:srgbClr val="000000"/>
                         </a:solidFill>
@@ -10024,12 +9974,12 @@
                     <a:p>
                       <a:pPr algn="ctr" fontAlgn="b"/>
                       <a:r>
-                        <a:rPr lang="en-US" sz="1100" b="1" u="none" strike="noStrike">
+                        <a:rPr lang="en-US" sz="1100" b="1" u="none" strike="noStrike" dirty="0">
                           <a:effectLst/>
                         </a:rPr>
                         <a:t>3</a:t>
                       </a:r>
-                      <a:endParaRPr lang="en-US" sz="1100" b="1" i="0" u="none" strike="noStrike">
+                      <a:endParaRPr lang="en-US" sz="1100" b="1" i="0" u="none" strike="noStrike" dirty="0">
                         <a:solidFill>
                           <a:srgbClr val="000000"/>
                         </a:solidFill>
@@ -10422,20 +10372,14 @@
                       <a:r>
                         <a:rPr lang="en-US" sz="1100" b="1" u="none" strike="noStrike" dirty="0">
                           <a:effectLst/>
-                          <a:highlight>
-                            <a:srgbClr val="FFFF00"/>
-                          </a:highlight>
-                        </a:rPr>
-                        <a:t>F</a:t>
+                        </a:rPr>
+                        <a:t>P</a:t>
                       </a:r>
                       <a:endParaRPr lang="en-US" sz="1100" b="1" i="0" u="none" strike="noStrike" dirty="0">
                         <a:solidFill>
                           <a:srgbClr val="000000"/>
                         </a:solidFill>
                         <a:effectLst/>
-                        <a:highlight>
-                          <a:srgbClr val="FFFF00"/>
-                        </a:highlight>
                         <a:latin typeface="Calibri" panose="020F0502020204030204" pitchFamily="34" charset="0"/>
                       </a:endParaRPr>
                     </a:p>
@@ -10451,20 +10395,14 @@
                       <a:r>
                         <a:rPr lang="en-US" sz="1100" b="1" u="none" strike="noStrike" dirty="0">
                           <a:effectLst/>
-                          <a:highlight>
-                            <a:srgbClr val="FFFF00"/>
-                          </a:highlight>
-                        </a:rPr>
-                        <a:t>F</a:t>
+                        </a:rPr>
+                        <a:t>P</a:t>
                       </a:r>
                       <a:endParaRPr lang="en-US" sz="1100" b="1" i="0" u="none" strike="noStrike" dirty="0">
                         <a:solidFill>
                           <a:srgbClr val="000000"/>
                         </a:solidFill>
                         <a:effectLst/>
-                        <a:highlight>
-                          <a:srgbClr val="FFFF00"/>
-                        </a:highlight>
                         <a:latin typeface="Calibri" panose="020F0502020204030204" pitchFamily="34" charset="0"/>
                       </a:endParaRPr>
                     </a:p>
@@ -11840,7 +11778,7 @@
       </p:sp>
       <p:graphicFrame>
         <p:nvGraphicFramePr>
-          <p:cNvPr id="8" name="Chart 7">
+          <p:cNvPr id="6" name="Chart 5">
             <a:extLst>
               <a:ext uri="{FF2B5EF4-FFF2-40B4-BE49-F238E27FC236}">
                 <a16:creationId xmlns:a16="http://schemas.microsoft.com/office/drawing/2014/main" id="{DA22F8D6-0FAF-4E0A-A7DC-217A0C88992A}"/>
@@ -11853,13 +11791,13 @@
           <p:nvPr>
             <p:extLst>
               <p:ext uri="{D42A27DB-BD31-4B8C-83A1-F6EECF244321}">
-                <p14:modId xmlns:p14="http://schemas.microsoft.com/office/powerpoint/2010/main" val="3964544800"/>
+                <p14:modId xmlns:p14="http://schemas.microsoft.com/office/powerpoint/2010/main" val="3148404693"/>
               </p:ext>
             </p:extLst>
           </p:nvPr>
         </p:nvGraphicFramePr>
         <p:xfrm>
-          <a:off x="1322773" y="2944077"/>
+          <a:off x="1596256" y="3004822"/>
           <a:ext cx="8655728" cy="3749686"/>
         </p:xfrm>
         <a:graphic>
@@ -11979,6 +11917,17 @@
               <a:rPr lang="en-US" dirty="0"/>
               <a:t>Compare IG test selection algorithm according in terms of component test covering. </a:t>
             </a:r>
+          </a:p>
+          <a:p>
+            <a:r>
+              <a:rPr lang="en-US" dirty="0"/>
+              <a:t>Optimize the algorithm to find more </a:t>
+            </a:r>
+            <a:r>
+              <a:rPr lang="en-US"/>
+              <a:t>failing tests.</a:t>
+            </a:r>
+            <a:endParaRPr lang="en-US" dirty="0"/>
           </a:p>
         </p:txBody>
       </p:sp>

</xml_diff>